<commit_message>
update Common portion of design.md
1. Update information and package diagram to reflect the current application architecture.
2. Fix explanation on public variables for data: some classes are data structures which rightly use public variables.
</commit_message>
<xml_diff>
--- a/docs/images/CommonComponent.pptx
+++ b/docs/images/CommonComponent.pptx
@@ -322,7 +322,7 @@
             <a:fld id="{1D8BD707-D9CF-40AE-B4C6-C98DA3205C09}" type="datetimeFigureOut">
               <a:rPr lang="en-US" smtClean="0"/>
               <a:pPr/>
-              <a:t>3/19/2016</a:t>
+              <a:t>1/28/2017</a:t>
             </a:fld>
             <a:endParaRPr lang="en-US"/>
           </a:p>
@@ -529,7 +529,7 @@
             <a:fld id="{1D8BD707-D9CF-40AE-B4C6-C98DA3205C09}" type="datetimeFigureOut">
               <a:rPr lang="en-US" smtClean="0"/>
               <a:pPr/>
-              <a:t>3/19/2016</a:t>
+              <a:t>1/28/2017</a:t>
             </a:fld>
             <a:endParaRPr lang="en-US"/>
           </a:p>
@@ -736,7 +736,7 @@
             <a:fld id="{1D8BD707-D9CF-40AE-B4C6-C98DA3205C09}" type="datetimeFigureOut">
               <a:rPr lang="en-US" smtClean="0"/>
               <a:pPr/>
-              <a:t>3/19/2016</a:t>
+              <a:t>1/28/2017</a:t>
             </a:fld>
             <a:endParaRPr lang="en-US"/>
           </a:p>
@@ -943,7 +943,7 @@
             <a:fld id="{1D8BD707-D9CF-40AE-B4C6-C98DA3205C09}" type="datetimeFigureOut">
               <a:rPr lang="en-US" smtClean="0"/>
               <a:pPr/>
-              <a:t>3/19/2016</a:t>
+              <a:t>1/28/2017</a:t>
             </a:fld>
             <a:endParaRPr lang="en-US"/>
           </a:p>
@@ -1216,7 +1216,7 @@
             <a:fld id="{1D8BD707-D9CF-40AE-B4C6-C98DA3205C09}" type="datetimeFigureOut">
               <a:rPr lang="en-US" smtClean="0"/>
               <a:pPr/>
-              <a:t>3/19/2016</a:t>
+              <a:t>1/28/2017</a:t>
             </a:fld>
             <a:endParaRPr lang="en-US"/>
           </a:p>
@@ -1539,7 +1539,7 @@
             <a:fld id="{1D8BD707-D9CF-40AE-B4C6-C98DA3205C09}" type="datetimeFigureOut">
               <a:rPr lang="en-US" smtClean="0"/>
               <a:pPr/>
-              <a:t>3/19/2016</a:t>
+              <a:t>1/28/2017</a:t>
             </a:fld>
             <a:endParaRPr lang="en-US"/>
           </a:p>
@@ -2002,7 +2002,7 @@
             <a:fld id="{1D8BD707-D9CF-40AE-B4C6-C98DA3205C09}" type="datetimeFigureOut">
               <a:rPr lang="en-US" smtClean="0"/>
               <a:pPr/>
-              <a:t>3/19/2016</a:t>
+              <a:t>1/28/2017</a:t>
             </a:fld>
             <a:endParaRPr lang="en-US"/>
           </a:p>
@@ -2149,7 +2149,7 @@
             <a:fld id="{1D8BD707-D9CF-40AE-B4C6-C98DA3205C09}" type="datetimeFigureOut">
               <a:rPr lang="en-US" smtClean="0"/>
               <a:pPr/>
-              <a:t>3/19/2016</a:t>
+              <a:t>1/28/2017</a:t>
             </a:fld>
             <a:endParaRPr lang="en-US"/>
           </a:p>
@@ -2265,7 +2265,7 @@
             <a:fld id="{1D8BD707-D9CF-40AE-B4C6-C98DA3205C09}" type="datetimeFigureOut">
               <a:rPr lang="en-US" smtClean="0"/>
               <a:pPr/>
-              <a:t>3/19/2016</a:t>
+              <a:t>1/28/2017</a:t>
             </a:fld>
             <a:endParaRPr lang="en-US"/>
           </a:p>
@@ -2572,7 +2572,7 @@
             <a:fld id="{1D8BD707-D9CF-40AE-B4C6-C98DA3205C09}" type="datetimeFigureOut">
               <a:rPr lang="en-US" smtClean="0"/>
               <a:pPr/>
-              <a:t>3/19/2016</a:t>
+              <a:t>1/28/2017</a:t>
             </a:fld>
             <a:endParaRPr lang="en-US"/>
           </a:p>
@@ -2855,7 +2855,7 @@
             <a:fld id="{1D8BD707-D9CF-40AE-B4C6-C98DA3205C09}" type="datetimeFigureOut">
               <a:rPr lang="en-US" smtClean="0"/>
               <a:pPr/>
-              <a:t>3/19/2016</a:t>
+              <a:t>1/28/2017</a:t>
             </a:fld>
             <a:endParaRPr lang="en-US"/>
           </a:p>
@@ -2968,15 +2968,14 @@
           </a:prstGeom>
           <a:solidFill>
             <a:schemeClr val="accent5">
-              <a:lumMod val="40000"/>
-              <a:lumOff val="60000"/>
+              <a:lumMod val="60000"/>
+              <a:lumOff val="40000"/>
             </a:schemeClr>
           </a:solidFill>
           <a:ln>
             <a:solidFill>
               <a:schemeClr val="accent5">
-                <a:lumMod val="60000"/>
-                <a:lumOff val="40000"/>
+                <a:lumMod val="75000"/>
               </a:schemeClr>
             </a:solidFill>
           </a:ln>
@@ -3009,392 +3008,431 @@
           </a:p>
         </p:txBody>
       </p:sp>
-      <p:sp>
-        <p:nvSpPr>
-          <p:cNvPr id="9" name="Rectangle 8"/>
-          <p:cNvSpPr/>
-          <p:nvPr/>
-        </p:nvSpPr>
-        <p:spPr>
-          <a:xfrm>
-            <a:off x="381000" y="2342197"/>
-            <a:ext cx="8305800" cy="2352040"/>
-          </a:xfrm>
-          <a:prstGeom prst="rect">
-            <a:avLst/>
-          </a:prstGeom>
-          <a:solidFill>
-            <a:schemeClr val="bg1"/>
-          </a:solidFill>
-          <a:ln>
+      <p:grpSp>
+        <p:nvGrpSpPr>
+          <p:cNvPr id="4" name="Group 3"/>
+          <p:cNvGrpSpPr/>
+          <p:nvPr userDrawn="1"/>
+        </p:nvGrpSpPr>
+        <p:grpSpPr>
+          <a:xfrm>
+            <a:off x="381000" y="2260917"/>
+            <a:ext cx="8305800" cy="2433320"/>
+            <a:chOff x="381000" y="2260917"/>
+            <a:chExt cx="8305800" cy="2433320"/>
+          </a:xfrm>
+        </p:grpSpPr>
+        <p:sp>
+          <p:nvSpPr>
+            <p:cNvPr id="9" name="Rectangle 8"/>
+            <p:cNvSpPr/>
+            <p:nvPr/>
+          </p:nvSpPr>
+          <p:spPr>
+            <a:xfrm>
+              <a:off x="381000" y="2342197"/>
+              <a:ext cx="8305800" cy="2352040"/>
+            </a:xfrm>
+            <a:prstGeom prst="rect">
+              <a:avLst/>
+            </a:prstGeom>
             <a:solidFill>
-              <a:schemeClr val="accent5">
-                <a:lumMod val="60000"/>
-                <a:lumOff val="40000"/>
+              <a:schemeClr val="bg1"/>
+            </a:solidFill>
+            <a:ln>
+              <a:solidFill>
+                <a:schemeClr val="accent5">
+                  <a:lumMod val="75000"/>
+                </a:schemeClr>
+              </a:solidFill>
+            </a:ln>
+          </p:spPr>
+          <p:style>
+            <a:lnRef idx="2">
+              <a:schemeClr val="accent1">
+                <a:shade val="50000"/>
               </a:schemeClr>
-            </a:solidFill>
-          </a:ln>
-        </p:spPr>
-        <p:style>
-          <a:lnRef idx="2">
-            <a:schemeClr val="accent1">
-              <a:shade val="50000"/>
-            </a:schemeClr>
-          </a:lnRef>
-          <a:fillRef idx="1">
-            <a:schemeClr val="accent1"/>
-          </a:fillRef>
-          <a:effectRef idx="0">
-            <a:schemeClr val="accent1"/>
-          </a:effectRef>
-          <a:fontRef idx="minor">
-            <a:schemeClr val="lt1"/>
-          </a:fontRef>
-        </p:style>
-        <p:txBody>
-          <a:bodyPr rtlCol="0" anchor="t" anchorCtr="0"/>
-          <a:lstStyle/>
-          <a:p>
-            <a:r>
-              <a:rPr lang="en-US" sz="1400" b="1" dirty="0" smtClean="0">
+            </a:lnRef>
+            <a:fillRef idx="1">
+              <a:schemeClr val="accent1"/>
+            </a:fillRef>
+            <a:effectRef idx="0">
+              <a:schemeClr val="accent1"/>
+            </a:effectRef>
+            <a:fontRef idx="minor">
+              <a:schemeClr val="lt1"/>
+            </a:fontRef>
+          </p:style>
+          <p:txBody>
+            <a:bodyPr rtlCol="0" anchor="t" anchorCtr="0"/>
+            <a:lstStyle/>
+            <a:p>
+              <a:r>
+                <a:rPr lang="en-US" sz="1400" b="1" dirty="0" smtClean="0">
+                  <a:solidFill>
+                    <a:schemeClr val="accent5">
+                      <a:lumMod val="75000"/>
+                    </a:schemeClr>
+                  </a:solidFill>
+                </a:rPr>
+                <a:t>common::</a:t>
+              </a:r>
+              <a:r>
+                <a:rPr lang="en-US" sz="1400" b="1" dirty="0" err="1" smtClean="0">
+                  <a:solidFill>
+                    <a:schemeClr val="accent5">
+                      <a:lumMod val="75000"/>
+                    </a:schemeClr>
+                  </a:solidFill>
+                </a:rPr>
+                <a:t>datatransfer</a:t>
+              </a:r>
+              <a:endParaRPr lang="en-SG" sz="1400" b="1" dirty="0">
                 <a:solidFill>
                   <a:schemeClr val="accent5">
                     <a:lumMod val="75000"/>
                   </a:schemeClr>
                 </a:solidFill>
-              </a:rPr>
-              <a:t>common::</a:t>
-            </a:r>
-            <a:r>
-              <a:rPr lang="en-US" sz="1400" b="1" dirty="0" err="1" smtClean="0">
+              </a:endParaRPr>
+            </a:p>
+          </p:txBody>
+        </p:sp>
+        <p:sp>
+          <p:nvSpPr>
+            <p:cNvPr id="10" name="Rectangle 9"/>
+            <p:cNvSpPr/>
+            <p:nvPr/>
+          </p:nvSpPr>
+          <p:spPr>
+            <a:xfrm>
+              <a:off x="8191500" y="2260917"/>
+              <a:ext cx="495300" cy="81280"/>
+            </a:xfrm>
+            <a:prstGeom prst="rect">
+              <a:avLst/>
+            </a:prstGeom>
+            <a:solidFill>
+              <a:schemeClr val="bg1"/>
+            </a:solidFill>
+            <a:ln>
+              <a:solidFill>
+                <a:schemeClr val="accent5">
+                  <a:lumMod val="75000"/>
+                </a:schemeClr>
+              </a:solidFill>
+            </a:ln>
+          </p:spPr>
+          <p:style>
+            <a:lnRef idx="2">
+              <a:schemeClr val="accent1">
+                <a:shade val="50000"/>
+              </a:schemeClr>
+            </a:lnRef>
+            <a:fillRef idx="1">
+              <a:schemeClr val="accent1"/>
+            </a:fillRef>
+            <a:effectRef idx="0">
+              <a:schemeClr val="accent1"/>
+            </a:effectRef>
+            <a:fontRef idx="minor">
+              <a:schemeClr val="lt1"/>
+            </a:fontRef>
+          </p:style>
+          <p:txBody>
+            <a:bodyPr rtlCol="0" anchor="t" anchorCtr="0"/>
+            <a:lstStyle/>
+            <a:p>
+              <a:endParaRPr lang="en-SG" sz="1400" b="1">
                 <a:solidFill>
                   <a:schemeClr val="accent5">
                     <a:lumMod val="75000"/>
                   </a:schemeClr>
                 </a:solidFill>
-              </a:rPr>
-              <a:t>datatransfer</a:t>
-            </a:r>
-            <a:endParaRPr lang="en-SG" sz="1400" b="1" dirty="0">
+              </a:endParaRPr>
+            </a:p>
+          </p:txBody>
+        </p:sp>
+      </p:grpSp>
+      <p:grpSp>
+        <p:nvGrpSpPr>
+          <p:cNvPr id="3" name="Group 2"/>
+          <p:cNvGrpSpPr/>
+          <p:nvPr userDrawn="1"/>
+        </p:nvGrpSpPr>
+        <p:grpSpPr>
+          <a:xfrm>
+            <a:off x="5105400" y="458411"/>
+            <a:ext cx="3581400" cy="1721226"/>
+            <a:chOff x="5105400" y="458411"/>
+            <a:chExt cx="3581400" cy="1721226"/>
+          </a:xfrm>
+        </p:grpSpPr>
+        <p:sp>
+          <p:nvSpPr>
+            <p:cNvPr id="15" name="Rectangle 14"/>
+            <p:cNvSpPr/>
+            <p:nvPr userDrawn="1"/>
+          </p:nvSpPr>
+          <p:spPr>
+            <a:xfrm>
+              <a:off x="5105400" y="542992"/>
+              <a:ext cx="3581400" cy="1636645"/>
+            </a:xfrm>
+            <a:prstGeom prst="rect">
+              <a:avLst/>
+            </a:prstGeom>
+            <a:solidFill>
+              <a:schemeClr val="bg1"/>
+            </a:solidFill>
+            <a:ln>
               <a:solidFill>
                 <a:schemeClr val="accent5">
                   <a:lumMod val="75000"/>
                 </a:schemeClr>
               </a:solidFill>
-            </a:endParaRPr>
-          </a:p>
-        </p:txBody>
-      </p:sp>
-      <p:sp>
-        <p:nvSpPr>
-          <p:cNvPr id="10" name="Rectangle 9"/>
-          <p:cNvSpPr/>
-          <p:nvPr/>
-        </p:nvSpPr>
-        <p:spPr>
-          <a:xfrm>
-            <a:off x="8191500" y="2260917"/>
-            <a:ext cx="495300" cy="81280"/>
-          </a:xfrm>
-          <a:prstGeom prst="rect">
-            <a:avLst/>
-          </a:prstGeom>
-          <a:solidFill>
-            <a:schemeClr val="bg1"/>
-          </a:solidFill>
-          <a:ln>
+            </a:ln>
+          </p:spPr>
+          <p:style>
+            <a:lnRef idx="2">
+              <a:schemeClr val="accent1">
+                <a:shade val="50000"/>
+              </a:schemeClr>
+            </a:lnRef>
+            <a:fillRef idx="1">
+              <a:schemeClr val="accent1"/>
+            </a:fillRef>
+            <a:effectRef idx="0">
+              <a:schemeClr val="accent1"/>
+            </a:effectRef>
+            <a:fontRef idx="minor">
+              <a:schemeClr val="lt1"/>
+            </a:fontRef>
+          </p:style>
+          <p:txBody>
+            <a:bodyPr rtlCol="0" anchor="t" anchorCtr="0"/>
+            <a:lstStyle/>
+            <a:p>
+              <a:r>
+                <a:rPr lang="en-US" sz="1400" b="1" dirty="0" smtClean="0">
+                  <a:solidFill>
+                    <a:schemeClr val="accent5">
+                      <a:lumMod val="75000"/>
+                    </a:schemeClr>
+                  </a:solidFill>
+                </a:rPr>
+                <a:t>common::exception</a:t>
+              </a:r>
+              <a:endParaRPr lang="en-SG" sz="1400" b="1" dirty="0">
+                <a:solidFill>
+                  <a:schemeClr val="accent5">
+                    <a:lumMod val="75000"/>
+                  </a:schemeClr>
+                </a:solidFill>
+              </a:endParaRPr>
+            </a:p>
+          </p:txBody>
+        </p:sp>
+        <p:sp>
+          <p:nvSpPr>
+            <p:cNvPr id="45" name="Rectangle 44"/>
+            <p:cNvSpPr/>
+            <p:nvPr userDrawn="1"/>
+          </p:nvSpPr>
+          <p:spPr>
+            <a:xfrm>
+              <a:off x="8191500" y="458411"/>
+              <a:ext cx="495300" cy="81280"/>
+            </a:xfrm>
+            <a:prstGeom prst="rect">
+              <a:avLst/>
+            </a:prstGeom>
             <a:solidFill>
-              <a:schemeClr val="accent5">
-                <a:lumMod val="60000"/>
-                <a:lumOff val="40000"/>
-              </a:schemeClr>
+              <a:schemeClr val="bg1"/>
             </a:solidFill>
-          </a:ln>
-        </p:spPr>
-        <p:style>
-          <a:lnRef idx="2">
-            <a:schemeClr val="accent1">
-              <a:shade val="50000"/>
-            </a:schemeClr>
-          </a:lnRef>
-          <a:fillRef idx="1">
-            <a:schemeClr val="accent1"/>
-          </a:fillRef>
-          <a:effectRef idx="0">
-            <a:schemeClr val="accent1"/>
-          </a:effectRef>
-          <a:fontRef idx="minor">
-            <a:schemeClr val="lt1"/>
-          </a:fontRef>
-        </p:style>
-        <p:txBody>
-          <a:bodyPr rtlCol="0" anchor="t" anchorCtr="0"/>
-          <a:lstStyle/>
-          <a:p>
-            <a:endParaRPr lang="en-SG" sz="1400" b="1">
+            <a:ln>
               <a:solidFill>
                 <a:schemeClr val="accent5">
                   <a:lumMod val="75000"/>
                 </a:schemeClr>
               </a:solidFill>
-            </a:endParaRPr>
-          </a:p>
-        </p:txBody>
-      </p:sp>
-      <p:sp>
-        <p:nvSpPr>
-          <p:cNvPr id="12" name="Rectangle 11"/>
-          <p:cNvSpPr/>
-          <p:nvPr/>
-        </p:nvSpPr>
-        <p:spPr>
-          <a:xfrm>
-            <a:off x="380999" y="565987"/>
-            <a:ext cx="4495801" cy="1613650"/>
-          </a:xfrm>
-          <a:prstGeom prst="rect">
-            <a:avLst/>
-          </a:prstGeom>
-          <a:solidFill>
-            <a:schemeClr val="bg1"/>
-          </a:solidFill>
-          <a:ln>
-            <a:solidFill>
-              <a:schemeClr val="accent5">
-                <a:lumMod val="60000"/>
-                <a:lumOff val="40000"/>
+            </a:ln>
+          </p:spPr>
+          <p:style>
+            <a:lnRef idx="2">
+              <a:schemeClr val="accent1">
+                <a:shade val="50000"/>
               </a:schemeClr>
-            </a:solidFill>
-          </a:ln>
-        </p:spPr>
-        <p:style>
-          <a:lnRef idx="2">
-            <a:schemeClr val="accent1">
-              <a:shade val="50000"/>
-            </a:schemeClr>
-          </a:lnRef>
-          <a:fillRef idx="1">
-            <a:schemeClr val="accent1"/>
-          </a:fillRef>
-          <a:effectRef idx="0">
-            <a:schemeClr val="accent1"/>
-          </a:effectRef>
-          <a:fontRef idx="minor">
-            <a:schemeClr val="lt1"/>
-          </a:fontRef>
-        </p:style>
-        <p:txBody>
-          <a:bodyPr rtlCol="0" anchor="t" anchorCtr="0"/>
-          <a:lstStyle/>
-          <a:p>
-            <a:r>
-              <a:rPr lang="en-US" sz="1400" b="1" dirty="0" smtClean="0">
+            </a:lnRef>
+            <a:fillRef idx="1">
+              <a:schemeClr val="accent1"/>
+            </a:fillRef>
+            <a:effectRef idx="0">
+              <a:schemeClr val="accent1"/>
+            </a:effectRef>
+            <a:fontRef idx="minor">
+              <a:schemeClr val="lt1"/>
+            </a:fontRef>
+          </p:style>
+          <p:txBody>
+            <a:bodyPr rtlCol="0" anchor="t" anchorCtr="0"/>
+            <a:lstStyle/>
+            <a:p>
+              <a:endParaRPr lang="en-SG" sz="1400" b="1">
                 <a:solidFill>
                   <a:schemeClr val="accent5">
                     <a:lumMod val="75000"/>
                   </a:schemeClr>
                 </a:solidFill>
-              </a:rPr>
-              <a:t>common::</a:t>
-            </a:r>
-            <a:r>
-              <a:rPr lang="en-US" sz="1400" b="1" dirty="0" err="1" smtClean="0">
+              </a:endParaRPr>
+            </a:p>
+          </p:txBody>
+        </p:sp>
+      </p:grpSp>
+      <p:grpSp>
+        <p:nvGrpSpPr>
+          <p:cNvPr id="2" name="Group 1"/>
+          <p:cNvGrpSpPr/>
+          <p:nvPr userDrawn="1"/>
+        </p:nvGrpSpPr>
+        <p:grpSpPr>
+          <a:xfrm>
+            <a:off x="380999" y="484707"/>
+            <a:ext cx="4495801" cy="1694930"/>
+            <a:chOff x="380999" y="484707"/>
+            <a:chExt cx="4495801" cy="1694930"/>
+          </a:xfrm>
+        </p:grpSpPr>
+        <p:sp>
+          <p:nvSpPr>
+            <p:cNvPr id="12" name="Rectangle 11"/>
+            <p:cNvSpPr/>
+            <p:nvPr/>
+          </p:nvSpPr>
+          <p:spPr>
+            <a:xfrm>
+              <a:off x="380999" y="565987"/>
+              <a:ext cx="4495801" cy="1613650"/>
+            </a:xfrm>
+            <a:prstGeom prst="rect">
+              <a:avLst/>
+            </a:prstGeom>
+            <a:solidFill>
+              <a:schemeClr val="bg1"/>
+            </a:solidFill>
+            <a:ln>
+              <a:solidFill>
+                <a:schemeClr val="accent5">
+                  <a:lumMod val="75000"/>
+                </a:schemeClr>
+              </a:solidFill>
+            </a:ln>
+          </p:spPr>
+          <p:style>
+            <a:lnRef idx="2">
+              <a:schemeClr val="accent1">
+                <a:shade val="50000"/>
+              </a:schemeClr>
+            </a:lnRef>
+            <a:fillRef idx="1">
+              <a:schemeClr val="accent1"/>
+            </a:fillRef>
+            <a:effectRef idx="0">
+              <a:schemeClr val="accent1"/>
+            </a:effectRef>
+            <a:fontRef idx="minor">
+              <a:schemeClr val="lt1"/>
+            </a:fontRef>
+          </p:style>
+          <p:txBody>
+            <a:bodyPr rtlCol="0" anchor="t" anchorCtr="0"/>
+            <a:lstStyle/>
+            <a:p>
+              <a:r>
+                <a:rPr lang="en-US" sz="1400" b="1" dirty="0" smtClean="0">
+                  <a:solidFill>
+                    <a:schemeClr val="accent5">
+                      <a:lumMod val="75000"/>
+                    </a:schemeClr>
+                  </a:solidFill>
+                </a:rPr>
+                <a:t>common::</a:t>
+              </a:r>
+              <a:r>
+                <a:rPr lang="en-US" sz="1400" b="1" dirty="0" err="1" smtClean="0">
+                  <a:solidFill>
+                    <a:schemeClr val="accent5">
+                      <a:lumMod val="75000"/>
+                    </a:schemeClr>
+                  </a:solidFill>
+                </a:rPr>
+                <a:t>util</a:t>
+              </a:r>
+              <a:endParaRPr lang="en-SG" sz="1400" b="1" dirty="0">
                 <a:solidFill>
                   <a:schemeClr val="accent5">
                     <a:lumMod val="75000"/>
                   </a:schemeClr>
                 </a:solidFill>
-              </a:rPr>
-              <a:t>util</a:t>
-            </a:r>
-            <a:endParaRPr lang="en-SG" sz="1400" b="1" dirty="0">
+              </a:endParaRPr>
+            </a:p>
+          </p:txBody>
+        </p:sp>
+        <p:sp>
+          <p:nvSpPr>
+            <p:cNvPr id="46" name="Rectangle 45"/>
+            <p:cNvSpPr/>
+            <p:nvPr userDrawn="1"/>
+          </p:nvSpPr>
+          <p:spPr>
+            <a:xfrm>
+              <a:off x="4381500" y="484707"/>
+              <a:ext cx="495300" cy="81280"/>
+            </a:xfrm>
+            <a:prstGeom prst="rect">
+              <a:avLst/>
+            </a:prstGeom>
+            <a:solidFill>
+              <a:schemeClr val="bg1"/>
+            </a:solidFill>
+            <a:ln>
               <a:solidFill>
                 <a:schemeClr val="accent5">
                   <a:lumMod val="75000"/>
                 </a:schemeClr>
               </a:solidFill>
-            </a:endParaRPr>
-          </a:p>
-        </p:txBody>
-      </p:sp>
-      <p:sp>
-        <p:nvSpPr>
-          <p:cNvPr id="15" name="Rectangle 14"/>
-          <p:cNvSpPr/>
-          <p:nvPr userDrawn="1"/>
-        </p:nvSpPr>
-        <p:spPr>
-          <a:xfrm>
-            <a:off x="5105400" y="542992"/>
-            <a:ext cx="3581400" cy="1636645"/>
-          </a:xfrm>
-          <a:prstGeom prst="rect">
-            <a:avLst/>
-          </a:prstGeom>
-          <a:solidFill>
-            <a:schemeClr val="bg1"/>
-          </a:solidFill>
-          <a:ln>
-            <a:solidFill>
-              <a:schemeClr val="accent5">
-                <a:lumMod val="60000"/>
-                <a:lumOff val="40000"/>
+            </a:ln>
+          </p:spPr>
+          <p:style>
+            <a:lnRef idx="2">
+              <a:schemeClr val="accent1">
+                <a:shade val="50000"/>
               </a:schemeClr>
-            </a:solidFill>
-          </a:ln>
-        </p:spPr>
-        <p:style>
-          <a:lnRef idx="2">
-            <a:schemeClr val="accent1">
-              <a:shade val="50000"/>
-            </a:schemeClr>
-          </a:lnRef>
-          <a:fillRef idx="1">
-            <a:schemeClr val="accent1"/>
-          </a:fillRef>
-          <a:effectRef idx="0">
-            <a:schemeClr val="accent1"/>
-          </a:effectRef>
-          <a:fontRef idx="minor">
-            <a:schemeClr val="lt1"/>
-          </a:fontRef>
-        </p:style>
-        <p:txBody>
-          <a:bodyPr rtlCol="0" anchor="t" anchorCtr="0"/>
-          <a:lstStyle/>
-          <a:p>
-            <a:r>
-              <a:rPr lang="en-US" sz="1400" b="1" dirty="0" smtClean="0">
+            </a:lnRef>
+            <a:fillRef idx="1">
+              <a:schemeClr val="accent1"/>
+            </a:fillRef>
+            <a:effectRef idx="0">
+              <a:schemeClr val="accent1"/>
+            </a:effectRef>
+            <a:fontRef idx="minor">
+              <a:schemeClr val="lt1"/>
+            </a:fontRef>
+          </p:style>
+          <p:txBody>
+            <a:bodyPr rtlCol="0" anchor="t" anchorCtr="0"/>
+            <a:lstStyle/>
+            <a:p>
+              <a:endParaRPr lang="en-SG" sz="1400" b="1">
                 <a:solidFill>
                   <a:schemeClr val="accent5">
                     <a:lumMod val="75000"/>
                   </a:schemeClr>
                 </a:solidFill>
-              </a:rPr>
-              <a:t>common::exception</a:t>
-            </a:r>
-            <a:endParaRPr lang="en-SG" sz="1400" b="1" dirty="0">
-              <a:solidFill>
-                <a:schemeClr val="accent5">
-                  <a:lumMod val="75000"/>
-                </a:schemeClr>
-              </a:solidFill>
-            </a:endParaRPr>
-          </a:p>
-        </p:txBody>
-      </p:sp>
-      <p:sp>
-        <p:nvSpPr>
-          <p:cNvPr id="45" name="Rectangle 44"/>
-          <p:cNvSpPr/>
-          <p:nvPr userDrawn="1"/>
-        </p:nvSpPr>
-        <p:spPr>
-          <a:xfrm>
-            <a:off x="8191500" y="458411"/>
-            <a:ext cx="495300" cy="81280"/>
-          </a:xfrm>
-          <a:prstGeom prst="rect">
-            <a:avLst/>
-          </a:prstGeom>
-          <a:solidFill>
-            <a:schemeClr val="bg1"/>
-          </a:solidFill>
-          <a:ln>
-            <a:solidFill>
-              <a:schemeClr val="accent5">
-                <a:lumMod val="60000"/>
-                <a:lumOff val="40000"/>
-              </a:schemeClr>
-            </a:solidFill>
-          </a:ln>
-        </p:spPr>
-        <p:style>
-          <a:lnRef idx="2">
-            <a:schemeClr val="accent1">
-              <a:shade val="50000"/>
-            </a:schemeClr>
-          </a:lnRef>
-          <a:fillRef idx="1">
-            <a:schemeClr val="accent1"/>
-          </a:fillRef>
-          <a:effectRef idx="0">
-            <a:schemeClr val="accent1"/>
-          </a:effectRef>
-          <a:fontRef idx="minor">
-            <a:schemeClr val="lt1"/>
-          </a:fontRef>
-        </p:style>
-        <p:txBody>
-          <a:bodyPr rtlCol="0" anchor="t" anchorCtr="0"/>
-          <a:lstStyle/>
-          <a:p>
-            <a:endParaRPr lang="en-SG" sz="1400" b="1">
-              <a:solidFill>
-                <a:schemeClr val="accent5">
-                  <a:lumMod val="75000"/>
-                </a:schemeClr>
-              </a:solidFill>
-            </a:endParaRPr>
-          </a:p>
-        </p:txBody>
-      </p:sp>
-      <p:sp>
-        <p:nvSpPr>
-          <p:cNvPr id="46" name="Rectangle 45"/>
-          <p:cNvSpPr/>
-          <p:nvPr userDrawn="1"/>
-        </p:nvSpPr>
-        <p:spPr>
-          <a:xfrm>
-            <a:off x="4381500" y="484707"/>
-            <a:ext cx="495300" cy="81280"/>
-          </a:xfrm>
-          <a:prstGeom prst="rect">
-            <a:avLst/>
-          </a:prstGeom>
-          <a:solidFill>
-            <a:schemeClr val="bg1"/>
-          </a:solidFill>
-          <a:ln>
-            <a:solidFill>
-              <a:schemeClr val="accent5">
-                <a:lumMod val="60000"/>
-                <a:lumOff val="40000"/>
-              </a:schemeClr>
-            </a:solidFill>
-          </a:ln>
-        </p:spPr>
-        <p:style>
-          <a:lnRef idx="2">
-            <a:schemeClr val="accent1">
-              <a:shade val="50000"/>
-            </a:schemeClr>
-          </a:lnRef>
-          <a:fillRef idx="1">
-            <a:schemeClr val="accent1"/>
-          </a:fillRef>
-          <a:effectRef idx="0">
-            <a:schemeClr val="accent1"/>
-          </a:effectRef>
-          <a:fontRef idx="minor">
-            <a:schemeClr val="lt1"/>
-          </a:fontRef>
-        </p:style>
-        <p:txBody>
-          <a:bodyPr rtlCol="0" anchor="t" anchorCtr="0"/>
-          <a:lstStyle/>
-          <a:p>
-            <a:endParaRPr lang="en-SG" sz="1400" b="1">
-              <a:solidFill>
-                <a:schemeClr val="accent5">
-                  <a:lumMod val="75000"/>
-                </a:schemeClr>
-              </a:solidFill>
-            </a:endParaRPr>
-          </a:p>
-        </p:txBody>
-      </p:sp>
+              </a:endParaRPr>
+            </a:p>
+          </p:txBody>
+        </p:sp>
+      </p:grpSp>
     </p:spTree>
   </p:cSld>
   <p:clrMap bg1="lt1" tx1="dk1" bg2="lt2" tx2="dk2" accent1="accent1" accent2="accent2" accent3="accent3" accent4="accent4" accent5="accent5" accent6="accent6" hlink="hlink" folHlink="folHlink"/>
@@ -3778,16 +3816,16 @@
       </p:sp>
       <p:sp>
         <p:nvSpPr>
-          <p:cNvPr id="166" name="Rectangle 165"/>
+          <p:cNvPr id="167" name="Isosceles Triangle 166"/>
           <p:cNvSpPr/>
           <p:nvPr/>
         </p:nvSpPr>
         <p:spPr>
           <a:xfrm>
-            <a:off x="5867400" y="1570037"/>
-            <a:ext cx="2133600" cy="304800"/>
-          </a:xfrm>
-          <a:prstGeom prst="rect">
+            <a:off x="6719582" y="1265237"/>
+            <a:ext cx="252000" cy="216000"/>
+          </a:xfrm>
+          <a:prstGeom prst="triangle">
             <a:avLst/>
           </a:prstGeom>
         </p:spPr>
@@ -3812,239 +3850,194 @@
           <a:lstStyle/>
           <a:p>
             <a:pPr algn="ctr"/>
-            <a:r>
-              <a:rPr lang="en-US" sz="1600" b="1" dirty="0" err="1" smtClean="0"/>
-              <a:t>EnrollException</a:t>
-            </a:r>
-            <a:r>
-              <a:rPr lang="en-US" sz="1600" b="1" dirty="0" smtClean="0"/>
-              <a:t> etc.</a:t>
-            </a:r>
-            <a:endParaRPr lang="en-SG" sz="1600" b="1" dirty="0"/>
-          </a:p>
-        </p:txBody>
-      </p:sp>
-      <p:sp>
-        <p:nvSpPr>
-          <p:cNvPr id="167" name="Isosceles Triangle 166"/>
-          <p:cNvSpPr/>
+            <a:endParaRPr lang="en-SG"/>
+          </a:p>
+        </p:txBody>
+      </p:sp>
+      <p:grpSp>
+        <p:nvGrpSpPr>
+          <p:cNvPr id="7" name="Group 6"/>
+          <p:cNvGrpSpPr/>
           <p:nvPr/>
-        </p:nvSpPr>
-        <p:spPr>
-          <a:xfrm>
-            <a:off x="6719582" y="1265237"/>
-            <a:ext cx="276225" cy="228600"/>
-          </a:xfrm>
-          <a:prstGeom prst="triangle">
-            <a:avLst/>
-          </a:prstGeom>
-        </p:spPr>
-        <p:style>
-          <a:lnRef idx="2">
-            <a:schemeClr val="accent2">
-              <a:shade val="50000"/>
-            </a:schemeClr>
-          </a:lnRef>
-          <a:fillRef idx="1">
-            <a:schemeClr val="accent2"/>
-          </a:fillRef>
-          <a:effectRef idx="0">
-            <a:schemeClr val="accent2"/>
-          </a:effectRef>
-          <a:fontRef idx="minor">
-            <a:schemeClr val="lt1"/>
-          </a:fontRef>
-        </p:style>
-        <p:txBody>
-          <a:bodyPr rtlCol="0" anchor="ctr"/>
-          <a:lstStyle/>
-          <a:p>
-            <a:pPr algn="ctr"/>
-            <a:endParaRPr lang="en-SG"/>
-          </a:p>
-        </p:txBody>
-      </p:sp>
-      <p:cxnSp>
-        <p:nvCxnSpPr>
-          <p:cNvPr id="168" name="Elbow Connector 167"/>
-          <p:cNvCxnSpPr>
-            <a:stCxn id="167" idx="3"/>
-            <a:endCxn id="169" idx="0"/>
-          </p:cNvCxnSpPr>
-          <p:nvPr/>
-        </p:nvCxnSpPr>
-        <p:spPr>
-          <a:xfrm rot="16200000" flipH="1">
-            <a:off x="6781647" y="1569884"/>
-            <a:ext cx="152400" cy="305"/>
-          </a:xfrm>
-          <a:prstGeom prst="bentConnector3">
-            <a:avLst>
-              <a:gd name="adj1" fmla="val 50000"/>
-            </a:avLst>
-          </a:prstGeom>
-          <a:ln w="19050">
-            <a:headEnd type="none" w="med" len="med"/>
-            <a:tailEnd type="none" w="med" len="med"/>
-          </a:ln>
-        </p:spPr>
-        <p:style>
-          <a:lnRef idx="2">
-            <a:schemeClr val="accent2">
-              <a:shade val="50000"/>
-            </a:schemeClr>
-          </a:lnRef>
-          <a:fillRef idx="1">
-            <a:schemeClr val="accent2"/>
-          </a:fillRef>
-          <a:effectRef idx="0">
-            <a:schemeClr val="accent2"/>
-          </a:effectRef>
-          <a:fontRef idx="minor">
-            <a:schemeClr val="lt1"/>
-          </a:fontRef>
-        </p:style>
-      </p:cxnSp>
-      <p:sp>
-        <p:nvSpPr>
-          <p:cNvPr id="169" name="Rectangle 168"/>
-          <p:cNvSpPr/>
-          <p:nvPr/>
-        </p:nvSpPr>
-        <p:spPr>
-          <a:xfrm>
-            <a:off x="5791200" y="1646237"/>
-            <a:ext cx="2133600" cy="304800"/>
-          </a:xfrm>
-          <a:prstGeom prst="rect">
-            <a:avLst/>
-          </a:prstGeom>
-        </p:spPr>
-        <p:style>
-          <a:lnRef idx="2">
-            <a:schemeClr val="accent2">
-              <a:shade val="50000"/>
-            </a:schemeClr>
-          </a:lnRef>
-          <a:fillRef idx="1">
-            <a:schemeClr val="accent2"/>
-          </a:fillRef>
-          <a:effectRef idx="0">
-            <a:schemeClr val="accent2"/>
-          </a:effectRef>
-          <a:fontRef idx="minor">
-            <a:schemeClr val="lt1"/>
-          </a:fontRef>
-        </p:style>
-        <p:txBody>
-          <a:bodyPr rtlCol="0" anchor="ctr"/>
-          <a:lstStyle/>
-          <a:p>
-            <a:pPr algn="ctr"/>
-            <a:r>
-              <a:rPr lang="en-US" sz="1600" b="1" dirty="0" err="1" smtClean="0"/>
-              <a:t>EnrollException</a:t>
-            </a:r>
-            <a:r>
-              <a:rPr lang="en-US" sz="1600" b="1" dirty="0" smtClean="0"/>
-              <a:t> etc.</a:t>
-            </a:r>
-            <a:endParaRPr lang="en-SG" sz="1600" b="1" dirty="0"/>
-          </a:p>
-        </p:txBody>
-      </p:sp>
-      <p:sp>
-        <p:nvSpPr>
-          <p:cNvPr id="170" name="Rectangle 169"/>
-          <p:cNvSpPr/>
-          <p:nvPr/>
-        </p:nvSpPr>
-        <p:spPr>
-          <a:xfrm>
-            <a:off x="5715000" y="1722437"/>
-            <a:ext cx="2133600" cy="304800"/>
-          </a:xfrm>
-          <a:prstGeom prst="rect">
-            <a:avLst/>
-          </a:prstGeom>
-        </p:spPr>
-        <p:style>
-          <a:lnRef idx="2">
-            <a:schemeClr val="accent2">
-              <a:shade val="50000"/>
-            </a:schemeClr>
-          </a:lnRef>
-          <a:fillRef idx="1">
-            <a:schemeClr val="accent2"/>
-          </a:fillRef>
-          <a:effectRef idx="0">
-            <a:schemeClr val="accent2"/>
-          </a:effectRef>
-          <a:fontRef idx="minor">
-            <a:schemeClr val="lt1"/>
-          </a:fontRef>
-        </p:style>
-        <p:txBody>
-          <a:bodyPr rtlCol="0" anchor="ctr"/>
-          <a:lstStyle/>
-          <a:p>
-            <a:pPr algn="ctr"/>
-            <a:r>
-              <a:rPr lang="en-US" sz="1600" b="1" dirty="0" err="1" smtClean="0"/>
-              <a:t>EnrollException</a:t>
-            </a:r>
-            <a:r>
-              <a:rPr lang="en-US" sz="1600" b="1" dirty="0" smtClean="0"/>
-              <a:t> etc.</a:t>
-            </a:r>
-            <a:endParaRPr lang="en-SG" sz="1600" b="1" dirty="0"/>
-          </a:p>
-        </p:txBody>
-      </p:sp>
-      <p:sp>
-        <p:nvSpPr>
-          <p:cNvPr id="171" name="Rectangle 170"/>
-          <p:cNvSpPr/>
-          <p:nvPr/>
-        </p:nvSpPr>
-        <p:spPr>
-          <a:xfrm>
-            <a:off x="609599" y="3250641"/>
-            <a:ext cx="1219201" cy="361770"/>
-          </a:xfrm>
-          <a:prstGeom prst="rect">
-            <a:avLst/>
-          </a:prstGeom>
-        </p:spPr>
-        <p:style>
-          <a:lnRef idx="2">
-            <a:schemeClr val="accent4">
-              <a:shade val="50000"/>
-            </a:schemeClr>
-          </a:lnRef>
-          <a:fillRef idx="1">
-            <a:schemeClr val="accent4"/>
-          </a:fillRef>
-          <a:effectRef idx="0">
-            <a:schemeClr val="accent4"/>
-          </a:effectRef>
-          <a:fontRef idx="minor">
-            <a:schemeClr val="lt1"/>
-          </a:fontRef>
-        </p:style>
-        <p:txBody>
-          <a:bodyPr rtlCol="0" anchor="ctr"/>
-          <a:lstStyle/>
-          <a:p>
-            <a:pPr algn="ctr"/>
-            <a:r>
-              <a:rPr lang="en-US" sz="1600" b="1" dirty="0" smtClean="0"/>
-              <a:t>*Type</a:t>
-            </a:r>
-            <a:endParaRPr lang="en-SG" sz="1600" b="1" dirty="0"/>
-          </a:p>
-        </p:txBody>
-      </p:sp>
+        </p:nvGrpSpPr>
+        <p:grpSpPr>
+          <a:xfrm>
+            <a:off x="5715000" y="1481237"/>
+            <a:ext cx="2286000" cy="546000"/>
+            <a:chOff x="5715000" y="1481237"/>
+            <a:chExt cx="2286000" cy="546000"/>
+          </a:xfrm>
+        </p:grpSpPr>
+        <p:sp>
+          <p:nvSpPr>
+            <p:cNvPr id="166" name="Rectangle 165"/>
+            <p:cNvSpPr/>
+            <p:nvPr/>
+          </p:nvSpPr>
+          <p:spPr>
+            <a:xfrm>
+              <a:off x="5867400" y="1570037"/>
+              <a:ext cx="2133600" cy="304800"/>
+            </a:xfrm>
+            <a:prstGeom prst="rect">
+              <a:avLst/>
+            </a:prstGeom>
+          </p:spPr>
+          <p:style>
+            <a:lnRef idx="2">
+              <a:schemeClr val="accent2">
+                <a:shade val="50000"/>
+              </a:schemeClr>
+            </a:lnRef>
+            <a:fillRef idx="1">
+              <a:schemeClr val="accent2"/>
+            </a:fillRef>
+            <a:effectRef idx="0">
+              <a:schemeClr val="accent2"/>
+            </a:effectRef>
+            <a:fontRef idx="minor">
+              <a:schemeClr val="lt1"/>
+            </a:fontRef>
+          </p:style>
+          <p:txBody>
+            <a:bodyPr rtlCol="0" anchor="ctr"/>
+            <a:lstStyle/>
+            <a:p>
+              <a:pPr algn="ctr"/>
+              <a:endParaRPr lang="en-SG" sz="1600" b="1" dirty="0"/>
+            </a:p>
+          </p:txBody>
+        </p:sp>
+        <p:cxnSp>
+          <p:nvCxnSpPr>
+            <p:cNvPr id="168" name="Elbow Connector 167"/>
+            <p:cNvCxnSpPr>
+              <a:stCxn id="167" idx="3"/>
+              <a:endCxn id="169" idx="0"/>
+            </p:cNvCxnSpPr>
+            <p:nvPr/>
+          </p:nvCxnSpPr>
+          <p:spPr>
+            <a:xfrm rot="16200000" flipH="1">
+              <a:off x="6763082" y="1563737"/>
+              <a:ext cx="165000" cy="0"/>
+            </a:xfrm>
+            <a:prstGeom prst="bentConnector3">
+              <a:avLst>
+                <a:gd name="adj1" fmla="val 50000"/>
+              </a:avLst>
+            </a:prstGeom>
+            <a:ln w="19050">
+              <a:headEnd type="none" w="med" len="med"/>
+              <a:tailEnd type="none" w="med" len="med"/>
+            </a:ln>
+          </p:spPr>
+          <p:style>
+            <a:lnRef idx="2">
+              <a:schemeClr val="accent2">
+                <a:shade val="50000"/>
+              </a:schemeClr>
+            </a:lnRef>
+            <a:fillRef idx="1">
+              <a:schemeClr val="accent2"/>
+            </a:fillRef>
+            <a:effectRef idx="0">
+              <a:schemeClr val="accent2"/>
+            </a:effectRef>
+            <a:fontRef idx="minor">
+              <a:schemeClr val="lt1"/>
+            </a:fontRef>
+          </p:style>
+        </p:cxnSp>
+        <p:sp>
+          <p:nvSpPr>
+            <p:cNvPr id="169" name="Rectangle 168"/>
+            <p:cNvSpPr/>
+            <p:nvPr/>
+          </p:nvSpPr>
+          <p:spPr>
+            <a:xfrm>
+              <a:off x="5791200" y="1646237"/>
+              <a:ext cx="2133600" cy="304800"/>
+            </a:xfrm>
+            <a:prstGeom prst="rect">
+              <a:avLst/>
+            </a:prstGeom>
+          </p:spPr>
+          <p:style>
+            <a:lnRef idx="2">
+              <a:schemeClr val="accent2">
+                <a:shade val="50000"/>
+              </a:schemeClr>
+            </a:lnRef>
+            <a:fillRef idx="1">
+              <a:schemeClr val="accent2"/>
+            </a:fillRef>
+            <a:effectRef idx="0">
+              <a:schemeClr val="accent2"/>
+            </a:effectRef>
+            <a:fontRef idx="minor">
+              <a:schemeClr val="lt1"/>
+            </a:fontRef>
+          </p:style>
+          <p:txBody>
+            <a:bodyPr rtlCol="0" anchor="ctr"/>
+            <a:lstStyle/>
+            <a:p>
+              <a:pPr algn="ctr"/>
+              <a:endParaRPr lang="en-SG" sz="1600" b="1" dirty="0"/>
+            </a:p>
+          </p:txBody>
+        </p:sp>
+        <p:sp>
+          <p:nvSpPr>
+            <p:cNvPr id="170" name="Rectangle 169"/>
+            <p:cNvSpPr/>
+            <p:nvPr/>
+          </p:nvSpPr>
+          <p:spPr>
+            <a:xfrm>
+              <a:off x="5715000" y="1722437"/>
+              <a:ext cx="2133600" cy="304800"/>
+            </a:xfrm>
+            <a:prstGeom prst="rect">
+              <a:avLst/>
+            </a:prstGeom>
+          </p:spPr>
+          <p:style>
+            <a:lnRef idx="2">
+              <a:schemeClr val="accent2">
+                <a:shade val="50000"/>
+              </a:schemeClr>
+            </a:lnRef>
+            <a:fillRef idx="1">
+              <a:schemeClr val="accent2"/>
+            </a:fillRef>
+            <a:effectRef idx="0">
+              <a:schemeClr val="accent2"/>
+            </a:effectRef>
+            <a:fontRef idx="minor">
+              <a:schemeClr val="lt1"/>
+            </a:fontRef>
+          </p:style>
+          <p:txBody>
+            <a:bodyPr rtlCol="0" anchor="ctr"/>
+            <a:lstStyle/>
+            <a:p>
+              <a:pPr algn="ctr"/>
+              <a:r>
+                <a:rPr lang="en-US" sz="1600" b="1" dirty="0" err="1" smtClean="0"/>
+                <a:t>EnrollException</a:t>
+              </a:r>
+              <a:r>
+                <a:rPr lang="en-US" sz="1600" b="1" dirty="0" smtClean="0"/>
+                <a:t> etc.</a:t>
+              </a:r>
+              <a:endParaRPr lang="en-SG" sz="1600" b="1" dirty="0"/>
+            </a:p>
+          </p:txBody>
+        </p:sp>
+      </p:grpSp>
       <p:sp>
         <p:nvSpPr>
           <p:cNvPr id="35" name="Rectangle 34"/>
@@ -4082,8 +4075,8 @@
           <a:p>
             <a:pPr algn="ctr"/>
             <a:r>
-              <a:rPr lang="en-US" sz="1600" b="1" dirty="0" err="1" smtClean="0"/>
-              <a:t>EmailTemplates</a:t>
+              <a:rPr lang="en-SG" sz="1600" b="1" dirty="0" smtClean="0"/>
+              <a:t>Logger</a:t>
             </a:r>
             <a:endParaRPr lang="en-SG" sz="1600" b="1" dirty="0"/>
           </a:p>
@@ -4141,8 +4134,8 @@
         </p:nvSpPr>
         <p:spPr>
           <a:xfrm>
-            <a:off x="5277256" y="2553649"/>
-            <a:ext cx="1585823" cy="361770"/>
+            <a:off x="5237742" y="2553649"/>
+            <a:ext cx="1944000" cy="360000"/>
           </a:xfrm>
           <a:prstGeom prst="rect">
             <a:avLst/>
@@ -4185,8 +4178,8 @@
         </p:nvSpPr>
         <p:spPr>
           <a:xfrm>
-            <a:off x="5932054" y="2941637"/>
-            <a:ext cx="276225" cy="228600"/>
+            <a:off x="6088542" y="2941637"/>
+            <a:ext cx="216000" cy="216000"/>
           </a:xfrm>
           <a:prstGeom prst="triangle">
             <a:avLst/>
@@ -4227,8 +4220,8 @@
         </p:nvSpPr>
         <p:spPr>
           <a:xfrm>
-            <a:off x="3810000" y="4150546"/>
-            <a:ext cx="1944758" cy="361770"/>
+            <a:off x="3942342" y="4150546"/>
+            <a:ext cx="1944758" cy="360000"/>
           </a:xfrm>
           <a:prstGeom prst="rect">
             <a:avLst/>
@@ -4272,8 +4265,8 @@
         </p:nvSpPr>
         <p:spPr>
           <a:xfrm>
-            <a:off x="6381858" y="3249302"/>
-            <a:ext cx="2130157" cy="361770"/>
+            <a:off x="6514200" y="3246437"/>
+            <a:ext cx="1944000" cy="360000"/>
           </a:xfrm>
           <a:prstGeom prst="rect">
             <a:avLst/>
@@ -4316,8 +4309,8 @@
         </p:nvSpPr>
         <p:spPr>
           <a:xfrm>
-            <a:off x="3810000" y="3700011"/>
-            <a:ext cx="1944758" cy="361770"/>
+            <a:off x="3942342" y="3700011"/>
+            <a:ext cx="1944758" cy="360000"/>
           </a:xfrm>
           <a:prstGeom prst="rect">
             <a:avLst/>
@@ -4360,8 +4353,8 @@
         </p:nvSpPr>
         <p:spPr>
           <a:xfrm>
-            <a:off x="6378780" y="3700663"/>
-            <a:ext cx="2136314" cy="361770"/>
+            <a:off x="6511122" y="3700663"/>
+            <a:ext cx="1944000" cy="360000"/>
           </a:xfrm>
           <a:prstGeom prst="rect">
             <a:avLst/>
@@ -4403,8 +4396,8 @@
         </p:nvSpPr>
         <p:spPr>
           <a:xfrm>
-            <a:off x="6378780" y="4150546"/>
-            <a:ext cx="2130157" cy="361770"/>
+            <a:off x="6511122" y="4150546"/>
+            <a:ext cx="1944000" cy="360000"/>
           </a:xfrm>
           <a:prstGeom prst="rect">
             <a:avLst/>
@@ -4448,8 +4441,8 @@
         </p:nvSpPr>
         <p:spPr>
           <a:xfrm>
-            <a:off x="3810000" y="3246437"/>
-            <a:ext cx="1944758" cy="361770"/>
+            <a:off x="3942342" y="3246437"/>
+            <a:ext cx="1944758" cy="360000"/>
           </a:xfrm>
           <a:prstGeom prst="rect">
             <a:avLst/>
@@ -4496,8 +4489,8 @@
         </p:nvCxnSpPr>
         <p:spPr>
           <a:xfrm rot="5400000">
-            <a:off x="5783921" y="3141075"/>
-            <a:ext cx="257085" cy="315409"/>
+            <a:off x="5907421" y="3137316"/>
+            <a:ext cx="268800" cy="309442"/>
           </a:xfrm>
           <a:prstGeom prst="bentConnector2">
             <a:avLst/>
@@ -4531,8 +4524,8 @@
         </p:nvCxnSpPr>
         <p:spPr>
           <a:xfrm rot="5400000">
-            <a:off x="5557134" y="3367862"/>
-            <a:ext cx="710659" cy="315409"/>
+            <a:off x="5680634" y="3364103"/>
+            <a:ext cx="722374" cy="309442"/>
           </a:xfrm>
           <a:prstGeom prst="bentConnector2">
             <a:avLst/>
@@ -4566,8 +4559,8 @@
         </p:nvCxnSpPr>
         <p:spPr>
           <a:xfrm rot="5400000">
-            <a:off x="5331866" y="3593130"/>
-            <a:ext cx="1161194" cy="315409"/>
+            <a:off x="5455367" y="3589370"/>
+            <a:ext cx="1172909" cy="309442"/>
           </a:xfrm>
           <a:prstGeom prst="bentConnector2">
             <a:avLst/>
@@ -4601,8 +4594,8 @@
         </p:nvCxnSpPr>
         <p:spPr>
           <a:xfrm rot="16200000" flipH="1">
-            <a:off x="6096037" y="3144366"/>
-            <a:ext cx="259950" cy="311691"/>
+            <a:off x="6220971" y="3133208"/>
+            <a:ext cx="268800" cy="317658"/>
           </a:xfrm>
           <a:prstGeom prst="bentConnector2">
             <a:avLst/>
@@ -4636,8 +4629,8 @@
         </p:nvCxnSpPr>
         <p:spPr>
           <a:xfrm rot="16200000" flipH="1">
-            <a:off x="5868818" y="3371585"/>
-            <a:ext cx="711311" cy="308613"/>
+            <a:off x="5992319" y="3361860"/>
+            <a:ext cx="723026" cy="314580"/>
           </a:xfrm>
           <a:prstGeom prst="bentConnector2">
             <a:avLst/>
@@ -4671,8 +4664,8 @@
         </p:nvCxnSpPr>
         <p:spPr>
           <a:xfrm rot="16200000" flipH="1">
-            <a:off x="5643876" y="3596527"/>
-            <a:ext cx="1161194" cy="308613"/>
+            <a:off x="5767378" y="3586801"/>
+            <a:ext cx="1172909" cy="314580"/>
           </a:xfrm>
           <a:prstGeom prst="bentConnector2">
             <a:avLst/>
@@ -4695,416 +4688,572 @@
           </a:fontRef>
         </p:style>
       </p:cxnSp>
-      <p:sp>
-        <p:nvSpPr>
-          <p:cNvPr id="70" name="Rectangle 69"/>
+      <p:grpSp>
+        <p:nvGrpSpPr>
+          <p:cNvPr id="2" name="Group 1"/>
+          <p:cNvGrpSpPr/>
+          <p:nvPr/>
+        </p:nvGrpSpPr>
+        <p:grpSpPr>
+          <a:xfrm>
+            <a:off x="595006" y="3958960"/>
+            <a:ext cx="1321344" cy="458962"/>
+            <a:chOff x="595006" y="3958960"/>
+            <a:chExt cx="1321344" cy="458962"/>
+          </a:xfrm>
+        </p:grpSpPr>
+        <p:sp>
+          <p:nvSpPr>
+            <p:cNvPr id="70" name="Rectangle 69"/>
+            <p:cNvSpPr/>
+            <p:nvPr/>
+          </p:nvSpPr>
+          <p:spPr>
+            <a:xfrm>
+              <a:off x="595006" y="3958960"/>
+              <a:ext cx="1219200" cy="361770"/>
+            </a:xfrm>
+            <a:prstGeom prst="rect">
+              <a:avLst/>
+            </a:prstGeom>
+          </p:spPr>
+          <p:style>
+            <a:lnRef idx="2">
+              <a:schemeClr val="accent5">
+                <a:shade val="50000"/>
+              </a:schemeClr>
+            </a:lnRef>
+            <a:fillRef idx="1">
+              <a:schemeClr val="accent5"/>
+            </a:fillRef>
+            <a:effectRef idx="0">
+              <a:schemeClr val="accent5"/>
+            </a:effectRef>
+            <a:fontRef idx="minor">
+              <a:schemeClr val="lt1"/>
+            </a:fontRef>
+          </p:style>
+          <p:txBody>
+            <a:bodyPr rtlCol="0" anchor="ctr"/>
+            <a:lstStyle/>
+            <a:p>
+              <a:pPr algn="ctr"/>
+              <a:endParaRPr lang="en-SG" sz="1600" b="1" dirty="0"/>
+            </a:p>
+          </p:txBody>
+        </p:sp>
+        <p:sp>
+          <p:nvSpPr>
+            <p:cNvPr id="72" name="Rectangle 71"/>
+            <p:cNvSpPr/>
+            <p:nvPr/>
+          </p:nvSpPr>
+          <p:spPr>
+            <a:xfrm>
+              <a:off x="643647" y="4007556"/>
+              <a:ext cx="1219200" cy="361770"/>
+            </a:xfrm>
+            <a:prstGeom prst="rect">
+              <a:avLst/>
+            </a:prstGeom>
+          </p:spPr>
+          <p:style>
+            <a:lnRef idx="2">
+              <a:schemeClr val="accent5">
+                <a:shade val="50000"/>
+              </a:schemeClr>
+            </a:lnRef>
+            <a:fillRef idx="1">
+              <a:schemeClr val="accent5"/>
+            </a:fillRef>
+            <a:effectRef idx="0">
+              <a:schemeClr val="accent5"/>
+            </a:effectRef>
+            <a:fontRef idx="minor">
+              <a:schemeClr val="lt1"/>
+            </a:fontRef>
+          </p:style>
+          <p:txBody>
+            <a:bodyPr rtlCol="0" anchor="ctr"/>
+            <a:lstStyle/>
+            <a:p>
+              <a:pPr algn="ctr"/>
+              <a:endParaRPr lang="en-SG" sz="1600" b="1" dirty="0"/>
+            </a:p>
+          </p:txBody>
+        </p:sp>
+        <p:sp>
+          <p:nvSpPr>
+            <p:cNvPr id="73" name="Rectangle 72"/>
+            <p:cNvSpPr/>
+            <p:nvPr/>
+          </p:nvSpPr>
+          <p:spPr>
+            <a:xfrm>
+              <a:off x="697150" y="4056152"/>
+              <a:ext cx="1219200" cy="361770"/>
+            </a:xfrm>
+            <a:prstGeom prst="rect">
+              <a:avLst/>
+            </a:prstGeom>
+          </p:spPr>
+          <p:style>
+            <a:lnRef idx="2">
+              <a:schemeClr val="accent5">
+                <a:shade val="50000"/>
+              </a:schemeClr>
+            </a:lnRef>
+            <a:fillRef idx="1">
+              <a:schemeClr val="accent5"/>
+            </a:fillRef>
+            <a:effectRef idx="0">
+              <a:schemeClr val="accent5"/>
+            </a:effectRef>
+            <a:fontRef idx="minor">
+              <a:schemeClr val="lt1"/>
+            </a:fontRef>
+          </p:style>
+          <p:txBody>
+            <a:bodyPr rtlCol="0" anchor="ctr"/>
+            <a:lstStyle/>
+            <a:p>
+              <a:pPr algn="ctr"/>
+              <a:r>
+                <a:rPr lang="en-US" sz="1600" b="1" dirty="0" smtClean="0"/>
+                <a:t>*Bundle</a:t>
+              </a:r>
+              <a:endParaRPr lang="en-SG" sz="1600" b="1" dirty="0"/>
+            </a:p>
+          </p:txBody>
+        </p:sp>
+      </p:grpSp>
+      <p:grpSp>
+        <p:nvGrpSpPr>
+          <p:cNvPr id="4" name="Group 3"/>
+          <p:cNvGrpSpPr/>
+          <p:nvPr/>
+        </p:nvGrpSpPr>
+        <p:grpSpPr>
+          <a:xfrm>
+            <a:off x="2174133" y="3246437"/>
+            <a:ext cx="1321344" cy="458962"/>
+            <a:chOff x="2174133" y="3246437"/>
+            <a:chExt cx="1321344" cy="458962"/>
+          </a:xfrm>
+        </p:grpSpPr>
+        <p:sp>
+          <p:nvSpPr>
+            <p:cNvPr id="74" name="Rectangle 73"/>
+            <p:cNvSpPr/>
+            <p:nvPr/>
+          </p:nvSpPr>
+          <p:spPr>
+            <a:xfrm>
+              <a:off x="2174133" y="3246437"/>
+              <a:ext cx="1219200" cy="361770"/>
+            </a:xfrm>
+            <a:prstGeom prst="rect">
+              <a:avLst/>
+            </a:prstGeom>
+          </p:spPr>
+          <p:style>
+            <a:lnRef idx="2">
+              <a:schemeClr val="accent5">
+                <a:shade val="50000"/>
+              </a:schemeClr>
+            </a:lnRef>
+            <a:fillRef idx="1">
+              <a:schemeClr val="accent5"/>
+            </a:fillRef>
+            <a:effectRef idx="0">
+              <a:schemeClr val="accent5"/>
+            </a:effectRef>
+            <a:fontRef idx="minor">
+              <a:schemeClr val="lt1"/>
+            </a:fontRef>
+          </p:style>
+          <p:txBody>
+            <a:bodyPr rtlCol="0" anchor="ctr"/>
+            <a:lstStyle/>
+            <a:p>
+              <a:pPr algn="ctr"/>
+              <a:endParaRPr lang="en-SG" sz="1600" b="1" dirty="0"/>
+            </a:p>
+          </p:txBody>
+        </p:sp>
+        <p:sp>
+          <p:nvSpPr>
+            <p:cNvPr id="75" name="Rectangle 74"/>
+            <p:cNvSpPr/>
+            <p:nvPr/>
+          </p:nvSpPr>
+          <p:spPr>
+            <a:xfrm>
+              <a:off x="2222774" y="3295033"/>
+              <a:ext cx="1219200" cy="361770"/>
+            </a:xfrm>
+            <a:prstGeom prst="rect">
+              <a:avLst/>
+            </a:prstGeom>
+          </p:spPr>
+          <p:style>
+            <a:lnRef idx="2">
+              <a:schemeClr val="accent5">
+                <a:shade val="50000"/>
+              </a:schemeClr>
+            </a:lnRef>
+            <a:fillRef idx="1">
+              <a:schemeClr val="accent5"/>
+            </a:fillRef>
+            <a:effectRef idx="0">
+              <a:schemeClr val="accent5"/>
+            </a:effectRef>
+            <a:fontRef idx="minor">
+              <a:schemeClr val="lt1"/>
+            </a:fontRef>
+          </p:style>
+          <p:txBody>
+            <a:bodyPr rtlCol="0" anchor="ctr"/>
+            <a:lstStyle/>
+            <a:p>
+              <a:pPr algn="ctr"/>
+              <a:endParaRPr lang="en-SG" sz="1600" b="1" dirty="0"/>
+            </a:p>
+          </p:txBody>
+        </p:sp>
+        <p:sp>
+          <p:nvSpPr>
+            <p:cNvPr id="76" name="Rectangle 75"/>
+            <p:cNvSpPr/>
+            <p:nvPr/>
+          </p:nvSpPr>
+          <p:spPr>
+            <a:xfrm>
+              <a:off x="2276277" y="3343629"/>
+              <a:ext cx="1219200" cy="361770"/>
+            </a:xfrm>
+            <a:prstGeom prst="rect">
+              <a:avLst/>
+            </a:prstGeom>
+          </p:spPr>
+          <p:style>
+            <a:lnRef idx="2">
+              <a:schemeClr val="accent5">
+                <a:shade val="50000"/>
+              </a:schemeClr>
+            </a:lnRef>
+            <a:fillRef idx="1">
+              <a:schemeClr val="accent5"/>
+            </a:fillRef>
+            <a:effectRef idx="0">
+              <a:schemeClr val="accent5"/>
+            </a:effectRef>
+            <a:fontRef idx="minor">
+              <a:schemeClr val="lt1"/>
+            </a:fontRef>
+          </p:style>
+          <p:txBody>
+            <a:bodyPr rtlCol="0" anchor="ctr"/>
+            <a:lstStyle/>
+            <a:p>
+              <a:pPr algn="ctr"/>
+              <a:r>
+                <a:rPr lang="en-US" sz="1600" b="1" dirty="0" smtClean="0"/>
+                <a:t>*Stats</a:t>
+              </a:r>
+              <a:endParaRPr lang="en-SG" sz="1600" b="1" dirty="0"/>
+            </a:p>
+          </p:txBody>
+        </p:sp>
+      </p:grpSp>
+      <p:grpSp>
+        <p:nvGrpSpPr>
+          <p:cNvPr id="5" name="Group 4"/>
+          <p:cNvGrpSpPr/>
+          <p:nvPr/>
+        </p:nvGrpSpPr>
+        <p:grpSpPr>
+          <a:xfrm>
+            <a:off x="2174133" y="4007556"/>
+            <a:ext cx="1321344" cy="458962"/>
+            <a:chOff x="2174133" y="4007556"/>
+            <a:chExt cx="1321344" cy="458962"/>
+          </a:xfrm>
+        </p:grpSpPr>
+        <p:sp>
+          <p:nvSpPr>
+            <p:cNvPr id="77" name="Rectangle 76"/>
+            <p:cNvSpPr/>
+            <p:nvPr/>
+          </p:nvSpPr>
+          <p:spPr>
+            <a:xfrm>
+              <a:off x="2174133" y="4007556"/>
+              <a:ext cx="1219200" cy="361770"/>
+            </a:xfrm>
+            <a:prstGeom prst="rect">
+              <a:avLst/>
+            </a:prstGeom>
+          </p:spPr>
+          <p:style>
+            <a:lnRef idx="2">
+              <a:schemeClr val="accent5">
+                <a:shade val="50000"/>
+              </a:schemeClr>
+            </a:lnRef>
+            <a:fillRef idx="1">
+              <a:schemeClr val="accent5"/>
+            </a:fillRef>
+            <a:effectRef idx="0">
+              <a:schemeClr val="accent5"/>
+            </a:effectRef>
+            <a:fontRef idx="minor">
+              <a:schemeClr val="lt1"/>
+            </a:fontRef>
+          </p:style>
+          <p:txBody>
+            <a:bodyPr rtlCol="0" anchor="ctr"/>
+            <a:lstStyle/>
+            <a:p>
+              <a:pPr algn="ctr"/>
+              <a:endParaRPr lang="en-SG" sz="1600" b="1" dirty="0"/>
+            </a:p>
+          </p:txBody>
+        </p:sp>
+        <p:sp>
+          <p:nvSpPr>
+            <p:cNvPr id="78" name="Rectangle 77"/>
+            <p:cNvSpPr/>
+            <p:nvPr/>
+          </p:nvSpPr>
+          <p:spPr>
+            <a:xfrm>
+              <a:off x="2222774" y="4056152"/>
+              <a:ext cx="1219200" cy="361770"/>
+            </a:xfrm>
+            <a:prstGeom prst="rect">
+              <a:avLst/>
+            </a:prstGeom>
+          </p:spPr>
+          <p:style>
+            <a:lnRef idx="2">
+              <a:schemeClr val="accent5">
+                <a:shade val="50000"/>
+              </a:schemeClr>
+            </a:lnRef>
+            <a:fillRef idx="1">
+              <a:schemeClr val="accent5"/>
+            </a:fillRef>
+            <a:effectRef idx="0">
+              <a:schemeClr val="accent5"/>
+            </a:effectRef>
+            <a:fontRef idx="minor">
+              <a:schemeClr val="lt1"/>
+            </a:fontRef>
+          </p:style>
+          <p:txBody>
+            <a:bodyPr rtlCol="0" anchor="ctr"/>
+            <a:lstStyle/>
+            <a:p>
+              <a:pPr algn="ctr"/>
+              <a:endParaRPr lang="en-SG" sz="1600" b="1" dirty="0"/>
+            </a:p>
+          </p:txBody>
+        </p:sp>
+        <p:sp>
+          <p:nvSpPr>
+            <p:cNvPr id="79" name="Rectangle 78"/>
+            <p:cNvSpPr/>
+            <p:nvPr/>
+          </p:nvSpPr>
+          <p:spPr>
+            <a:xfrm>
+              <a:off x="2276277" y="4104748"/>
+              <a:ext cx="1219200" cy="361770"/>
+            </a:xfrm>
+            <a:prstGeom prst="rect">
+              <a:avLst/>
+            </a:prstGeom>
+          </p:spPr>
+          <p:style>
+            <a:lnRef idx="2">
+              <a:schemeClr val="accent5">
+                <a:shade val="50000"/>
+              </a:schemeClr>
+            </a:lnRef>
+            <a:fillRef idx="1">
+              <a:schemeClr val="accent5"/>
+            </a:fillRef>
+            <a:effectRef idx="0">
+              <a:schemeClr val="accent5"/>
+            </a:effectRef>
+            <a:fontRef idx="minor">
+              <a:schemeClr val="lt1"/>
+            </a:fontRef>
+          </p:style>
+          <p:txBody>
+            <a:bodyPr rtlCol="0" anchor="ctr"/>
+            <a:lstStyle/>
+            <a:p>
+              <a:pPr algn="ctr"/>
+              <a:r>
+                <a:rPr lang="en-US" sz="1600" b="1" dirty="0" smtClean="0"/>
+                <a:t>*Summary</a:t>
+              </a:r>
+              <a:endParaRPr lang="en-SG" sz="1600" b="1" dirty="0"/>
+            </a:p>
+          </p:txBody>
+        </p:sp>
+      </p:grpSp>
+      <p:grpSp>
+        <p:nvGrpSpPr>
+          <p:cNvPr id="11" name="Group 10"/>
+          <p:cNvGrpSpPr/>
+          <p:nvPr/>
+        </p:nvGrpSpPr>
+        <p:grpSpPr>
+          <a:xfrm>
+            <a:off x="3162298" y="1593273"/>
+            <a:ext cx="1600200" cy="433964"/>
+            <a:chOff x="3162298" y="1593273"/>
+            <a:chExt cx="1600200" cy="433964"/>
+          </a:xfrm>
+        </p:grpSpPr>
+        <p:sp>
+          <p:nvSpPr>
+            <p:cNvPr id="39" name="Rectangle 38"/>
+            <p:cNvSpPr/>
+            <p:nvPr/>
+          </p:nvSpPr>
+          <p:spPr>
+            <a:xfrm>
+              <a:off x="3303639" y="1593273"/>
+              <a:ext cx="1458859" cy="304800"/>
+            </a:xfrm>
+            <a:prstGeom prst="rect">
+              <a:avLst/>
+            </a:prstGeom>
+          </p:spPr>
+          <p:style>
+            <a:lnRef idx="2">
+              <a:schemeClr val="accent3">
+                <a:shade val="50000"/>
+              </a:schemeClr>
+            </a:lnRef>
+            <a:fillRef idx="1">
+              <a:schemeClr val="accent3"/>
+            </a:fillRef>
+            <a:effectRef idx="0">
+              <a:schemeClr val="accent3"/>
+            </a:effectRef>
+            <a:fontRef idx="minor">
+              <a:schemeClr val="lt1"/>
+            </a:fontRef>
+          </p:style>
+          <p:txBody>
+            <a:bodyPr rtlCol="0" anchor="ctr"/>
+            <a:lstStyle/>
+            <a:p>
+              <a:pPr algn="ctr"/>
+              <a:endParaRPr lang="en-SG" sz="1600" b="1" dirty="0"/>
+            </a:p>
+          </p:txBody>
+        </p:sp>
+        <p:sp>
+          <p:nvSpPr>
+            <p:cNvPr id="40" name="Rectangle 39"/>
+            <p:cNvSpPr/>
+            <p:nvPr/>
+          </p:nvSpPr>
+          <p:spPr>
+            <a:xfrm>
+              <a:off x="3227439" y="1667019"/>
+              <a:ext cx="1458859" cy="304800"/>
+            </a:xfrm>
+            <a:prstGeom prst="rect">
+              <a:avLst/>
+            </a:prstGeom>
+          </p:spPr>
+          <p:style>
+            <a:lnRef idx="2">
+              <a:schemeClr val="accent3">
+                <a:shade val="50000"/>
+              </a:schemeClr>
+            </a:lnRef>
+            <a:fillRef idx="1">
+              <a:schemeClr val="accent3"/>
+            </a:fillRef>
+            <a:effectRef idx="0">
+              <a:schemeClr val="accent3"/>
+            </a:effectRef>
+            <a:fontRef idx="minor">
+              <a:schemeClr val="lt1"/>
+            </a:fontRef>
+          </p:style>
+          <p:txBody>
+            <a:bodyPr rtlCol="0" anchor="ctr"/>
+            <a:lstStyle/>
+            <a:p>
+              <a:pPr algn="ctr"/>
+              <a:endParaRPr lang="en-SG" sz="1600" b="1" dirty="0"/>
+            </a:p>
+          </p:txBody>
+        </p:sp>
+        <p:sp>
+          <p:nvSpPr>
+            <p:cNvPr id="41" name="Rectangle 40"/>
+            <p:cNvSpPr/>
+            <p:nvPr/>
+          </p:nvSpPr>
+          <p:spPr>
+            <a:xfrm>
+              <a:off x="3162298" y="1722437"/>
+              <a:ext cx="1458859" cy="304800"/>
+            </a:xfrm>
+            <a:prstGeom prst="rect">
+              <a:avLst/>
+            </a:prstGeom>
+          </p:spPr>
+          <p:style>
+            <a:lnRef idx="2">
+              <a:schemeClr val="accent3">
+                <a:shade val="50000"/>
+              </a:schemeClr>
+            </a:lnRef>
+            <a:fillRef idx="1">
+              <a:schemeClr val="accent3"/>
+            </a:fillRef>
+            <a:effectRef idx="0">
+              <a:schemeClr val="accent3"/>
+            </a:effectRef>
+            <a:fontRef idx="minor">
+              <a:schemeClr val="lt1"/>
+            </a:fontRef>
+          </p:style>
+          <p:txBody>
+            <a:bodyPr rtlCol="0" anchor="ctr"/>
+            <a:lstStyle/>
+            <a:p>
+              <a:pPr algn="ctr"/>
+              <a:r>
+                <a:rPr lang="en-US" sz="1600" b="1" dirty="0" smtClean="0"/>
+                <a:t>*Helper</a:t>
+              </a:r>
+              <a:endParaRPr lang="en-SG" sz="1600" b="1" dirty="0"/>
+            </a:p>
+          </p:txBody>
+        </p:sp>
+      </p:grpSp>
+      <p:sp>
+        <p:nvSpPr>
+          <p:cNvPr id="42" name="Rectangle 41"/>
           <p:cNvSpPr/>
           <p:nvPr/>
         </p:nvSpPr>
         <p:spPr>
           <a:xfrm>
-            <a:off x="595006" y="3958960"/>
-            <a:ext cx="1219200" cy="361770"/>
-          </a:xfrm>
-          <a:prstGeom prst="rect">
-            <a:avLst/>
-          </a:prstGeom>
-        </p:spPr>
-        <p:style>
-          <a:lnRef idx="2">
-            <a:schemeClr val="accent5">
-              <a:shade val="50000"/>
-            </a:schemeClr>
-          </a:lnRef>
-          <a:fillRef idx="1">
-            <a:schemeClr val="accent5"/>
-          </a:fillRef>
-          <a:effectRef idx="0">
-            <a:schemeClr val="accent5"/>
-          </a:effectRef>
-          <a:fontRef idx="minor">
-            <a:schemeClr val="lt1"/>
-          </a:fontRef>
-        </p:style>
-        <p:txBody>
-          <a:bodyPr rtlCol="0" anchor="ctr"/>
-          <a:lstStyle/>
-          <a:p>
-            <a:pPr algn="ctr"/>
-            <a:r>
-              <a:rPr lang="en-US" sz="1600" b="1" dirty="0" smtClean="0"/>
-              <a:t>*Bundle</a:t>
-            </a:r>
-            <a:endParaRPr lang="en-SG" sz="1600" b="1" dirty="0"/>
-          </a:p>
-        </p:txBody>
-      </p:sp>
-      <p:sp>
-        <p:nvSpPr>
-          <p:cNvPr id="72" name="Rectangle 71"/>
-          <p:cNvSpPr/>
-          <p:nvPr/>
-        </p:nvSpPr>
-        <p:spPr>
-          <a:xfrm>
-            <a:off x="643647" y="4007556"/>
-            <a:ext cx="1219200" cy="361770"/>
-          </a:xfrm>
-          <a:prstGeom prst="rect">
-            <a:avLst/>
-          </a:prstGeom>
-        </p:spPr>
-        <p:style>
-          <a:lnRef idx="2">
-            <a:schemeClr val="accent5">
-              <a:shade val="50000"/>
-            </a:schemeClr>
-          </a:lnRef>
-          <a:fillRef idx="1">
-            <a:schemeClr val="accent5"/>
-          </a:fillRef>
-          <a:effectRef idx="0">
-            <a:schemeClr val="accent5"/>
-          </a:effectRef>
-          <a:fontRef idx="minor">
-            <a:schemeClr val="lt1"/>
-          </a:fontRef>
-        </p:style>
-        <p:txBody>
-          <a:bodyPr rtlCol="0" anchor="ctr"/>
-          <a:lstStyle/>
-          <a:p>
-            <a:pPr algn="ctr"/>
-            <a:r>
-              <a:rPr lang="en-US" sz="1600" b="1" dirty="0" smtClean="0"/>
-              <a:t>*Bundle</a:t>
-            </a:r>
-            <a:endParaRPr lang="en-SG" sz="1600" b="1" dirty="0"/>
-          </a:p>
-        </p:txBody>
-      </p:sp>
-      <p:sp>
-        <p:nvSpPr>
-          <p:cNvPr id="73" name="Rectangle 72"/>
-          <p:cNvSpPr/>
-          <p:nvPr/>
-        </p:nvSpPr>
-        <p:spPr>
-          <a:xfrm>
-            <a:off x="697150" y="4056152"/>
-            <a:ext cx="1219200" cy="361770"/>
-          </a:xfrm>
-          <a:prstGeom prst="rect">
-            <a:avLst/>
-          </a:prstGeom>
-        </p:spPr>
-        <p:style>
-          <a:lnRef idx="2">
-            <a:schemeClr val="accent5">
-              <a:shade val="50000"/>
-            </a:schemeClr>
-          </a:lnRef>
-          <a:fillRef idx="1">
-            <a:schemeClr val="accent5"/>
-          </a:fillRef>
-          <a:effectRef idx="0">
-            <a:schemeClr val="accent5"/>
-          </a:effectRef>
-          <a:fontRef idx="minor">
-            <a:schemeClr val="lt1"/>
-          </a:fontRef>
-        </p:style>
-        <p:txBody>
-          <a:bodyPr rtlCol="0" anchor="ctr"/>
-          <a:lstStyle/>
-          <a:p>
-            <a:pPr algn="ctr"/>
-            <a:r>
-              <a:rPr lang="en-US" sz="1600" b="1" dirty="0" smtClean="0"/>
-              <a:t>*Bundle</a:t>
-            </a:r>
-            <a:endParaRPr lang="en-SG" sz="1600" b="1" dirty="0"/>
-          </a:p>
-        </p:txBody>
-      </p:sp>
-      <p:sp>
-        <p:nvSpPr>
-          <p:cNvPr id="74" name="Rectangle 73"/>
-          <p:cNvSpPr/>
-          <p:nvPr/>
-        </p:nvSpPr>
-        <p:spPr>
-          <a:xfrm>
-            <a:off x="2174133" y="3246437"/>
-            <a:ext cx="1219200" cy="361770"/>
-          </a:xfrm>
-          <a:prstGeom prst="rect">
-            <a:avLst/>
-          </a:prstGeom>
-        </p:spPr>
-        <p:style>
-          <a:lnRef idx="2">
-            <a:schemeClr val="accent5">
-              <a:shade val="50000"/>
-            </a:schemeClr>
-          </a:lnRef>
-          <a:fillRef idx="1">
-            <a:schemeClr val="accent5"/>
-          </a:fillRef>
-          <a:effectRef idx="0">
-            <a:schemeClr val="accent5"/>
-          </a:effectRef>
-          <a:fontRef idx="minor">
-            <a:schemeClr val="lt1"/>
-          </a:fontRef>
-        </p:style>
-        <p:txBody>
-          <a:bodyPr rtlCol="0" anchor="ctr"/>
-          <a:lstStyle/>
-          <a:p>
-            <a:pPr algn="ctr"/>
-            <a:r>
-              <a:rPr lang="en-US" sz="1600" b="1" dirty="0" smtClean="0"/>
-              <a:t>*Bundle</a:t>
-            </a:r>
-            <a:endParaRPr lang="en-SG" sz="1600" b="1" dirty="0"/>
-          </a:p>
-        </p:txBody>
-      </p:sp>
-      <p:sp>
-        <p:nvSpPr>
-          <p:cNvPr id="75" name="Rectangle 74"/>
-          <p:cNvSpPr/>
-          <p:nvPr/>
-        </p:nvSpPr>
-        <p:spPr>
-          <a:xfrm>
-            <a:off x="2222774" y="3295033"/>
-            <a:ext cx="1219200" cy="361770"/>
-          </a:xfrm>
-          <a:prstGeom prst="rect">
-            <a:avLst/>
-          </a:prstGeom>
-        </p:spPr>
-        <p:style>
-          <a:lnRef idx="2">
-            <a:schemeClr val="accent5">
-              <a:shade val="50000"/>
-            </a:schemeClr>
-          </a:lnRef>
-          <a:fillRef idx="1">
-            <a:schemeClr val="accent5"/>
-          </a:fillRef>
-          <a:effectRef idx="0">
-            <a:schemeClr val="accent5"/>
-          </a:effectRef>
-          <a:fontRef idx="minor">
-            <a:schemeClr val="lt1"/>
-          </a:fontRef>
-        </p:style>
-        <p:txBody>
-          <a:bodyPr rtlCol="0" anchor="ctr"/>
-          <a:lstStyle/>
-          <a:p>
-            <a:pPr algn="ctr"/>
-            <a:r>
-              <a:rPr lang="en-US" sz="1600" b="1" dirty="0" smtClean="0"/>
-              <a:t>*Bundle</a:t>
-            </a:r>
-            <a:endParaRPr lang="en-SG" sz="1600" b="1" dirty="0"/>
-          </a:p>
-        </p:txBody>
-      </p:sp>
-      <p:sp>
-        <p:nvSpPr>
-          <p:cNvPr id="76" name="Rectangle 75"/>
-          <p:cNvSpPr/>
-          <p:nvPr/>
-        </p:nvSpPr>
-        <p:spPr>
-          <a:xfrm>
-            <a:off x="2276277" y="3343629"/>
-            <a:ext cx="1219200" cy="361770"/>
-          </a:xfrm>
-          <a:prstGeom prst="rect">
-            <a:avLst/>
-          </a:prstGeom>
-        </p:spPr>
-        <p:style>
-          <a:lnRef idx="2">
-            <a:schemeClr val="accent5">
-              <a:shade val="50000"/>
-            </a:schemeClr>
-          </a:lnRef>
-          <a:fillRef idx="1">
-            <a:schemeClr val="accent5"/>
-          </a:fillRef>
-          <a:effectRef idx="0">
-            <a:schemeClr val="accent5"/>
-          </a:effectRef>
-          <a:fontRef idx="minor">
-            <a:schemeClr val="lt1"/>
-          </a:fontRef>
-        </p:style>
-        <p:txBody>
-          <a:bodyPr rtlCol="0" anchor="ctr"/>
-          <a:lstStyle/>
-          <a:p>
-            <a:pPr algn="ctr"/>
-            <a:r>
-              <a:rPr lang="en-US" sz="1600" b="1" dirty="0" smtClean="0"/>
-              <a:t>*Stats</a:t>
-            </a:r>
-            <a:endParaRPr lang="en-SG" sz="1600" b="1" dirty="0"/>
-          </a:p>
-        </p:txBody>
-      </p:sp>
-      <p:sp>
-        <p:nvSpPr>
-          <p:cNvPr id="77" name="Rectangle 76"/>
-          <p:cNvSpPr/>
-          <p:nvPr/>
-        </p:nvSpPr>
-        <p:spPr>
-          <a:xfrm>
-            <a:off x="2174133" y="4007556"/>
-            <a:ext cx="1219200" cy="361770"/>
-          </a:xfrm>
-          <a:prstGeom prst="rect">
-            <a:avLst/>
-          </a:prstGeom>
-        </p:spPr>
-        <p:style>
-          <a:lnRef idx="2">
-            <a:schemeClr val="accent5">
-              <a:shade val="50000"/>
-            </a:schemeClr>
-          </a:lnRef>
-          <a:fillRef idx="1">
-            <a:schemeClr val="accent5"/>
-          </a:fillRef>
-          <a:effectRef idx="0">
-            <a:schemeClr val="accent5"/>
-          </a:effectRef>
-          <a:fontRef idx="minor">
-            <a:schemeClr val="lt1"/>
-          </a:fontRef>
-        </p:style>
-        <p:txBody>
-          <a:bodyPr rtlCol="0" anchor="ctr"/>
-          <a:lstStyle/>
-          <a:p>
-            <a:pPr algn="ctr"/>
-            <a:r>
-              <a:rPr lang="en-US" sz="1600" b="1" dirty="0" smtClean="0"/>
-              <a:t>*Bundle</a:t>
-            </a:r>
-            <a:endParaRPr lang="en-SG" sz="1600" b="1" dirty="0"/>
-          </a:p>
-        </p:txBody>
-      </p:sp>
-      <p:sp>
-        <p:nvSpPr>
-          <p:cNvPr id="78" name="Rectangle 77"/>
-          <p:cNvSpPr/>
-          <p:nvPr/>
-        </p:nvSpPr>
-        <p:spPr>
-          <a:xfrm>
-            <a:off x="2222774" y="4056152"/>
-            <a:ext cx="1219200" cy="361770"/>
-          </a:xfrm>
-          <a:prstGeom prst="rect">
-            <a:avLst/>
-          </a:prstGeom>
-        </p:spPr>
-        <p:style>
-          <a:lnRef idx="2">
-            <a:schemeClr val="accent5">
-              <a:shade val="50000"/>
-            </a:schemeClr>
-          </a:lnRef>
-          <a:fillRef idx="1">
-            <a:schemeClr val="accent5"/>
-          </a:fillRef>
-          <a:effectRef idx="0">
-            <a:schemeClr val="accent5"/>
-          </a:effectRef>
-          <a:fontRef idx="minor">
-            <a:schemeClr val="lt1"/>
-          </a:fontRef>
-        </p:style>
-        <p:txBody>
-          <a:bodyPr rtlCol="0" anchor="ctr"/>
-          <a:lstStyle/>
-          <a:p>
-            <a:pPr algn="ctr"/>
-            <a:r>
-              <a:rPr lang="en-US" sz="1600" b="1" dirty="0" smtClean="0"/>
-              <a:t>*Bundle</a:t>
-            </a:r>
-            <a:endParaRPr lang="en-SG" sz="1600" b="1" dirty="0"/>
-          </a:p>
-        </p:txBody>
-      </p:sp>
-      <p:sp>
-        <p:nvSpPr>
-          <p:cNvPr id="79" name="Rectangle 78"/>
-          <p:cNvSpPr/>
-          <p:nvPr/>
-        </p:nvSpPr>
-        <p:spPr>
-          <a:xfrm>
-            <a:off x="2276277" y="4104748"/>
-            <a:ext cx="1219200" cy="361770"/>
-          </a:xfrm>
-          <a:prstGeom prst="rect">
-            <a:avLst/>
-          </a:prstGeom>
-        </p:spPr>
-        <p:style>
-          <a:lnRef idx="2">
-            <a:schemeClr val="accent5">
-              <a:shade val="50000"/>
-            </a:schemeClr>
-          </a:lnRef>
-          <a:fillRef idx="1">
-            <a:schemeClr val="accent5"/>
-          </a:fillRef>
-          <a:effectRef idx="0">
-            <a:schemeClr val="accent5"/>
-          </a:effectRef>
-          <a:fontRef idx="minor">
-            <a:schemeClr val="lt1"/>
-          </a:fontRef>
-        </p:style>
-        <p:txBody>
-          <a:bodyPr rtlCol="0" anchor="ctr"/>
-          <a:lstStyle/>
-          <a:p>
-            <a:pPr algn="ctr"/>
-            <a:r>
-              <a:rPr lang="en-US" sz="1600" b="1" dirty="0" smtClean="0"/>
-              <a:t>*</a:t>
-            </a:r>
-            <a:r>
-              <a:rPr lang="en-US" sz="1600" b="1" dirty="0" smtClean="0"/>
-              <a:t>Summary</a:t>
-            </a:r>
-            <a:endParaRPr lang="en-SG" sz="1600" b="1" dirty="0"/>
-          </a:p>
-        </p:txBody>
-      </p:sp>
-      <p:sp>
-        <p:nvSpPr>
-          <p:cNvPr id="39" name="Rectangle 38"/>
-          <p:cNvSpPr/>
-          <p:nvPr/>
-        </p:nvSpPr>
-        <p:spPr>
-          <a:xfrm>
-            <a:off x="3303639" y="1593273"/>
-            <a:ext cx="1458859" cy="304800"/>
+            <a:off x="533400" y="1390938"/>
+            <a:ext cx="1253247" cy="304800"/>
           </a:xfrm>
           <a:prstGeom prst="rect">
             <a:avLst/>
@@ -5133,7 +5282,7 @@
             <a:pPr algn="ctr"/>
             <a:r>
               <a:rPr lang="en-US" sz="1600" b="1" dirty="0" smtClean="0"/>
-              <a:t>*Helper</a:t>
+              <a:t>Sanitizer</a:t>
             </a:r>
             <a:endParaRPr lang="en-SG" sz="1600" b="1" dirty="0"/>
           </a:p>
@@ -5141,14 +5290,14 @@
       </p:sp>
       <p:sp>
         <p:nvSpPr>
-          <p:cNvPr id="40" name="Rectangle 39"/>
+          <p:cNvPr id="43" name="Rectangle 42"/>
           <p:cNvSpPr/>
           <p:nvPr/>
         </p:nvSpPr>
         <p:spPr>
           <a:xfrm>
-            <a:off x="3227439" y="1667019"/>
-            <a:ext cx="1458859" cy="304800"/>
+            <a:off x="1948770" y="1016864"/>
+            <a:ext cx="1023030" cy="304800"/>
           </a:xfrm>
           <a:prstGeom prst="rect">
             <a:avLst/>
@@ -5176,8 +5325,8 @@
           <a:p>
             <a:pPr algn="ctr"/>
             <a:r>
-              <a:rPr lang="en-US" sz="1600" b="1" dirty="0" smtClean="0"/>
-              <a:t>*Helper</a:t>
+              <a:rPr lang="en-US" sz="1600" b="1" dirty="0" err="1" smtClean="0"/>
+              <a:t>Config</a:t>
             </a:r>
             <a:endParaRPr lang="en-SG" sz="1600" b="1" dirty="0"/>
           </a:p>
@@ -5185,14 +5334,14 @@
       </p:sp>
       <p:sp>
         <p:nvSpPr>
-          <p:cNvPr id="41" name="Rectangle 40"/>
+          <p:cNvPr id="44" name="Rectangle 43"/>
           <p:cNvSpPr/>
           <p:nvPr/>
         </p:nvSpPr>
         <p:spPr>
           <a:xfrm>
-            <a:off x="3162298" y="1722437"/>
-            <a:ext cx="1458859" cy="304800"/>
+            <a:off x="1940962" y="1373619"/>
+            <a:ext cx="1023030" cy="304800"/>
           </a:xfrm>
           <a:prstGeom prst="rect">
             <a:avLst/>
@@ -5220,8 +5369,8 @@
           <a:p>
             <a:pPr algn="ctr"/>
             <a:r>
-              <a:rPr lang="en-US" sz="1600" b="1" dirty="0" smtClean="0"/>
-              <a:t>*Helper</a:t>
+              <a:rPr lang="en-US" sz="1600" b="1" dirty="0" err="1" smtClean="0"/>
+              <a:t>Const</a:t>
             </a:r>
             <a:endParaRPr lang="en-SG" sz="1600" b="1" dirty="0"/>
           </a:p>
@@ -5229,14 +5378,14 @@
       </p:sp>
       <p:sp>
         <p:nvSpPr>
-          <p:cNvPr id="42" name="Rectangle 41"/>
+          <p:cNvPr id="45" name="Rectangle 44"/>
           <p:cNvSpPr/>
           <p:nvPr/>
         </p:nvSpPr>
         <p:spPr>
           <a:xfrm>
-            <a:off x="533400" y="1390938"/>
-            <a:ext cx="1253247" cy="304800"/>
+            <a:off x="1941843" y="1722437"/>
+            <a:ext cx="1023030" cy="304800"/>
           </a:xfrm>
           <a:prstGeom prst="rect">
             <a:avLst/>
@@ -5264,8 +5413,8 @@
           <a:p>
             <a:pPr algn="ctr"/>
             <a:r>
-              <a:rPr lang="en-US" sz="1600" b="1" dirty="0" smtClean="0"/>
-              <a:t>Sanitizer</a:t>
+              <a:rPr lang="en-US" sz="1600" b="1" dirty="0" err="1" smtClean="0"/>
+              <a:t>Url</a:t>
             </a:r>
             <a:endParaRPr lang="en-SG" sz="1600" b="1" dirty="0"/>
           </a:p>
@@ -5273,14 +5422,14 @@
       </p:sp>
       <p:sp>
         <p:nvSpPr>
-          <p:cNvPr id="43" name="Rectangle 42"/>
+          <p:cNvPr id="46" name="Rectangle 45"/>
           <p:cNvSpPr/>
           <p:nvPr/>
         </p:nvSpPr>
         <p:spPr>
           <a:xfrm>
-            <a:off x="1948770" y="1016864"/>
-            <a:ext cx="1023030" cy="304800"/>
+            <a:off x="533399" y="1747692"/>
+            <a:ext cx="1253247" cy="304800"/>
           </a:xfrm>
           <a:prstGeom prst="rect">
             <a:avLst/>
@@ -5308,233 +5457,152 @@
           <a:p>
             <a:pPr algn="ctr"/>
             <a:r>
-              <a:rPr lang="en-US" sz="1600" b="1" dirty="0" err="1" smtClean="0"/>
-              <a:t>Config</a:t>
+              <a:rPr lang="en-US" sz="1600" b="1" dirty="0" smtClean="0"/>
+              <a:t>Templates</a:t>
             </a:r>
             <a:endParaRPr lang="en-SG" sz="1600" b="1" dirty="0"/>
           </a:p>
         </p:txBody>
       </p:sp>
-      <p:sp>
-        <p:nvSpPr>
-          <p:cNvPr id="44" name="Rectangle 43"/>
-          <p:cNvSpPr/>
+      <p:grpSp>
+        <p:nvGrpSpPr>
+          <p:cNvPr id="3" name="Group 2"/>
+          <p:cNvGrpSpPr/>
           <p:nvPr/>
-        </p:nvSpPr>
-        <p:spPr>
-          <a:xfrm>
-            <a:off x="1940962" y="1373619"/>
-            <a:ext cx="1023030" cy="304800"/>
-          </a:xfrm>
-          <a:prstGeom prst="rect">
-            <a:avLst/>
-          </a:prstGeom>
-        </p:spPr>
-        <p:style>
-          <a:lnRef idx="2">
-            <a:schemeClr val="accent3">
-              <a:shade val="50000"/>
-            </a:schemeClr>
-          </a:lnRef>
-          <a:fillRef idx="1">
-            <a:schemeClr val="accent3"/>
-          </a:fillRef>
-          <a:effectRef idx="0">
-            <a:schemeClr val="accent3"/>
-          </a:effectRef>
-          <a:fontRef idx="minor">
-            <a:schemeClr val="lt1"/>
-          </a:fontRef>
-        </p:style>
-        <p:txBody>
-          <a:bodyPr rtlCol="0" anchor="ctr"/>
-          <a:lstStyle/>
-          <a:p>
-            <a:pPr algn="ctr"/>
-            <a:r>
-              <a:rPr lang="en-US" sz="1600" b="1" dirty="0" err="1" smtClean="0"/>
-              <a:t>Const</a:t>
-            </a:r>
-            <a:endParaRPr lang="en-SG" sz="1600" b="1" dirty="0"/>
-          </a:p>
-        </p:txBody>
-      </p:sp>
-      <p:sp>
-        <p:nvSpPr>
-          <p:cNvPr id="45" name="Rectangle 44"/>
-          <p:cNvSpPr/>
-          <p:nvPr/>
-        </p:nvSpPr>
-        <p:spPr>
-          <a:xfrm>
-            <a:off x="1941843" y="1722437"/>
-            <a:ext cx="1023030" cy="304800"/>
-          </a:xfrm>
-          <a:prstGeom prst="rect">
-            <a:avLst/>
-          </a:prstGeom>
-        </p:spPr>
-        <p:style>
-          <a:lnRef idx="2">
-            <a:schemeClr val="accent3">
-              <a:shade val="50000"/>
-            </a:schemeClr>
-          </a:lnRef>
-          <a:fillRef idx="1">
-            <a:schemeClr val="accent3"/>
-          </a:fillRef>
-          <a:effectRef idx="0">
-            <a:schemeClr val="accent3"/>
-          </a:effectRef>
-          <a:fontRef idx="minor">
-            <a:schemeClr val="lt1"/>
-          </a:fontRef>
-        </p:style>
-        <p:txBody>
-          <a:bodyPr rtlCol="0" anchor="ctr"/>
-          <a:lstStyle/>
-          <a:p>
-            <a:pPr algn="ctr"/>
-            <a:r>
-              <a:rPr lang="en-US" sz="1600" b="1" dirty="0" err="1" smtClean="0"/>
-              <a:t>Url</a:t>
-            </a:r>
-            <a:endParaRPr lang="en-SG" sz="1600" b="1" dirty="0"/>
-          </a:p>
-        </p:txBody>
-      </p:sp>
-      <p:sp>
-        <p:nvSpPr>
-          <p:cNvPr id="46" name="Rectangle 45"/>
-          <p:cNvSpPr/>
-          <p:nvPr/>
-        </p:nvSpPr>
-        <p:spPr>
-          <a:xfrm>
-            <a:off x="533399" y="1747692"/>
-            <a:ext cx="1253247" cy="304800"/>
-          </a:xfrm>
-          <a:prstGeom prst="rect">
-            <a:avLst/>
-          </a:prstGeom>
-        </p:spPr>
-        <p:style>
-          <a:lnRef idx="2">
-            <a:schemeClr val="accent3">
-              <a:shade val="50000"/>
-            </a:schemeClr>
-          </a:lnRef>
-          <a:fillRef idx="1">
-            <a:schemeClr val="accent3"/>
-          </a:fillRef>
-          <a:effectRef idx="0">
-            <a:schemeClr val="accent3"/>
-          </a:effectRef>
-          <a:fontRef idx="minor">
-            <a:schemeClr val="lt1"/>
-          </a:fontRef>
-        </p:style>
-        <p:txBody>
-          <a:bodyPr rtlCol="0" anchor="ctr"/>
-          <a:lstStyle/>
-          <a:p>
-            <a:pPr algn="ctr"/>
-            <a:r>
-              <a:rPr lang="en-US" sz="1600" b="1" dirty="0" err="1" smtClean="0"/>
-              <a:t>Utils</a:t>
-            </a:r>
-            <a:endParaRPr lang="en-SG" sz="1600" b="1" dirty="0"/>
-          </a:p>
-        </p:txBody>
-      </p:sp>
-      <p:sp>
-        <p:nvSpPr>
-          <p:cNvPr id="50" name="Rectangle 49"/>
-          <p:cNvSpPr/>
-          <p:nvPr/>
-        </p:nvSpPr>
-        <p:spPr>
-          <a:xfrm>
-            <a:off x="643647" y="3295033"/>
-            <a:ext cx="1219201" cy="361770"/>
-          </a:xfrm>
-          <a:prstGeom prst="rect">
-            <a:avLst/>
-          </a:prstGeom>
-        </p:spPr>
-        <p:style>
-          <a:lnRef idx="2">
-            <a:schemeClr val="accent4">
-              <a:shade val="50000"/>
-            </a:schemeClr>
-          </a:lnRef>
-          <a:fillRef idx="1">
-            <a:schemeClr val="accent4"/>
-          </a:fillRef>
-          <a:effectRef idx="0">
-            <a:schemeClr val="accent4"/>
-          </a:effectRef>
-          <a:fontRef idx="minor">
-            <a:schemeClr val="lt1"/>
-          </a:fontRef>
-        </p:style>
-        <p:txBody>
-          <a:bodyPr rtlCol="0" anchor="ctr"/>
-          <a:lstStyle/>
-          <a:p>
-            <a:pPr algn="ctr"/>
-            <a:r>
-              <a:rPr lang="en-US" sz="1600" b="1" dirty="0" smtClean="0"/>
-              <a:t>*Type</a:t>
-            </a:r>
-            <a:endParaRPr lang="en-SG" sz="1600" b="1" dirty="0"/>
-          </a:p>
-        </p:txBody>
-      </p:sp>
-      <p:sp>
-        <p:nvSpPr>
-          <p:cNvPr id="52" name="Rectangle 51"/>
-          <p:cNvSpPr/>
-          <p:nvPr/>
-        </p:nvSpPr>
-        <p:spPr>
-          <a:xfrm>
-            <a:off x="697150" y="3338241"/>
-            <a:ext cx="1219201" cy="361770"/>
-          </a:xfrm>
-          <a:prstGeom prst="rect">
-            <a:avLst/>
-          </a:prstGeom>
-        </p:spPr>
-        <p:style>
-          <a:lnRef idx="2">
-            <a:schemeClr val="accent4">
-              <a:shade val="50000"/>
-            </a:schemeClr>
-          </a:lnRef>
-          <a:fillRef idx="1">
-            <a:schemeClr val="accent4"/>
-          </a:fillRef>
-          <a:effectRef idx="0">
-            <a:schemeClr val="accent4"/>
-          </a:effectRef>
-          <a:fontRef idx="minor">
-            <a:schemeClr val="lt1"/>
-          </a:fontRef>
-        </p:style>
-        <p:txBody>
-          <a:bodyPr rtlCol="0" anchor="ctr"/>
-          <a:lstStyle/>
-          <a:p>
-            <a:pPr algn="ctr"/>
-            <a:r>
-              <a:rPr lang="en-US" sz="1600" b="1" dirty="0" smtClean="0"/>
-              <a:t>*Type</a:t>
-            </a:r>
-            <a:endParaRPr lang="en-SG" sz="1600" b="1" dirty="0"/>
-          </a:p>
-        </p:txBody>
-      </p:sp>
+        </p:nvGrpSpPr>
+        <p:grpSpPr>
+          <a:xfrm>
+            <a:off x="609599" y="3250641"/>
+            <a:ext cx="1306752" cy="449370"/>
+            <a:chOff x="609599" y="3250641"/>
+            <a:chExt cx="1306752" cy="449370"/>
+          </a:xfrm>
+        </p:grpSpPr>
+        <p:sp>
+          <p:nvSpPr>
+            <p:cNvPr id="171" name="Rectangle 170"/>
+            <p:cNvSpPr/>
+            <p:nvPr/>
+          </p:nvSpPr>
+          <p:spPr>
+            <a:xfrm>
+              <a:off x="609599" y="3250641"/>
+              <a:ext cx="1219201" cy="361770"/>
+            </a:xfrm>
+            <a:prstGeom prst="rect">
+              <a:avLst/>
+            </a:prstGeom>
+          </p:spPr>
+          <p:style>
+            <a:lnRef idx="2">
+              <a:schemeClr val="accent4">
+                <a:shade val="50000"/>
+              </a:schemeClr>
+            </a:lnRef>
+            <a:fillRef idx="1">
+              <a:schemeClr val="accent4"/>
+            </a:fillRef>
+            <a:effectRef idx="0">
+              <a:schemeClr val="accent4"/>
+            </a:effectRef>
+            <a:fontRef idx="minor">
+              <a:schemeClr val="lt1"/>
+            </a:fontRef>
+          </p:style>
+          <p:txBody>
+            <a:bodyPr rtlCol="0" anchor="ctr"/>
+            <a:lstStyle/>
+            <a:p>
+              <a:pPr algn="ctr"/>
+              <a:endParaRPr lang="en-SG" sz="1600" b="1" dirty="0"/>
+            </a:p>
+          </p:txBody>
+        </p:sp>
+        <p:sp>
+          <p:nvSpPr>
+            <p:cNvPr id="50" name="Rectangle 49"/>
+            <p:cNvSpPr/>
+            <p:nvPr/>
+          </p:nvSpPr>
+          <p:spPr>
+            <a:xfrm>
+              <a:off x="643647" y="3295033"/>
+              <a:ext cx="1219201" cy="361770"/>
+            </a:xfrm>
+            <a:prstGeom prst="rect">
+              <a:avLst/>
+            </a:prstGeom>
+          </p:spPr>
+          <p:style>
+            <a:lnRef idx="2">
+              <a:schemeClr val="accent4">
+                <a:shade val="50000"/>
+              </a:schemeClr>
+            </a:lnRef>
+            <a:fillRef idx="1">
+              <a:schemeClr val="accent4"/>
+            </a:fillRef>
+            <a:effectRef idx="0">
+              <a:schemeClr val="accent4"/>
+            </a:effectRef>
+            <a:fontRef idx="minor">
+              <a:schemeClr val="lt1"/>
+            </a:fontRef>
+          </p:style>
+          <p:txBody>
+            <a:bodyPr rtlCol="0" anchor="ctr"/>
+            <a:lstStyle/>
+            <a:p>
+              <a:pPr algn="ctr"/>
+              <a:endParaRPr lang="en-SG" sz="1600" b="1" dirty="0"/>
+            </a:p>
+          </p:txBody>
+        </p:sp>
+        <p:sp>
+          <p:nvSpPr>
+            <p:cNvPr id="52" name="Rectangle 51"/>
+            <p:cNvSpPr/>
+            <p:nvPr/>
+          </p:nvSpPr>
+          <p:spPr>
+            <a:xfrm>
+              <a:off x="697150" y="3338241"/>
+              <a:ext cx="1219201" cy="361770"/>
+            </a:xfrm>
+            <a:prstGeom prst="rect">
+              <a:avLst/>
+            </a:prstGeom>
+          </p:spPr>
+          <p:style>
+            <a:lnRef idx="2">
+              <a:schemeClr val="accent4">
+                <a:shade val="50000"/>
+              </a:schemeClr>
+            </a:lnRef>
+            <a:fillRef idx="1">
+              <a:schemeClr val="accent4"/>
+            </a:fillRef>
+            <a:effectRef idx="0">
+              <a:schemeClr val="accent4"/>
+            </a:effectRef>
+            <a:fontRef idx="minor">
+              <a:schemeClr val="lt1"/>
+            </a:fontRef>
+          </p:style>
+          <p:txBody>
+            <a:bodyPr rtlCol="0" anchor="ctr"/>
+            <a:lstStyle/>
+            <a:p>
+              <a:pPr algn="ctr"/>
+              <a:r>
+                <a:rPr lang="en-US" sz="1600" b="1" dirty="0" smtClean="0"/>
+                <a:t>*Type</a:t>
+              </a:r>
+              <a:endParaRPr lang="en-SG" sz="1600" b="1" dirty="0"/>
+            </a:p>
+          </p:txBody>
+        </p:sp>
+      </p:grpSp>
     </p:spTree>
     <p:extLst>
       <p:ext uri="{BB962C8B-B14F-4D97-AF65-F5344CB8AC3E}">

</xml_diff>

<commit_message>
[#6349] Update design.md to reflect on the current application architecture (#6496)
</commit_message>
<xml_diff>
--- a/docs/images/CommonComponent.pptx
+++ b/docs/images/CommonComponent.pptx
@@ -322,7 +322,7 @@
             <a:fld id="{1D8BD707-D9CF-40AE-B4C6-C98DA3205C09}" type="datetimeFigureOut">
               <a:rPr lang="en-US" smtClean="0"/>
               <a:pPr/>
-              <a:t>3/19/2016</a:t>
+              <a:t>1/28/2017</a:t>
             </a:fld>
             <a:endParaRPr lang="en-US"/>
           </a:p>
@@ -529,7 +529,7 @@
             <a:fld id="{1D8BD707-D9CF-40AE-B4C6-C98DA3205C09}" type="datetimeFigureOut">
               <a:rPr lang="en-US" smtClean="0"/>
               <a:pPr/>
-              <a:t>3/19/2016</a:t>
+              <a:t>1/28/2017</a:t>
             </a:fld>
             <a:endParaRPr lang="en-US"/>
           </a:p>
@@ -736,7 +736,7 @@
             <a:fld id="{1D8BD707-D9CF-40AE-B4C6-C98DA3205C09}" type="datetimeFigureOut">
               <a:rPr lang="en-US" smtClean="0"/>
               <a:pPr/>
-              <a:t>3/19/2016</a:t>
+              <a:t>1/28/2017</a:t>
             </a:fld>
             <a:endParaRPr lang="en-US"/>
           </a:p>
@@ -943,7 +943,7 @@
             <a:fld id="{1D8BD707-D9CF-40AE-B4C6-C98DA3205C09}" type="datetimeFigureOut">
               <a:rPr lang="en-US" smtClean="0"/>
               <a:pPr/>
-              <a:t>3/19/2016</a:t>
+              <a:t>1/28/2017</a:t>
             </a:fld>
             <a:endParaRPr lang="en-US"/>
           </a:p>
@@ -1216,7 +1216,7 @@
             <a:fld id="{1D8BD707-D9CF-40AE-B4C6-C98DA3205C09}" type="datetimeFigureOut">
               <a:rPr lang="en-US" smtClean="0"/>
               <a:pPr/>
-              <a:t>3/19/2016</a:t>
+              <a:t>1/28/2017</a:t>
             </a:fld>
             <a:endParaRPr lang="en-US"/>
           </a:p>
@@ -1539,7 +1539,7 @@
             <a:fld id="{1D8BD707-D9CF-40AE-B4C6-C98DA3205C09}" type="datetimeFigureOut">
               <a:rPr lang="en-US" smtClean="0"/>
               <a:pPr/>
-              <a:t>3/19/2016</a:t>
+              <a:t>1/28/2017</a:t>
             </a:fld>
             <a:endParaRPr lang="en-US"/>
           </a:p>
@@ -2002,7 +2002,7 @@
             <a:fld id="{1D8BD707-D9CF-40AE-B4C6-C98DA3205C09}" type="datetimeFigureOut">
               <a:rPr lang="en-US" smtClean="0"/>
               <a:pPr/>
-              <a:t>3/19/2016</a:t>
+              <a:t>1/28/2017</a:t>
             </a:fld>
             <a:endParaRPr lang="en-US"/>
           </a:p>
@@ -2149,7 +2149,7 @@
             <a:fld id="{1D8BD707-D9CF-40AE-B4C6-C98DA3205C09}" type="datetimeFigureOut">
               <a:rPr lang="en-US" smtClean="0"/>
               <a:pPr/>
-              <a:t>3/19/2016</a:t>
+              <a:t>1/28/2017</a:t>
             </a:fld>
             <a:endParaRPr lang="en-US"/>
           </a:p>
@@ -2265,7 +2265,7 @@
             <a:fld id="{1D8BD707-D9CF-40AE-B4C6-C98DA3205C09}" type="datetimeFigureOut">
               <a:rPr lang="en-US" smtClean="0"/>
               <a:pPr/>
-              <a:t>3/19/2016</a:t>
+              <a:t>1/28/2017</a:t>
             </a:fld>
             <a:endParaRPr lang="en-US"/>
           </a:p>
@@ -2572,7 +2572,7 @@
             <a:fld id="{1D8BD707-D9CF-40AE-B4C6-C98DA3205C09}" type="datetimeFigureOut">
               <a:rPr lang="en-US" smtClean="0"/>
               <a:pPr/>
-              <a:t>3/19/2016</a:t>
+              <a:t>1/28/2017</a:t>
             </a:fld>
             <a:endParaRPr lang="en-US"/>
           </a:p>
@@ -2855,7 +2855,7 @@
             <a:fld id="{1D8BD707-D9CF-40AE-B4C6-C98DA3205C09}" type="datetimeFigureOut">
               <a:rPr lang="en-US" smtClean="0"/>
               <a:pPr/>
-              <a:t>3/19/2016</a:t>
+              <a:t>1/28/2017</a:t>
             </a:fld>
             <a:endParaRPr lang="en-US"/>
           </a:p>
@@ -2968,15 +2968,14 @@
           </a:prstGeom>
           <a:solidFill>
             <a:schemeClr val="accent5">
-              <a:lumMod val="40000"/>
-              <a:lumOff val="60000"/>
+              <a:lumMod val="60000"/>
+              <a:lumOff val="40000"/>
             </a:schemeClr>
           </a:solidFill>
           <a:ln>
             <a:solidFill>
               <a:schemeClr val="accent5">
-                <a:lumMod val="60000"/>
-                <a:lumOff val="40000"/>
+                <a:lumMod val="75000"/>
               </a:schemeClr>
             </a:solidFill>
           </a:ln>
@@ -3009,392 +3008,431 @@
           </a:p>
         </p:txBody>
       </p:sp>
-      <p:sp>
-        <p:nvSpPr>
-          <p:cNvPr id="9" name="Rectangle 8"/>
-          <p:cNvSpPr/>
-          <p:nvPr/>
-        </p:nvSpPr>
-        <p:spPr>
-          <a:xfrm>
-            <a:off x="381000" y="2342197"/>
-            <a:ext cx="8305800" cy="2352040"/>
-          </a:xfrm>
-          <a:prstGeom prst="rect">
-            <a:avLst/>
-          </a:prstGeom>
-          <a:solidFill>
-            <a:schemeClr val="bg1"/>
-          </a:solidFill>
-          <a:ln>
+      <p:grpSp>
+        <p:nvGrpSpPr>
+          <p:cNvPr id="4" name="Group 3"/>
+          <p:cNvGrpSpPr/>
+          <p:nvPr userDrawn="1"/>
+        </p:nvGrpSpPr>
+        <p:grpSpPr>
+          <a:xfrm>
+            <a:off x="381000" y="2260917"/>
+            <a:ext cx="8305800" cy="2433320"/>
+            <a:chOff x="381000" y="2260917"/>
+            <a:chExt cx="8305800" cy="2433320"/>
+          </a:xfrm>
+        </p:grpSpPr>
+        <p:sp>
+          <p:nvSpPr>
+            <p:cNvPr id="9" name="Rectangle 8"/>
+            <p:cNvSpPr/>
+            <p:nvPr/>
+          </p:nvSpPr>
+          <p:spPr>
+            <a:xfrm>
+              <a:off x="381000" y="2342197"/>
+              <a:ext cx="8305800" cy="2352040"/>
+            </a:xfrm>
+            <a:prstGeom prst="rect">
+              <a:avLst/>
+            </a:prstGeom>
             <a:solidFill>
-              <a:schemeClr val="accent5">
-                <a:lumMod val="60000"/>
-                <a:lumOff val="40000"/>
+              <a:schemeClr val="bg1"/>
+            </a:solidFill>
+            <a:ln>
+              <a:solidFill>
+                <a:schemeClr val="accent5">
+                  <a:lumMod val="75000"/>
+                </a:schemeClr>
+              </a:solidFill>
+            </a:ln>
+          </p:spPr>
+          <p:style>
+            <a:lnRef idx="2">
+              <a:schemeClr val="accent1">
+                <a:shade val="50000"/>
               </a:schemeClr>
-            </a:solidFill>
-          </a:ln>
-        </p:spPr>
-        <p:style>
-          <a:lnRef idx="2">
-            <a:schemeClr val="accent1">
-              <a:shade val="50000"/>
-            </a:schemeClr>
-          </a:lnRef>
-          <a:fillRef idx="1">
-            <a:schemeClr val="accent1"/>
-          </a:fillRef>
-          <a:effectRef idx="0">
-            <a:schemeClr val="accent1"/>
-          </a:effectRef>
-          <a:fontRef idx="minor">
-            <a:schemeClr val="lt1"/>
-          </a:fontRef>
-        </p:style>
-        <p:txBody>
-          <a:bodyPr rtlCol="0" anchor="t" anchorCtr="0"/>
-          <a:lstStyle/>
-          <a:p>
-            <a:r>
-              <a:rPr lang="en-US" sz="1400" b="1" dirty="0" smtClean="0">
+            </a:lnRef>
+            <a:fillRef idx="1">
+              <a:schemeClr val="accent1"/>
+            </a:fillRef>
+            <a:effectRef idx="0">
+              <a:schemeClr val="accent1"/>
+            </a:effectRef>
+            <a:fontRef idx="minor">
+              <a:schemeClr val="lt1"/>
+            </a:fontRef>
+          </p:style>
+          <p:txBody>
+            <a:bodyPr rtlCol="0" anchor="t" anchorCtr="0"/>
+            <a:lstStyle/>
+            <a:p>
+              <a:r>
+                <a:rPr lang="en-US" sz="1400" b="1" dirty="0" smtClean="0">
+                  <a:solidFill>
+                    <a:schemeClr val="accent5">
+                      <a:lumMod val="75000"/>
+                    </a:schemeClr>
+                  </a:solidFill>
+                </a:rPr>
+                <a:t>common::</a:t>
+              </a:r>
+              <a:r>
+                <a:rPr lang="en-US" sz="1400" b="1" dirty="0" err="1" smtClean="0">
+                  <a:solidFill>
+                    <a:schemeClr val="accent5">
+                      <a:lumMod val="75000"/>
+                    </a:schemeClr>
+                  </a:solidFill>
+                </a:rPr>
+                <a:t>datatransfer</a:t>
+              </a:r>
+              <a:endParaRPr lang="en-SG" sz="1400" b="1" dirty="0">
                 <a:solidFill>
                   <a:schemeClr val="accent5">
                     <a:lumMod val="75000"/>
                   </a:schemeClr>
                 </a:solidFill>
-              </a:rPr>
-              <a:t>common::</a:t>
-            </a:r>
-            <a:r>
-              <a:rPr lang="en-US" sz="1400" b="1" dirty="0" err="1" smtClean="0">
+              </a:endParaRPr>
+            </a:p>
+          </p:txBody>
+        </p:sp>
+        <p:sp>
+          <p:nvSpPr>
+            <p:cNvPr id="10" name="Rectangle 9"/>
+            <p:cNvSpPr/>
+            <p:nvPr/>
+          </p:nvSpPr>
+          <p:spPr>
+            <a:xfrm>
+              <a:off x="8191500" y="2260917"/>
+              <a:ext cx="495300" cy="81280"/>
+            </a:xfrm>
+            <a:prstGeom prst="rect">
+              <a:avLst/>
+            </a:prstGeom>
+            <a:solidFill>
+              <a:schemeClr val="bg1"/>
+            </a:solidFill>
+            <a:ln>
+              <a:solidFill>
+                <a:schemeClr val="accent5">
+                  <a:lumMod val="75000"/>
+                </a:schemeClr>
+              </a:solidFill>
+            </a:ln>
+          </p:spPr>
+          <p:style>
+            <a:lnRef idx="2">
+              <a:schemeClr val="accent1">
+                <a:shade val="50000"/>
+              </a:schemeClr>
+            </a:lnRef>
+            <a:fillRef idx="1">
+              <a:schemeClr val="accent1"/>
+            </a:fillRef>
+            <a:effectRef idx="0">
+              <a:schemeClr val="accent1"/>
+            </a:effectRef>
+            <a:fontRef idx="minor">
+              <a:schemeClr val="lt1"/>
+            </a:fontRef>
+          </p:style>
+          <p:txBody>
+            <a:bodyPr rtlCol="0" anchor="t" anchorCtr="0"/>
+            <a:lstStyle/>
+            <a:p>
+              <a:endParaRPr lang="en-SG" sz="1400" b="1">
                 <a:solidFill>
                   <a:schemeClr val="accent5">
                     <a:lumMod val="75000"/>
                   </a:schemeClr>
                 </a:solidFill>
-              </a:rPr>
-              <a:t>datatransfer</a:t>
-            </a:r>
-            <a:endParaRPr lang="en-SG" sz="1400" b="1" dirty="0">
+              </a:endParaRPr>
+            </a:p>
+          </p:txBody>
+        </p:sp>
+      </p:grpSp>
+      <p:grpSp>
+        <p:nvGrpSpPr>
+          <p:cNvPr id="3" name="Group 2"/>
+          <p:cNvGrpSpPr/>
+          <p:nvPr userDrawn="1"/>
+        </p:nvGrpSpPr>
+        <p:grpSpPr>
+          <a:xfrm>
+            <a:off x="5105400" y="458411"/>
+            <a:ext cx="3581400" cy="1721226"/>
+            <a:chOff x="5105400" y="458411"/>
+            <a:chExt cx="3581400" cy="1721226"/>
+          </a:xfrm>
+        </p:grpSpPr>
+        <p:sp>
+          <p:nvSpPr>
+            <p:cNvPr id="15" name="Rectangle 14"/>
+            <p:cNvSpPr/>
+            <p:nvPr userDrawn="1"/>
+          </p:nvSpPr>
+          <p:spPr>
+            <a:xfrm>
+              <a:off x="5105400" y="542992"/>
+              <a:ext cx="3581400" cy="1636645"/>
+            </a:xfrm>
+            <a:prstGeom prst="rect">
+              <a:avLst/>
+            </a:prstGeom>
+            <a:solidFill>
+              <a:schemeClr val="bg1"/>
+            </a:solidFill>
+            <a:ln>
               <a:solidFill>
                 <a:schemeClr val="accent5">
                   <a:lumMod val="75000"/>
                 </a:schemeClr>
               </a:solidFill>
-            </a:endParaRPr>
-          </a:p>
-        </p:txBody>
-      </p:sp>
-      <p:sp>
-        <p:nvSpPr>
-          <p:cNvPr id="10" name="Rectangle 9"/>
-          <p:cNvSpPr/>
-          <p:nvPr/>
-        </p:nvSpPr>
-        <p:spPr>
-          <a:xfrm>
-            <a:off x="8191500" y="2260917"/>
-            <a:ext cx="495300" cy="81280"/>
-          </a:xfrm>
-          <a:prstGeom prst="rect">
-            <a:avLst/>
-          </a:prstGeom>
-          <a:solidFill>
-            <a:schemeClr val="bg1"/>
-          </a:solidFill>
-          <a:ln>
+            </a:ln>
+          </p:spPr>
+          <p:style>
+            <a:lnRef idx="2">
+              <a:schemeClr val="accent1">
+                <a:shade val="50000"/>
+              </a:schemeClr>
+            </a:lnRef>
+            <a:fillRef idx="1">
+              <a:schemeClr val="accent1"/>
+            </a:fillRef>
+            <a:effectRef idx="0">
+              <a:schemeClr val="accent1"/>
+            </a:effectRef>
+            <a:fontRef idx="minor">
+              <a:schemeClr val="lt1"/>
+            </a:fontRef>
+          </p:style>
+          <p:txBody>
+            <a:bodyPr rtlCol="0" anchor="t" anchorCtr="0"/>
+            <a:lstStyle/>
+            <a:p>
+              <a:r>
+                <a:rPr lang="en-US" sz="1400" b="1" dirty="0" smtClean="0">
+                  <a:solidFill>
+                    <a:schemeClr val="accent5">
+                      <a:lumMod val="75000"/>
+                    </a:schemeClr>
+                  </a:solidFill>
+                </a:rPr>
+                <a:t>common::exception</a:t>
+              </a:r>
+              <a:endParaRPr lang="en-SG" sz="1400" b="1" dirty="0">
+                <a:solidFill>
+                  <a:schemeClr val="accent5">
+                    <a:lumMod val="75000"/>
+                  </a:schemeClr>
+                </a:solidFill>
+              </a:endParaRPr>
+            </a:p>
+          </p:txBody>
+        </p:sp>
+        <p:sp>
+          <p:nvSpPr>
+            <p:cNvPr id="45" name="Rectangle 44"/>
+            <p:cNvSpPr/>
+            <p:nvPr userDrawn="1"/>
+          </p:nvSpPr>
+          <p:spPr>
+            <a:xfrm>
+              <a:off x="8191500" y="458411"/>
+              <a:ext cx="495300" cy="81280"/>
+            </a:xfrm>
+            <a:prstGeom prst="rect">
+              <a:avLst/>
+            </a:prstGeom>
             <a:solidFill>
-              <a:schemeClr val="accent5">
-                <a:lumMod val="60000"/>
-                <a:lumOff val="40000"/>
-              </a:schemeClr>
+              <a:schemeClr val="bg1"/>
             </a:solidFill>
-          </a:ln>
-        </p:spPr>
-        <p:style>
-          <a:lnRef idx="2">
-            <a:schemeClr val="accent1">
-              <a:shade val="50000"/>
-            </a:schemeClr>
-          </a:lnRef>
-          <a:fillRef idx="1">
-            <a:schemeClr val="accent1"/>
-          </a:fillRef>
-          <a:effectRef idx="0">
-            <a:schemeClr val="accent1"/>
-          </a:effectRef>
-          <a:fontRef idx="minor">
-            <a:schemeClr val="lt1"/>
-          </a:fontRef>
-        </p:style>
-        <p:txBody>
-          <a:bodyPr rtlCol="0" anchor="t" anchorCtr="0"/>
-          <a:lstStyle/>
-          <a:p>
-            <a:endParaRPr lang="en-SG" sz="1400" b="1">
+            <a:ln>
               <a:solidFill>
                 <a:schemeClr val="accent5">
                   <a:lumMod val="75000"/>
                 </a:schemeClr>
               </a:solidFill>
-            </a:endParaRPr>
-          </a:p>
-        </p:txBody>
-      </p:sp>
-      <p:sp>
-        <p:nvSpPr>
-          <p:cNvPr id="12" name="Rectangle 11"/>
-          <p:cNvSpPr/>
-          <p:nvPr/>
-        </p:nvSpPr>
-        <p:spPr>
-          <a:xfrm>
-            <a:off x="380999" y="565987"/>
-            <a:ext cx="4495801" cy="1613650"/>
-          </a:xfrm>
-          <a:prstGeom prst="rect">
-            <a:avLst/>
-          </a:prstGeom>
-          <a:solidFill>
-            <a:schemeClr val="bg1"/>
-          </a:solidFill>
-          <a:ln>
-            <a:solidFill>
-              <a:schemeClr val="accent5">
-                <a:lumMod val="60000"/>
-                <a:lumOff val="40000"/>
+            </a:ln>
+          </p:spPr>
+          <p:style>
+            <a:lnRef idx="2">
+              <a:schemeClr val="accent1">
+                <a:shade val="50000"/>
               </a:schemeClr>
-            </a:solidFill>
-          </a:ln>
-        </p:spPr>
-        <p:style>
-          <a:lnRef idx="2">
-            <a:schemeClr val="accent1">
-              <a:shade val="50000"/>
-            </a:schemeClr>
-          </a:lnRef>
-          <a:fillRef idx="1">
-            <a:schemeClr val="accent1"/>
-          </a:fillRef>
-          <a:effectRef idx="0">
-            <a:schemeClr val="accent1"/>
-          </a:effectRef>
-          <a:fontRef idx="minor">
-            <a:schemeClr val="lt1"/>
-          </a:fontRef>
-        </p:style>
-        <p:txBody>
-          <a:bodyPr rtlCol="0" anchor="t" anchorCtr="0"/>
-          <a:lstStyle/>
-          <a:p>
-            <a:r>
-              <a:rPr lang="en-US" sz="1400" b="1" dirty="0" smtClean="0">
+            </a:lnRef>
+            <a:fillRef idx="1">
+              <a:schemeClr val="accent1"/>
+            </a:fillRef>
+            <a:effectRef idx="0">
+              <a:schemeClr val="accent1"/>
+            </a:effectRef>
+            <a:fontRef idx="minor">
+              <a:schemeClr val="lt1"/>
+            </a:fontRef>
+          </p:style>
+          <p:txBody>
+            <a:bodyPr rtlCol="0" anchor="t" anchorCtr="0"/>
+            <a:lstStyle/>
+            <a:p>
+              <a:endParaRPr lang="en-SG" sz="1400" b="1">
                 <a:solidFill>
                   <a:schemeClr val="accent5">
                     <a:lumMod val="75000"/>
                   </a:schemeClr>
                 </a:solidFill>
-              </a:rPr>
-              <a:t>common::</a:t>
-            </a:r>
-            <a:r>
-              <a:rPr lang="en-US" sz="1400" b="1" dirty="0" err="1" smtClean="0">
+              </a:endParaRPr>
+            </a:p>
+          </p:txBody>
+        </p:sp>
+      </p:grpSp>
+      <p:grpSp>
+        <p:nvGrpSpPr>
+          <p:cNvPr id="2" name="Group 1"/>
+          <p:cNvGrpSpPr/>
+          <p:nvPr userDrawn="1"/>
+        </p:nvGrpSpPr>
+        <p:grpSpPr>
+          <a:xfrm>
+            <a:off x="380999" y="484707"/>
+            <a:ext cx="4495801" cy="1694930"/>
+            <a:chOff x="380999" y="484707"/>
+            <a:chExt cx="4495801" cy="1694930"/>
+          </a:xfrm>
+        </p:grpSpPr>
+        <p:sp>
+          <p:nvSpPr>
+            <p:cNvPr id="12" name="Rectangle 11"/>
+            <p:cNvSpPr/>
+            <p:nvPr/>
+          </p:nvSpPr>
+          <p:spPr>
+            <a:xfrm>
+              <a:off x="380999" y="565987"/>
+              <a:ext cx="4495801" cy="1613650"/>
+            </a:xfrm>
+            <a:prstGeom prst="rect">
+              <a:avLst/>
+            </a:prstGeom>
+            <a:solidFill>
+              <a:schemeClr val="bg1"/>
+            </a:solidFill>
+            <a:ln>
+              <a:solidFill>
+                <a:schemeClr val="accent5">
+                  <a:lumMod val="75000"/>
+                </a:schemeClr>
+              </a:solidFill>
+            </a:ln>
+          </p:spPr>
+          <p:style>
+            <a:lnRef idx="2">
+              <a:schemeClr val="accent1">
+                <a:shade val="50000"/>
+              </a:schemeClr>
+            </a:lnRef>
+            <a:fillRef idx="1">
+              <a:schemeClr val="accent1"/>
+            </a:fillRef>
+            <a:effectRef idx="0">
+              <a:schemeClr val="accent1"/>
+            </a:effectRef>
+            <a:fontRef idx="minor">
+              <a:schemeClr val="lt1"/>
+            </a:fontRef>
+          </p:style>
+          <p:txBody>
+            <a:bodyPr rtlCol="0" anchor="t" anchorCtr="0"/>
+            <a:lstStyle/>
+            <a:p>
+              <a:r>
+                <a:rPr lang="en-US" sz="1400" b="1" dirty="0" smtClean="0">
+                  <a:solidFill>
+                    <a:schemeClr val="accent5">
+                      <a:lumMod val="75000"/>
+                    </a:schemeClr>
+                  </a:solidFill>
+                </a:rPr>
+                <a:t>common::</a:t>
+              </a:r>
+              <a:r>
+                <a:rPr lang="en-US" sz="1400" b="1" dirty="0" err="1" smtClean="0">
+                  <a:solidFill>
+                    <a:schemeClr val="accent5">
+                      <a:lumMod val="75000"/>
+                    </a:schemeClr>
+                  </a:solidFill>
+                </a:rPr>
+                <a:t>util</a:t>
+              </a:r>
+              <a:endParaRPr lang="en-SG" sz="1400" b="1" dirty="0">
                 <a:solidFill>
                   <a:schemeClr val="accent5">
                     <a:lumMod val="75000"/>
                   </a:schemeClr>
                 </a:solidFill>
-              </a:rPr>
-              <a:t>util</a:t>
-            </a:r>
-            <a:endParaRPr lang="en-SG" sz="1400" b="1" dirty="0">
+              </a:endParaRPr>
+            </a:p>
+          </p:txBody>
+        </p:sp>
+        <p:sp>
+          <p:nvSpPr>
+            <p:cNvPr id="46" name="Rectangle 45"/>
+            <p:cNvSpPr/>
+            <p:nvPr userDrawn="1"/>
+          </p:nvSpPr>
+          <p:spPr>
+            <a:xfrm>
+              <a:off x="4381500" y="484707"/>
+              <a:ext cx="495300" cy="81280"/>
+            </a:xfrm>
+            <a:prstGeom prst="rect">
+              <a:avLst/>
+            </a:prstGeom>
+            <a:solidFill>
+              <a:schemeClr val="bg1"/>
+            </a:solidFill>
+            <a:ln>
               <a:solidFill>
                 <a:schemeClr val="accent5">
                   <a:lumMod val="75000"/>
                 </a:schemeClr>
               </a:solidFill>
-            </a:endParaRPr>
-          </a:p>
-        </p:txBody>
-      </p:sp>
-      <p:sp>
-        <p:nvSpPr>
-          <p:cNvPr id="15" name="Rectangle 14"/>
-          <p:cNvSpPr/>
-          <p:nvPr userDrawn="1"/>
-        </p:nvSpPr>
-        <p:spPr>
-          <a:xfrm>
-            <a:off x="5105400" y="542992"/>
-            <a:ext cx="3581400" cy="1636645"/>
-          </a:xfrm>
-          <a:prstGeom prst="rect">
-            <a:avLst/>
-          </a:prstGeom>
-          <a:solidFill>
-            <a:schemeClr val="bg1"/>
-          </a:solidFill>
-          <a:ln>
-            <a:solidFill>
-              <a:schemeClr val="accent5">
-                <a:lumMod val="60000"/>
-                <a:lumOff val="40000"/>
+            </a:ln>
+          </p:spPr>
+          <p:style>
+            <a:lnRef idx="2">
+              <a:schemeClr val="accent1">
+                <a:shade val="50000"/>
               </a:schemeClr>
-            </a:solidFill>
-          </a:ln>
-        </p:spPr>
-        <p:style>
-          <a:lnRef idx="2">
-            <a:schemeClr val="accent1">
-              <a:shade val="50000"/>
-            </a:schemeClr>
-          </a:lnRef>
-          <a:fillRef idx="1">
-            <a:schemeClr val="accent1"/>
-          </a:fillRef>
-          <a:effectRef idx="0">
-            <a:schemeClr val="accent1"/>
-          </a:effectRef>
-          <a:fontRef idx="minor">
-            <a:schemeClr val="lt1"/>
-          </a:fontRef>
-        </p:style>
-        <p:txBody>
-          <a:bodyPr rtlCol="0" anchor="t" anchorCtr="0"/>
-          <a:lstStyle/>
-          <a:p>
-            <a:r>
-              <a:rPr lang="en-US" sz="1400" b="1" dirty="0" smtClean="0">
+            </a:lnRef>
+            <a:fillRef idx="1">
+              <a:schemeClr val="accent1"/>
+            </a:fillRef>
+            <a:effectRef idx="0">
+              <a:schemeClr val="accent1"/>
+            </a:effectRef>
+            <a:fontRef idx="minor">
+              <a:schemeClr val="lt1"/>
+            </a:fontRef>
+          </p:style>
+          <p:txBody>
+            <a:bodyPr rtlCol="0" anchor="t" anchorCtr="0"/>
+            <a:lstStyle/>
+            <a:p>
+              <a:endParaRPr lang="en-SG" sz="1400" b="1">
                 <a:solidFill>
                   <a:schemeClr val="accent5">
                     <a:lumMod val="75000"/>
                   </a:schemeClr>
                 </a:solidFill>
-              </a:rPr>
-              <a:t>common::exception</a:t>
-            </a:r>
-            <a:endParaRPr lang="en-SG" sz="1400" b="1" dirty="0">
-              <a:solidFill>
-                <a:schemeClr val="accent5">
-                  <a:lumMod val="75000"/>
-                </a:schemeClr>
-              </a:solidFill>
-            </a:endParaRPr>
-          </a:p>
-        </p:txBody>
-      </p:sp>
-      <p:sp>
-        <p:nvSpPr>
-          <p:cNvPr id="45" name="Rectangle 44"/>
-          <p:cNvSpPr/>
-          <p:nvPr userDrawn="1"/>
-        </p:nvSpPr>
-        <p:spPr>
-          <a:xfrm>
-            <a:off x="8191500" y="458411"/>
-            <a:ext cx="495300" cy="81280"/>
-          </a:xfrm>
-          <a:prstGeom prst="rect">
-            <a:avLst/>
-          </a:prstGeom>
-          <a:solidFill>
-            <a:schemeClr val="bg1"/>
-          </a:solidFill>
-          <a:ln>
-            <a:solidFill>
-              <a:schemeClr val="accent5">
-                <a:lumMod val="60000"/>
-                <a:lumOff val="40000"/>
-              </a:schemeClr>
-            </a:solidFill>
-          </a:ln>
-        </p:spPr>
-        <p:style>
-          <a:lnRef idx="2">
-            <a:schemeClr val="accent1">
-              <a:shade val="50000"/>
-            </a:schemeClr>
-          </a:lnRef>
-          <a:fillRef idx="1">
-            <a:schemeClr val="accent1"/>
-          </a:fillRef>
-          <a:effectRef idx="0">
-            <a:schemeClr val="accent1"/>
-          </a:effectRef>
-          <a:fontRef idx="minor">
-            <a:schemeClr val="lt1"/>
-          </a:fontRef>
-        </p:style>
-        <p:txBody>
-          <a:bodyPr rtlCol="0" anchor="t" anchorCtr="0"/>
-          <a:lstStyle/>
-          <a:p>
-            <a:endParaRPr lang="en-SG" sz="1400" b="1">
-              <a:solidFill>
-                <a:schemeClr val="accent5">
-                  <a:lumMod val="75000"/>
-                </a:schemeClr>
-              </a:solidFill>
-            </a:endParaRPr>
-          </a:p>
-        </p:txBody>
-      </p:sp>
-      <p:sp>
-        <p:nvSpPr>
-          <p:cNvPr id="46" name="Rectangle 45"/>
-          <p:cNvSpPr/>
-          <p:nvPr userDrawn="1"/>
-        </p:nvSpPr>
-        <p:spPr>
-          <a:xfrm>
-            <a:off x="4381500" y="484707"/>
-            <a:ext cx="495300" cy="81280"/>
-          </a:xfrm>
-          <a:prstGeom prst="rect">
-            <a:avLst/>
-          </a:prstGeom>
-          <a:solidFill>
-            <a:schemeClr val="bg1"/>
-          </a:solidFill>
-          <a:ln>
-            <a:solidFill>
-              <a:schemeClr val="accent5">
-                <a:lumMod val="60000"/>
-                <a:lumOff val="40000"/>
-              </a:schemeClr>
-            </a:solidFill>
-          </a:ln>
-        </p:spPr>
-        <p:style>
-          <a:lnRef idx="2">
-            <a:schemeClr val="accent1">
-              <a:shade val="50000"/>
-            </a:schemeClr>
-          </a:lnRef>
-          <a:fillRef idx="1">
-            <a:schemeClr val="accent1"/>
-          </a:fillRef>
-          <a:effectRef idx="0">
-            <a:schemeClr val="accent1"/>
-          </a:effectRef>
-          <a:fontRef idx="minor">
-            <a:schemeClr val="lt1"/>
-          </a:fontRef>
-        </p:style>
-        <p:txBody>
-          <a:bodyPr rtlCol="0" anchor="t" anchorCtr="0"/>
-          <a:lstStyle/>
-          <a:p>
-            <a:endParaRPr lang="en-SG" sz="1400" b="1">
-              <a:solidFill>
-                <a:schemeClr val="accent5">
-                  <a:lumMod val="75000"/>
-                </a:schemeClr>
-              </a:solidFill>
-            </a:endParaRPr>
-          </a:p>
-        </p:txBody>
-      </p:sp>
+              </a:endParaRPr>
+            </a:p>
+          </p:txBody>
+        </p:sp>
+      </p:grpSp>
     </p:spTree>
   </p:cSld>
   <p:clrMap bg1="lt1" tx1="dk1" bg2="lt2" tx2="dk2" accent1="accent1" accent2="accent2" accent3="accent3" accent4="accent4" accent5="accent5" accent6="accent6" hlink="hlink" folHlink="folHlink"/>
@@ -3778,16 +3816,16 @@
       </p:sp>
       <p:sp>
         <p:nvSpPr>
-          <p:cNvPr id="166" name="Rectangle 165"/>
+          <p:cNvPr id="167" name="Isosceles Triangle 166"/>
           <p:cNvSpPr/>
           <p:nvPr/>
         </p:nvSpPr>
         <p:spPr>
           <a:xfrm>
-            <a:off x="5867400" y="1570037"/>
-            <a:ext cx="2133600" cy="304800"/>
-          </a:xfrm>
-          <a:prstGeom prst="rect">
+            <a:off x="6719582" y="1265237"/>
+            <a:ext cx="252000" cy="216000"/>
+          </a:xfrm>
+          <a:prstGeom prst="triangle">
             <a:avLst/>
           </a:prstGeom>
         </p:spPr>
@@ -3812,239 +3850,194 @@
           <a:lstStyle/>
           <a:p>
             <a:pPr algn="ctr"/>
-            <a:r>
-              <a:rPr lang="en-US" sz="1600" b="1" dirty="0" err="1" smtClean="0"/>
-              <a:t>EnrollException</a:t>
-            </a:r>
-            <a:r>
-              <a:rPr lang="en-US" sz="1600" b="1" dirty="0" smtClean="0"/>
-              <a:t> etc.</a:t>
-            </a:r>
-            <a:endParaRPr lang="en-SG" sz="1600" b="1" dirty="0"/>
-          </a:p>
-        </p:txBody>
-      </p:sp>
-      <p:sp>
-        <p:nvSpPr>
-          <p:cNvPr id="167" name="Isosceles Triangle 166"/>
-          <p:cNvSpPr/>
+            <a:endParaRPr lang="en-SG"/>
+          </a:p>
+        </p:txBody>
+      </p:sp>
+      <p:grpSp>
+        <p:nvGrpSpPr>
+          <p:cNvPr id="7" name="Group 6"/>
+          <p:cNvGrpSpPr/>
           <p:nvPr/>
-        </p:nvSpPr>
-        <p:spPr>
-          <a:xfrm>
-            <a:off x="6719582" y="1265237"/>
-            <a:ext cx="276225" cy="228600"/>
-          </a:xfrm>
-          <a:prstGeom prst="triangle">
-            <a:avLst/>
-          </a:prstGeom>
-        </p:spPr>
-        <p:style>
-          <a:lnRef idx="2">
-            <a:schemeClr val="accent2">
-              <a:shade val="50000"/>
-            </a:schemeClr>
-          </a:lnRef>
-          <a:fillRef idx="1">
-            <a:schemeClr val="accent2"/>
-          </a:fillRef>
-          <a:effectRef idx="0">
-            <a:schemeClr val="accent2"/>
-          </a:effectRef>
-          <a:fontRef idx="minor">
-            <a:schemeClr val="lt1"/>
-          </a:fontRef>
-        </p:style>
-        <p:txBody>
-          <a:bodyPr rtlCol="0" anchor="ctr"/>
-          <a:lstStyle/>
-          <a:p>
-            <a:pPr algn="ctr"/>
-            <a:endParaRPr lang="en-SG"/>
-          </a:p>
-        </p:txBody>
-      </p:sp>
-      <p:cxnSp>
-        <p:nvCxnSpPr>
-          <p:cNvPr id="168" name="Elbow Connector 167"/>
-          <p:cNvCxnSpPr>
-            <a:stCxn id="167" idx="3"/>
-            <a:endCxn id="169" idx="0"/>
-          </p:cNvCxnSpPr>
-          <p:nvPr/>
-        </p:nvCxnSpPr>
-        <p:spPr>
-          <a:xfrm rot="16200000" flipH="1">
-            <a:off x="6781647" y="1569884"/>
-            <a:ext cx="152400" cy="305"/>
-          </a:xfrm>
-          <a:prstGeom prst="bentConnector3">
-            <a:avLst>
-              <a:gd name="adj1" fmla="val 50000"/>
-            </a:avLst>
-          </a:prstGeom>
-          <a:ln w="19050">
-            <a:headEnd type="none" w="med" len="med"/>
-            <a:tailEnd type="none" w="med" len="med"/>
-          </a:ln>
-        </p:spPr>
-        <p:style>
-          <a:lnRef idx="2">
-            <a:schemeClr val="accent2">
-              <a:shade val="50000"/>
-            </a:schemeClr>
-          </a:lnRef>
-          <a:fillRef idx="1">
-            <a:schemeClr val="accent2"/>
-          </a:fillRef>
-          <a:effectRef idx="0">
-            <a:schemeClr val="accent2"/>
-          </a:effectRef>
-          <a:fontRef idx="minor">
-            <a:schemeClr val="lt1"/>
-          </a:fontRef>
-        </p:style>
-      </p:cxnSp>
-      <p:sp>
-        <p:nvSpPr>
-          <p:cNvPr id="169" name="Rectangle 168"/>
-          <p:cNvSpPr/>
-          <p:nvPr/>
-        </p:nvSpPr>
-        <p:spPr>
-          <a:xfrm>
-            <a:off x="5791200" y="1646237"/>
-            <a:ext cx="2133600" cy="304800"/>
-          </a:xfrm>
-          <a:prstGeom prst="rect">
-            <a:avLst/>
-          </a:prstGeom>
-        </p:spPr>
-        <p:style>
-          <a:lnRef idx="2">
-            <a:schemeClr val="accent2">
-              <a:shade val="50000"/>
-            </a:schemeClr>
-          </a:lnRef>
-          <a:fillRef idx="1">
-            <a:schemeClr val="accent2"/>
-          </a:fillRef>
-          <a:effectRef idx="0">
-            <a:schemeClr val="accent2"/>
-          </a:effectRef>
-          <a:fontRef idx="minor">
-            <a:schemeClr val="lt1"/>
-          </a:fontRef>
-        </p:style>
-        <p:txBody>
-          <a:bodyPr rtlCol="0" anchor="ctr"/>
-          <a:lstStyle/>
-          <a:p>
-            <a:pPr algn="ctr"/>
-            <a:r>
-              <a:rPr lang="en-US" sz="1600" b="1" dirty="0" err="1" smtClean="0"/>
-              <a:t>EnrollException</a:t>
-            </a:r>
-            <a:r>
-              <a:rPr lang="en-US" sz="1600" b="1" dirty="0" smtClean="0"/>
-              <a:t> etc.</a:t>
-            </a:r>
-            <a:endParaRPr lang="en-SG" sz="1600" b="1" dirty="0"/>
-          </a:p>
-        </p:txBody>
-      </p:sp>
-      <p:sp>
-        <p:nvSpPr>
-          <p:cNvPr id="170" name="Rectangle 169"/>
-          <p:cNvSpPr/>
-          <p:nvPr/>
-        </p:nvSpPr>
-        <p:spPr>
-          <a:xfrm>
-            <a:off x="5715000" y="1722437"/>
-            <a:ext cx="2133600" cy="304800"/>
-          </a:xfrm>
-          <a:prstGeom prst="rect">
-            <a:avLst/>
-          </a:prstGeom>
-        </p:spPr>
-        <p:style>
-          <a:lnRef idx="2">
-            <a:schemeClr val="accent2">
-              <a:shade val="50000"/>
-            </a:schemeClr>
-          </a:lnRef>
-          <a:fillRef idx="1">
-            <a:schemeClr val="accent2"/>
-          </a:fillRef>
-          <a:effectRef idx="0">
-            <a:schemeClr val="accent2"/>
-          </a:effectRef>
-          <a:fontRef idx="minor">
-            <a:schemeClr val="lt1"/>
-          </a:fontRef>
-        </p:style>
-        <p:txBody>
-          <a:bodyPr rtlCol="0" anchor="ctr"/>
-          <a:lstStyle/>
-          <a:p>
-            <a:pPr algn="ctr"/>
-            <a:r>
-              <a:rPr lang="en-US" sz="1600" b="1" dirty="0" err="1" smtClean="0"/>
-              <a:t>EnrollException</a:t>
-            </a:r>
-            <a:r>
-              <a:rPr lang="en-US" sz="1600" b="1" dirty="0" smtClean="0"/>
-              <a:t> etc.</a:t>
-            </a:r>
-            <a:endParaRPr lang="en-SG" sz="1600" b="1" dirty="0"/>
-          </a:p>
-        </p:txBody>
-      </p:sp>
-      <p:sp>
-        <p:nvSpPr>
-          <p:cNvPr id="171" name="Rectangle 170"/>
-          <p:cNvSpPr/>
-          <p:nvPr/>
-        </p:nvSpPr>
-        <p:spPr>
-          <a:xfrm>
-            <a:off x="609599" y="3250641"/>
-            <a:ext cx="1219201" cy="361770"/>
-          </a:xfrm>
-          <a:prstGeom prst="rect">
-            <a:avLst/>
-          </a:prstGeom>
-        </p:spPr>
-        <p:style>
-          <a:lnRef idx="2">
-            <a:schemeClr val="accent4">
-              <a:shade val="50000"/>
-            </a:schemeClr>
-          </a:lnRef>
-          <a:fillRef idx="1">
-            <a:schemeClr val="accent4"/>
-          </a:fillRef>
-          <a:effectRef idx="0">
-            <a:schemeClr val="accent4"/>
-          </a:effectRef>
-          <a:fontRef idx="minor">
-            <a:schemeClr val="lt1"/>
-          </a:fontRef>
-        </p:style>
-        <p:txBody>
-          <a:bodyPr rtlCol="0" anchor="ctr"/>
-          <a:lstStyle/>
-          <a:p>
-            <a:pPr algn="ctr"/>
-            <a:r>
-              <a:rPr lang="en-US" sz="1600" b="1" dirty="0" smtClean="0"/>
-              <a:t>*Type</a:t>
-            </a:r>
-            <a:endParaRPr lang="en-SG" sz="1600" b="1" dirty="0"/>
-          </a:p>
-        </p:txBody>
-      </p:sp>
+        </p:nvGrpSpPr>
+        <p:grpSpPr>
+          <a:xfrm>
+            <a:off x="5715000" y="1481237"/>
+            <a:ext cx="2286000" cy="546000"/>
+            <a:chOff x="5715000" y="1481237"/>
+            <a:chExt cx="2286000" cy="546000"/>
+          </a:xfrm>
+        </p:grpSpPr>
+        <p:sp>
+          <p:nvSpPr>
+            <p:cNvPr id="166" name="Rectangle 165"/>
+            <p:cNvSpPr/>
+            <p:nvPr/>
+          </p:nvSpPr>
+          <p:spPr>
+            <a:xfrm>
+              <a:off x="5867400" y="1570037"/>
+              <a:ext cx="2133600" cy="304800"/>
+            </a:xfrm>
+            <a:prstGeom prst="rect">
+              <a:avLst/>
+            </a:prstGeom>
+          </p:spPr>
+          <p:style>
+            <a:lnRef idx="2">
+              <a:schemeClr val="accent2">
+                <a:shade val="50000"/>
+              </a:schemeClr>
+            </a:lnRef>
+            <a:fillRef idx="1">
+              <a:schemeClr val="accent2"/>
+            </a:fillRef>
+            <a:effectRef idx="0">
+              <a:schemeClr val="accent2"/>
+            </a:effectRef>
+            <a:fontRef idx="minor">
+              <a:schemeClr val="lt1"/>
+            </a:fontRef>
+          </p:style>
+          <p:txBody>
+            <a:bodyPr rtlCol="0" anchor="ctr"/>
+            <a:lstStyle/>
+            <a:p>
+              <a:pPr algn="ctr"/>
+              <a:endParaRPr lang="en-SG" sz="1600" b="1" dirty="0"/>
+            </a:p>
+          </p:txBody>
+        </p:sp>
+        <p:cxnSp>
+          <p:nvCxnSpPr>
+            <p:cNvPr id="168" name="Elbow Connector 167"/>
+            <p:cNvCxnSpPr>
+              <a:stCxn id="167" idx="3"/>
+              <a:endCxn id="169" idx="0"/>
+            </p:cNvCxnSpPr>
+            <p:nvPr/>
+          </p:nvCxnSpPr>
+          <p:spPr>
+            <a:xfrm rot="16200000" flipH="1">
+              <a:off x="6763082" y="1563737"/>
+              <a:ext cx="165000" cy="0"/>
+            </a:xfrm>
+            <a:prstGeom prst="bentConnector3">
+              <a:avLst>
+                <a:gd name="adj1" fmla="val 50000"/>
+              </a:avLst>
+            </a:prstGeom>
+            <a:ln w="19050">
+              <a:headEnd type="none" w="med" len="med"/>
+              <a:tailEnd type="none" w="med" len="med"/>
+            </a:ln>
+          </p:spPr>
+          <p:style>
+            <a:lnRef idx="2">
+              <a:schemeClr val="accent2">
+                <a:shade val="50000"/>
+              </a:schemeClr>
+            </a:lnRef>
+            <a:fillRef idx="1">
+              <a:schemeClr val="accent2"/>
+            </a:fillRef>
+            <a:effectRef idx="0">
+              <a:schemeClr val="accent2"/>
+            </a:effectRef>
+            <a:fontRef idx="minor">
+              <a:schemeClr val="lt1"/>
+            </a:fontRef>
+          </p:style>
+        </p:cxnSp>
+        <p:sp>
+          <p:nvSpPr>
+            <p:cNvPr id="169" name="Rectangle 168"/>
+            <p:cNvSpPr/>
+            <p:nvPr/>
+          </p:nvSpPr>
+          <p:spPr>
+            <a:xfrm>
+              <a:off x="5791200" y="1646237"/>
+              <a:ext cx="2133600" cy="304800"/>
+            </a:xfrm>
+            <a:prstGeom prst="rect">
+              <a:avLst/>
+            </a:prstGeom>
+          </p:spPr>
+          <p:style>
+            <a:lnRef idx="2">
+              <a:schemeClr val="accent2">
+                <a:shade val="50000"/>
+              </a:schemeClr>
+            </a:lnRef>
+            <a:fillRef idx="1">
+              <a:schemeClr val="accent2"/>
+            </a:fillRef>
+            <a:effectRef idx="0">
+              <a:schemeClr val="accent2"/>
+            </a:effectRef>
+            <a:fontRef idx="minor">
+              <a:schemeClr val="lt1"/>
+            </a:fontRef>
+          </p:style>
+          <p:txBody>
+            <a:bodyPr rtlCol="0" anchor="ctr"/>
+            <a:lstStyle/>
+            <a:p>
+              <a:pPr algn="ctr"/>
+              <a:endParaRPr lang="en-SG" sz="1600" b="1" dirty="0"/>
+            </a:p>
+          </p:txBody>
+        </p:sp>
+        <p:sp>
+          <p:nvSpPr>
+            <p:cNvPr id="170" name="Rectangle 169"/>
+            <p:cNvSpPr/>
+            <p:nvPr/>
+          </p:nvSpPr>
+          <p:spPr>
+            <a:xfrm>
+              <a:off x="5715000" y="1722437"/>
+              <a:ext cx="2133600" cy="304800"/>
+            </a:xfrm>
+            <a:prstGeom prst="rect">
+              <a:avLst/>
+            </a:prstGeom>
+          </p:spPr>
+          <p:style>
+            <a:lnRef idx="2">
+              <a:schemeClr val="accent2">
+                <a:shade val="50000"/>
+              </a:schemeClr>
+            </a:lnRef>
+            <a:fillRef idx="1">
+              <a:schemeClr val="accent2"/>
+            </a:fillRef>
+            <a:effectRef idx="0">
+              <a:schemeClr val="accent2"/>
+            </a:effectRef>
+            <a:fontRef idx="minor">
+              <a:schemeClr val="lt1"/>
+            </a:fontRef>
+          </p:style>
+          <p:txBody>
+            <a:bodyPr rtlCol="0" anchor="ctr"/>
+            <a:lstStyle/>
+            <a:p>
+              <a:pPr algn="ctr"/>
+              <a:r>
+                <a:rPr lang="en-US" sz="1600" b="1" dirty="0" err="1" smtClean="0"/>
+                <a:t>EnrollException</a:t>
+              </a:r>
+              <a:r>
+                <a:rPr lang="en-US" sz="1600" b="1" dirty="0" smtClean="0"/>
+                <a:t> etc.</a:t>
+              </a:r>
+              <a:endParaRPr lang="en-SG" sz="1600" b="1" dirty="0"/>
+            </a:p>
+          </p:txBody>
+        </p:sp>
+      </p:grpSp>
       <p:sp>
         <p:nvSpPr>
           <p:cNvPr id="35" name="Rectangle 34"/>
@@ -4082,8 +4075,8 @@
           <a:p>
             <a:pPr algn="ctr"/>
             <a:r>
-              <a:rPr lang="en-US" sz="1600" b="1" dirty="0" err="1" smtClean="0"/>
-              <a:t>EmailTemplates</a:t>
+              <a:rPr lang="en-SG" sz="1600" b="1" dirty="0" smtClean="0"/>
+              <a:t>Logger</a:t>
             </a:r>
             <a:endParaRPr lang="en-SG" sz="1600" b="1" dirty="0"/>
           </a:p>
@@ -4141,8 +4134,8 @@
         </p:nvSpPr>
         <p:spPr>
           <a:xfrm>
-            <a:off x="5277256" y="2553649"/>
-            <a:ext cx="1585823" cy="361770"/>
+            <a:off x="5237742" y="2553649"/>
+            <a:ext cx="1944000" cy="360000"/>
           </a:xfrm>
           <a:prstGeom prst="rect">
             <a:avLst/>
@@ -4185,8 +4178,8 @@
         </p:nvSpPr>
         <p:spPr>
           <a:xfrm>
-            <a:off x="5932054" y="2941637"/>
-            <a:ext cx="276225" cy="228600"/>
+            <a:off x="6088542" y="2941637"/>
+            <a:ext cx="216000" cy="216000"/>
           </a:xfrm>
           <a:prstGeom prst="triangle">
             <a:avLst/>
@@ -4227,8 +4220,8 @@
         </p:nvSpPr>
         <p:spPr>
           <a:xfrm>
-            <a:off x="3810000" y="4150546"/>
-            <a:ext cx="1944758" cy="361770"/>
+            <a:off x="3942342" y="4150546"/>
+            <a:ext cx="1944758" cy="360000"/>
           </a:xfrm>
           <a:prstGeom prst="rect">
             <a:avLst/>
@@ -4272,8 +4265,8 @@
         </p:nvSpPr>
         <p:spPr>
           <a:xfrm>
-            <a:off x="6381858" y="3249302"/>
-            <a:ext cx="2130157" cy="361770"/>
+            <a:off x="6514200" y="3246437"/>
+            <a:ext cx="1944000" cy="360000"/>
           </a:xfrm>
           <a:prstGeom prst="rect">
             <a:avLst/>
@@ -4316,8 +4309,8 @@
         </p:nvSpPr>
         <p:spPr>
           <a:xfrm>
-            <a:off x="3810000" y="3700011"/>
-            <a:ext cx="1944758" cy="361770"/>
+            <a:off x="3942342" y="3700011"/>
+            <a:ext cx="1944758" cy="360000"/>
           </a:xfrm>
           <a:prstGeom prst="rect">
             <a:avLst/>
@@ -4360,8 +4353,8 @@
         </p:nvSpPr>
         <p:spPr>
           <a:xfrm>
-            <a:off x="6378780" y="3700663"/>
-            <a:ext cx="2136314" cy="361770"/>
+            <a:off x="6511122" y="3700663"/>
+            <a:ext cx="1944000" cy="360000"/>
           </a:xfrm>
           <a:prstGeom prst="rect">
             <a:avLst/>
@@ -4403,8 +4396,8 @@
         </p:nvSpPr>
         <p:spPr>
           <a:xfrm>
-            <a:off x="6378780" y="4150546"/>
-            <a:ext cx="2130157" cy="361770"/>
+            <a:off x="6511122" y="4150546"/>
+            <a:ext cx="1944000" cy="360000"/>
           </a:xfrm>
           <a:prstGeom prst="rect">
             <a:avLst/>
@@ -4448,8 +4441,8 @@
         </p:nvSpPr>
         <p:spPr>
           <a:xfrm>
-            <a:off x="3810000" y="3246437"/>
-            <a:ext cx="1944758" cy="361770"/>
+            <a:off x="3942342" y="3246437"/>
+            <a:ext cx="1944758" cy="360000"/>
           </a:xfrm>
           <a:prstGeom prst="rect">
             <a:avLst/>
@@ -4496,8 +4489,8 @@
         </p:nvCxnSpPr>
         <p:spPr>
           <a:xfrm rot="5400000">
-            <a:off x="5783921" y="3141075"/>
-            <a:ext cx="257085" cy="315409"/>
+            <a:off x="5907421" y="3137316"/>
+            <a:ext cx="268800" cy="309442"/>
           </a:xfrm>
           <a:prstGeom prst="bentConnector2">
             <a:avLst/>
@@ -4531,8 +4524,8 @@
         </p:nvCxnSpPr>
         <p:spPr>
           <a:xfrm rot="5400000">
-            <a:off x="5557134" y="3367862"/>
-            <a:ext cx="710659" cy="315409"/>
+            <a:off x="5680634" y="3364103"/>
+            <a:ext cx="722374" cy="309442"/>
           </a:xfrm>
           <a:prstGeom prst="bentConnector2">
             <a:avLst/>
@@ -4566,8 +4559,8 @@
         </p:nvCxnSpPr>
         <p:spPr>
           <a:xfrm rot="5400000">
-            <a:off x="5331866" y="3593130"/>
-            <a:ext cx="1161194" cy="315409"/>
+            <a:off x="5455367" y="3589370"/>
+            <a:ext cx="1172909" cy="309442"/>
           </a:xfrm>
           <a:prstGeom prst="bentConnector2">
             <a:avLst/>
@@ -4601,8 +4594,8 @@
         </p:nvCxnSpPr>
         <p:spPr>
           <a:xfrm rot="16200000" flipH="1">
-            <a:off x="6096037" y="3144366"/>
-            <a:ext cx="259950" cy="311691"/>
+            <a:off x="6220971" y="3133208"/>
+            <a:ext cx="268800" cy="317658"/>
           </a:xfrm>
           <a:prstGeom prst="bentConnector2">
             <a:avLst/>
@@ -4636,8 +4629,8 @@
         </p:nvCxnSpPr>
         <p:spPr>
           <a:xfrm rot="16200000" flipH="1">
-            <a:off x="5868818" y="3371585"/>
-            <a:ext cx="711311" cy="308613"/>
+            <a:off x="5992319" y="3361860"/>
+            <a:ext cx="723026" cy="314580"/>
           </a:xfrm>
           <a:prstGeom prst="bentConnector2">
             <a:avLst/>
@@ -4671,8 +4664,8 @@
         </p:nvCxnSpPr>
         <p:spPr>
           <a:xfrm rot="16200000" flipH="1">
-            <a:off x="5643876" y="3596527"/>
-            <a:ext cx="1161194" cy="308613"/>
+            <a:off x="5767378" y="3586801"/>
+            <a:ext cx="1172909" cy="314580"/>
           </a:xfrm>
           <a:prstGeom prst="bentConnector2">
             <a:avLst/>
@@ -4695,416 +4688,572 @@
           </a:fontRef>
         </p:style>
       </p:cxnSp>
-      <p:sp>
-        <p:nvSpPr>
-          <p:cNvPr id="70" name="Rectangle 69"/>
+      <p:grpSp>
+        <p:nvGrpSpPr>
+          <p:cNvPr id="2" name="Group 1"/>
+          <p:cNvGrpSpPr/>
+          <p:nvPr/>
+        </p:nvGrpSpPr>
+        <p:grpSpPr>
+          <a:xfrm>
+            <a:off x="595006" y="3958960"/>
+            <a:ext cx="1321344" cy="458962"/>
+            <a:chOff x="595006" y="3958960"/>
+            <a:chExt cx="1321344" cy="458962"/>
+          </a:xfrm>
+        </p:grpSpPr>
+        <p:sp>
+          <p:nvSpPr>
+            <p:cNvPr id="70" name="Rectangle 69"/>
+            <p:cNvSpPr/>
+            <p:nvPr/>
+          </p:nvSpPr>
+          <p:spPr>
+            <a:xfrm>
+              <a:off x="595006" y="3958960"/>
+              <a:ext cx="1219200" cy="361770"/>
+            </a:xfrm>
+            <a:prstGeom prst="rect">
+              <a:avLst/>
+            </a:prstGeom>
+          </p:spPr>
+          <p:style>
+            <a:lnRef idx="2">
+              <a:schemeClr val="accent5">
+                <a:shade val="50000"/>
+              </a:schemeClr>
+            </a:lnRef>
+            <a:fillRef idx="1">
+              <a:schemeClr val="accent5"/>
+            </a:fillRef>
+            <a:effectRef idx="0">
+              <a:schemeClr val="accent5"/>
+            </a:effectRef>
+            <a:fontRef idx="minor">
+              <a:schemeClr val="lt1"/>
+            </a:fontRef>
+          </p:style>
+          <p:txBody>
+            <a:bodyPr rtlCol="0" anchor="ctr"/>
+            <a:lstStyle/>
+            <a:p>
+              <a:pPr algn="ctr"/>
+              <a:endParaRPr lang="en-SG" sz="1600" b="1" dirty="0"/>
+            </a:p>
+          </p:txBody>
+        </p:sp>
+        <p:sp>
+          <p:nvSpPr>
+            <p:cNvPr id="72" name="Rectangle 71"/>
+            <p:cNvSpPr/>
+            <p:nvPr/>
+          </p:nvSpPr>
+          <p:spPr>
+            <a:xfrm>
+              <a:off x="643647" y="4007556"/>
+              <a:ext cx="1219200" cy="361770"/>
+            </a:xfrm>
+            <a:prstGeom prst="rect">
+              <a:avLst/>
+            </a:prstGeom>
+          </p:spPr>
+          <p:style>
+            <a:lnRef idx="2">
+              <a:schemeClr val="accent5">
+                <a:shade val="50000"/>
+              </a:schemeClr>
+            </a:lnRef>
+            <a:fillRef idx="1">
+              <a:schemeClr val="accent5"/>
+            </a:fillRef>
+            <a:effectRef idx="0">
+              <a:schemeClr val="accent5"/>
+            </a:effectRef>
+            <a:fontRef idx="minor">
+              <a:schemeClr val="lt1"/>
+            </a:fontRef>
+          </p:style>
+          <p:txBody>
+            <a:bodyPr rtlCol="0" anchor="ctr"/>
+            <a:lstStyle/>
+            <a:p>
+              <a:pPr algn="ctr"/>
+              <a:endParaRPr lang="en-SG" sz="1600" b="1" dirty="0"/>
+            </a:p>
+          </p:txBody>
+        </p:sp>
+        <p:sp>
+          <p:nvSpPr>
+            <p:cNvPr id="73" name="Rectangle 72"/>
+            <p:cNvSpPr/>
+            <p:nvPr/>
+          </p:nvSpPr>
+          <p:spPr>
+            <a:xfrm>
+              <a:off x="697150" y="4056152"/>
+              <a:ext cx="1219200" cy="361770"/>
+            </a:xfrm>
+            <a:prstGeom prst="rect">
+              <a:avLst/>
+            </a:prstGeom>
+          </p:spPr>
+          <p:style>
+            <a:lnRef idx="2">
+              <a:schemeClr val="accent5">
+                <a:shade val="50000"/>
+              </a:schemeClr>
+            </a:lnRef>
+            <a:fillRef idx="1">
+              <a:schemeClr val="accent5"/>
+            </a:fillRef>
+            <a:effectRef idx="0">
+              <a:schemeClr val="accent5"/>
+            </a:effectRef>
+            <a:fontRef idx="minor">
+              <a:schemeClr val="lt1"/>
+            </a:fontRef>
+          </p:style>
+          <p:txBody>
+            <a:bodyPr rtlCol="0" anchor="ctr"/>
+            <a:lstStyle/>
+            <a:p>
+              <a:pPr algn="ctr"/>
+              <a:r>
+                <a:rPr lang="en-US" sz="1600" b="1" dirty="0" smtClean="0"/>
+                <a:t>*Bundle</a:t>
+              </a:r>
+              <a:endParaRPr lang="en-SG" sz="1600" b="1" dirty="0"/>
+            </a:p>
+          </p:txBody>
+        </p:sp>
+      </p:grpSp>
+      <p:grpSp>
+        <p:nvGrpSpPr>
+          <p:cNvPr id="4" name="Group 3"/>
+          <p:cNvGrpSpPr/>
+          <p:nvPr/>
+        </p:nvGrpSpPr>
+        <p:grpSpPr>
+          <a:xfrm>
+            <a:off x="2174133" y="3246437"/>
+            <a:ext cx="1321344" cy="458962"/>
+            <a:chOff x="2174133" y="3246437"/>
+            <a:chExt cx="1321344" cy="458962"/>
+          </a:xfrm>
+        </p:grpSpPr>
+        <p:sp>
+          <p:nvSpPr>
+            <p:cNvPr id="74" name="Rectangle 73"/>
+            <p:cNvSpPr/>
+            <p:nvPr/>
+          </p:nvSpPr>
+          <p:spPr>
+            <a:xfrm>
+              <a:off x="2174133" y="3246437"/>
+              <a:ext cx="1219200" cy="361770"/>
+            </a:xfrm>
+            <a:prstGeom prst="rect">
+              <a:avLst/>
+            </a:prstGeom>
+          </p:spPr>
+          <p:style>
+            <a:lnRef idx="2">
+              <a:schemeClr val="accent5">
+                <a:shade val="50000"/>
+              </a:schemeClr>
+            </a:lnRef>
+            <a:fillRef idx="1">
+              <a:schemeClr val="accent5"/>
+            </a:fillRef>
+            <a:effectRef idx="0">
+              <a:schemeClr val="accent5"/>
+            </a:effectRef>
+            <a:fontRef idx="minor">
+              <a:schemeClr val="lt1"/>
+            </a:fontRef>
+          </p:style>
+          <p:txBody>
+            <a:bodyPr rtlCol="0" anchor="ctr"/>
+            <a:lstStyle/>
+            <a:p>
+              <a:pPr algn="ctr"/>
+              <a:endParaRPr lang="en-SG" sz="1600" b="1" dirty="0"/>
+            </a:p>
+          </p:txBody>
+        </p:sp>
+        <p:sp>
+          <p:nvSpPr>
+            <p:cNvPr id="75" name="Rectangle 74"/>
+            <p:cNvSpPr/>
+            <p:nvPr/>
+          </p:nvSpPr>
+          <p:spPr>
+            <a:xfrm>
+              <a:off x="2222774" y="3295033"/>
+              <a:ext cx="1219200" cy="361770"/>
+            </a:xfrm>
+            <a:prstGeom prst="rect">
+              <a:avLst/>
+            </a:prstGeom>
+          </p:spPr>
+          <p:style>
+            <a:lnRef idx="2">
+              <a:schemeClr val="accent5">
+                <a:shade val="50000"/>
+              </a:schemeClr>
+            </a:lnRef>
+            <a:fillRef idx="1">
+              <a:schemeClr val="accent5"/>
+            </a:fillRef>
+            <a:effectRef idx="0">
+              <a:schemeClr val="accent5"/>
+            </a:effectRef>
+            <a:fontRef idx="minor">
+              <a:schemeClr val="lt1"/>
+            </a:fontRef>
+          </p:style>
+          <p:txBody>
+            <a:bodyPr rtlCol="0" anchor="ctr"/>
+            <a:lstStyle/>
+            <a:p>
+              <a:pPr algn="ctr"/>
+              <a:endParaRPr lang="en-SG" sz="1600" b="1" dirty="0"/>
+            </a:p>
+          </p:txBody>
+        </p:sp>
+        <p:sp>
+          <p:nvSpPr>
+            <p:cNvPr id="76" name="Rectangle 75"/>
+            <p:cNvSpPr/>
+            <p:nvPr/>
+          </p:nvSpPr>
+          <p:spPr>
+            <a:xfrm>
+              <a:off x="2276277" y="3343629"/>
+              <a:ext cx="1219200" cy="361770"/>
+            </a:xfrm>
+            <a:prstGeom prst="rect">
+              <a:avLst/>
+            </a:prstGeom>
+          </p:spPr>
+          <p:style>
+            <a:lnRef idx="2">
+              <a:schemeClr val="accent5">
+                <a:shade val="50000"/>
+              </a:schemeClr>
+            </a:lnRef>
+            <a:fillRef idx="1">
+              <a:schemeClr val="accent5"/>
+            </a:fillRef>
+            <a:effectRef idx="0">
+              <a:schemeClr val="accent5"/>
+            </a:effectRef>
+            <a:fontRef idx="minor">
+              <a:schemeClr val="lt1"/>
+            </a:fontRef>
+          </p:style>
+          <p:txBody>
+            <a:bodyPr rtlCol="0" anchor="ctr"/>
+            <a:lstStyle/>
+            <a:p>
+              <a:pPr algn="ctr"/>
+              <a:r>
+                <a:rPr lang="en-US" sz="1600" b="1" dirty="0" smtClean="0"/>
+                <a:t>*Stats</a:t>
+              </a:r>
+              <a:endParaRPr lang="en-SG" sz="1600" b="1" dirty="0"/>
+            </a:p>
+          </p:txBody>
+        </p:sp>
+      </p:grpSp>
+      <p:grpSp>
+        <p:nvGrpSpPr>
+          <p:cNvPr id="5" name="Group 4"/>
+          <p:cNvGrpSpPr/>
+          <p:nvPr/>
+        </p:nvGrpSpPr>
+        <p:grpSpPr>
+          <a:xfrm>
+            <a:off x="2174133" y="4007556"/>
+            <a:ext cx="1321344" cy="458962"/>
+            <a:chOff x="2174133" y="4007556"/>
+            <a:chExt cx="1321344" cy="458962"/>
+          </a:xfrm>
+        </p:grpSpPr>
+        <p:sp>
+          <p:nvSpPr>
+            <p:cNvPr id="77" name="Rectangle 76"/>
+            <p:cNvSpPr/>
+            <p:nvPr/>
+          </p:nvSpPr>
+          <p:spPr>
+            <a:xfrm>
+              <a:off x="2174133" y="4007556"/>
+              <a:ext cx="1219200" cy="361770"/>
+            </a:xfrm>
+            <a:prstGeom prst="rect">
+              <a:avLst/>
+            </a:prstGeom>
+          </p:spPr>
+          <p:style>
+            <a:lnRef idx="2">
+              <a:schemeClr val="accent5">
+                <a:shade val="50000"/>
+              </a:schemeClr>
+            </a:lnRef>
+            <a:fillRef idx="1">
+              <a:schemeClr val="accent5"/>
+            </a:fillRef>
+            <a:effectRef idx="0">
+              <a:schemeClr val="accent5"/>
+            </a:effectRef>
+            <a:fontRef idx="minor">
+              <a:schemeClr val="lt1"/>
+            </a:fontRef>
+          </p:style>
+          <p:txBody>
+            <a:bodyPr rtlCol="0" anchor="ctr"/>
+            <a:lstStyle/>
+            <a:p>
+              <a:pPr algn="ctr"/>
+              <a:endParaRPr lang="en-SG" sz="1600" b="1" dirty="0"/>
+            </a:p>
+          </p:txBody>
+        </p:sp>
+        <p:sp>
+          <p:nvSpPr>
+            <p:cNvPr id="78" name="Rectangle 77"/>
+            <p:cNvSpPr/>
+            <p:nvPr/>
+          </p:nvSpPr>
+          <p:spPr>
+            <a:xfrm>
+              <a:off x="2222774" y="4056152"/>
+              <a:ext cx="1219200" cy="361770"/>
+            </a:xfrm>
+            <a:prstGeom prst="rect">
+              <a:avLst/>
+            </a:prstGeom>
+          </p:spPr>
+          <p:style>
+            <a:lnRef idx="2">
+              <a:schemeClr val="accent5">
+                <a:shade val="50000"/>
+              </a:schemeClr>
+            </a:lnRef>
+            <a:fillRef idx="1">
+              <a:schemeClr val="accent5"/>
+            </a:fillRef>
+            <a:effectRef idx="0">
+              <a:schemeClr val="accent5"/>
+            </a:effectRef>
+            <a:fontRef idx="minor">
+              <a:schemeClr val="lt1"/>
+            </a:fontRef>
+          </p:style>
+          <p:txBody>
+            <a:bodyPr rtlCol="0" anchor="ctr"/>
+            <a:lstStyle/>
+            <a:p>
+              <a:pPr algn="ctr"/>
+              <a:endParaRPr lang="en-SG" sz="1600" b="1" dirty="0"/>
+            </a:p>
+          </p:txBody>
+        </p:sp>
+        <p:sp>
+          <p:nvSpPr>
+            <p:cNvPr id="79" name="Rectangle 78"/>
+            <p:cNvSpPr/>
+            <p:nvPr/>
+          </p:nvSpPr>
+          <p:spPr>
+            <a:xfrm>
+              <a:off x="2276277" y="4104748"/>
+              <a:ext cx="1219200" cy="361770"/>
+            </a:xfrm>
+            <a:prstGeom prst="rect">
+              <a:avLst/>
+            </a:prstGeom>
+          </p:spPr>
+          <p:style>
+            <a:lnRef idx="2">
+              <a:schemeClr val="accent5">
+                <a:shade val="50000"/>
+              </a:schemeClr>
+            </a:lnRef>
+            <a:fillRef idx="1">
+              <a:schemeClr val="accent5"/>
+            </a:fillRef>
+            <a:effectRef idx="0">
+              <a:schemeClr val="accent5"/>
+            </a:effectRef>
+            <a:fontRef idx="minor">
+              <a:schemeClr val="lt1"/>
+            </a:fontRef>
+          </p:style>
+          <p:txBody>
+            <a:bodyPr rtlCol="0" anchor="ctr"/>
+            <a:lstStyle/>
+            <a:p>
+              <a:pPr algn="ctr"/>
+              <a:r>
+                <a:rPr lang="en-US" sz="1600" b="1" dirty="0" smtClean="0"/>
+                <a:t>*Summary</a:t>
+              </a:r>
+              <a:endParaRPr lang="en-SG" sz="1600" b="1" dirty="0"/>
+            </a:p>
+          </p:txBody>
+        </p:sp>
+      </p:grpSp>
+      <p:grpSp>
+        <p:nvGrpSpPr>
+          <p:cNvPr id="11" name="Group 10"/>
+          <p:cNvGrpSpPr/>
+          <p:nvPr/>
+        </p:nvGrpSpPr>
+        <p:grpSpPr>
+          <a:xfrm>
+            <a:off x="3162298" y="1593273"/>
+            <a:ext cx="1600200" cy="433964"/>
+            <a:chOff x="3162298" y="1593273"/>
+            <a:chExt cx="1600200" cy="433964"/>
+          </a:xfrm>
+        </p:grpSpPr>
+        <p:sp>
+          <p:nvSpPr>
+            <p:cNvPr id="39" name="Rectangle 38"/>
+            <p:cNvSpPr/>
+            <p:nvPr/>
+          </p:nvSpPr>
+          <p:spPr>
+            <a:xfrm>
+              <a:off x="3303639" y="1593273"/>
+              <a:ext cx="1458859" cy="304800"/>
+            </a:xfrm>
+            <a:prstGeom prst="rect">
+              <a:avLst/>
+            </a:prstGeom>
+          </p:spPr>
+          <p:style>
+            <a:lnRef idx="2">
+              <a:schemeClr val="accent3">
+                <a:shade val="50000"/>
+              </a:schemeClr>
+            </a:lnRef>
+            <a:fillRef idx="1">
+              <a:schemeClr val="accent3"/>
+            </a:fillRef>
+            <a:effectRef idx="0">
+              <a:schemeClr val="accent3"/>
+            </a:effectRef>
+            <a:fontRef idx="minor">
+              <a:schemeClr val="lt1"/>
+            </a:fontRef>
+          </p:style>
+          <p:txBody>
+            <a:bodyPr rtlCol="0" anchor="ctr"/>
+            <a:lstStyle/>
+            <a:p>
+              <a:pPr algn="ctr"/>
+              <a:endParaRPr lang="en-SG" sz="1600" b="1" dirty="0"/>
+            </a:p>
+          </p:txBody>
+        </p:sp>
+        <p:sp>
+          <p:nvSpPr>
+            <p:cNvPr id="40" name="Rectangle 39"/>
+            <p:cNvSpPr/>
+            <p:nvPr/>
+          </p:nvSpPr>
+          <p:spPr>
+            <a:xfrm>
+              <a:off x="3227439" y="1667019"/>
+              <a:ext cx="1458859" cy="304800"/>
+            </a:xfrm>
+            <a:prstGeom prst="rect">
+              <a:avLst/>
+            </a:prstGeom>
+          </p:spPr>
+          <p:style>
+            <a:lnRef idx="2">
+              <a:schemeClr val="accent3">
+                <a:shade val="50000"/>
+              </a:schemeClr>
+            </a:lnRef>
+            <a:fillRef idx="1">
+              <a:schemeClr val="accent3"/>
+            </a:fillRef>
+            <a:effectRef idx="0">
+              <a:schemeClr val="accent3"/>
+            </a:effectRef>
+            <a:fontRef idx="minor">
+              <a:schemeClr val="lt1"/>
+            </a:fontRef>
+          </p:style>
+          <p:txBody>
+            <a:bodyPr rtlCol="0" anchor="ctr"/>
+            <a:lstStyle/>
+            <a:p>
+              <a:pPr algn="ctr"/>
+              <a:endParaRPr lang="en-SG" sz="1600" b="1" dirty="0"/>
+            </a:p>
+          </p:txBody>
+        </p:sp>
+        <p:sp>
+          <p:nvSpPr>
+            <p:cNvPr id="41" name="Rectangle 40"/>
+            <p:cNvSpPr/>
+            <p:nvPr/>
+          </p:nvSpPr>
+          <p:spPr>
+            <a:xfrm>
+              <a:off x="3162298" y="1722437"/>
+              <a:ext cx="1458859" cy="304800"/>
+            </a:xfrm>
+            <a:prstGeom prst="rect">
+              <a:avLst/>
+            </a:prstGeom>
+          </p:spPr>
+          <p:style>
+            <a:lnRef idx="2">
+              <a:schemeClr val="accent3">
+                <a:shade val="50000"/>
+              </a:schemeClr>
+            </a:lnRef>
+            <a:fillRef idx="1">
+              <a:schemeClr val="accent3"/>
+            </a:fillRef>
+            <a:effectRef idx="0">
+              <a:schemeClr val="accent3"/>
+            </a:effectRef>
+            <a:fontRef idx="minor">
+              <a:schemeClr val="lt1"/>
+            </a:fontRef>
+          </p:style>
+          <p:txBody>
+            <a:bodyPr rtlCol="0" anchor="ctr"/>
+            <a:lstStyle/>
+            <a:p>
+              <a:pPr algn="ctr"/>
+              <a:r>
+                <a:rPr lang="en-US" sz="1600" b="1" dirty="0" smtClean="0"/>
+                <a:t>*Helper</a:t>
+              </a:r>
+              <a:endParaRPr lang="en-SG" sz="1600" b="1" dirty="0"/>
+            </a:p>
+          </p:txBody>
+        </p:sp>
+      </p:grpSp>
+      <p:sp>
+        <p:nvSpPr>
+          <p:cNvPr id="42" name="Rectangle 41"/>
           <p:cNvSpPr/>
           <p:nvPr/>
         </p:nvSpPr>
         <p:spPr>
           <a:xfrm>
-            <a:off x="595006" y="3958960"/>
-            <a:ext cx="1219200" cy="361770"/>
-          </a:xfrm>
-          <a:prstGeom prst="rect">
-            <a:avLst/>
-          </a:prstGeom>
-        </p:spPr>
-        <p:style>
-          <a:lnRef idx="2">
-            <a:schemeClr val="accent5">
-              <a:shade val="50000"/>
-            </a:schemeClr>
-          </a:lnRef>
-          <a:fillRef idx="1">
-            <a:schemeClr val="accent5"/>
-          </a:fillRef>
-          <a:effectRef idx="0">
-            <a:schemeClr val="accent5"/>
-          </a:effectRef>
-          <a:fontRef idx="minor">
-            <a:schemeClr val="lt1"/>
-          </a:fontRef>
-        </p:style>
-        <p:txBody>
-          <a:bodyPr rtlCol="0" anchor="ctr"/>
-          <a:lstStyle/>
-          <a:p>
-            <a:pPr algn="ctr"/>
-            <a:r>
-              <a:rPr lang="en-US" sz="1600" b="1" dirty="0" smtClean="0"/>
-              <a:t>*Bundle</a:t>
-            </a:r>
-            <a:endParaRPr lang="en-SG" sz="1600" b="1" dirty="0"/>
-          </a:p>
-        </p:txBody>
-      </p:sp>
-      <p:sp>
-        <p:nvSpPr>
-          <p:cNvPr id="72" name="Rectangle 71"/>
-          <p:cNvSpPr/>
-          <p:nvPr/>
-        </p:nvSpPr>
-        <p:spPr>
-          <a:xfrm>
-            <a:off x="643647" y="4007556"/>
-            <a:ext cx="1219200" cy="361770"/>
-          </a:xfrm>
-          <a:prstGeom prst="rect">
-            <a:avLst/>
-          </a:prstGeom>
-        </p:spPr>
-        <p:style>
-          <a:lnRef idx="2">
-            <a:schemeClr val="accent5">
-              <a:shade val="50000"/>
-            </a:schemeClr>
-          </a:lnRef>
-          <a:fillRef idx="1">
-            <a:schemeClr val="accent5"/>
-          </a:fillRef>
-          <a:effectRef idx="0">
-            <a:schemeClr val="accent5"/>
-          </a:effectRef>
-          <a:fontRef idx="minor">
-            <a:schemeClr val="lt1"/>
-          </a:fontRef>
-        </p:style>
-        <p:txBody>
-          <a:bodyPr rtlCol="0" anchor="ctr"/>
-          <a:lstStyle/>
-          <a:p>
-            <a:pPr algn="ctr"/>
-            <a:r>
-              <a:rPr lang="en-US" sz="1600" b="1" dirty="0" smtClean="0"/>
-              <a:t>*Bundle</a:t>
-            </a:r>
-            <a:endParaRPr lang="en-SG" sz="1600" b="1" dirty="0"/>
-          </a:p>
-        </p:txBody>
-      </p:sp>
-      <p:sp>
-        <p:nvSpPr>
-          <p:cNvPr id="73" name="Rectangle 72"/>
-          <p:cNvSpPr/>
-          <p:nvPr/>
-        </p:nvSpPr>
-        <p:spPr>
-          <a:xfrm>
-            <a:off x="697150" y="4056152"/>
-            <a:ext cx="1219200" cy="361770"/>
-          </a:xfrm>
-          <a:prstGeom prst="rect">
-            <a:avLst/>
-          </a:prstGeom>
-        </p:spPr>
-        <p:style>
-          <a:lnRef idx="2">
-            <a:schemeClr val="accent5">
-              <a:shade val="50000"/>
-            </a:schemeClr>
-          </a:lnRef>
-          <a:fillRef idx="1">
-            <a:schemeClr val="accent5"/>
-          </a:fillRef>
-          <a:effectRef idx="0">
-            <a:schemeClr val="accent5"/>
-          </a:effectRef>
-          <a:fontRef idx="minor">
-            <a:schemeClr val="lt1"/>
-          </a:fontRef>
-        </p:style>
-        <p:txBody>
-          <a:bodyPr rtlCol="0" anchor="ctr"/>
-          <a:lstStyle/>
-          <a:p>
-            <a:pPr algn="ctr"/>
-            <a:r>
-              <a:rPr lang="en-US" sz="1600" b="1" dirty="0" smtClean="0"/>
-              <a:t>*Bundle</a:t>
-            </a:r>
-            <a:endParaRPr lang="en-SG" sz="1600" b="1" dirty="0"/>
-          </a:p>
-        </p:txBody>
-      </p:sp>
-      <p:sp>
-        <p:nvSpPr>
-          <p:cNvPr id="74" name="Rectangle 73"/>
-          <p:cNvSpPr/>
-          <p:nvPr/>
-        </p:nvSpPr>
-        <p:spPr>
-          <a:xfrm>
-            <a:off x="2174133" y="3246437"/>
-            <a:ext cx="1219200" cy="361770"/>
-          </a:xfrm>
-          <a:prstGeom prst="rect">
-            <a:avLst/>
-          </a:prstGeom>
-        </p:spPr>
-        <p:style>
-          <a:lnRef idx="2">
-            <a:schemeClr val="accent5">
-              <a:shade val="50000"/>
-            </a:schemeClr>
-          </a:lnRef>
-          <a:fillRef idx="1">
-            <a:schemeClr val="accent5"/>
-          </a:fillRef>
-          <a:effectRef idx="0">
-            <a:schemeClr val="accent5"/>
-          </a:effectRef>
-          <a:fontRef idx="minor">
-            <a:schemeClr val="lt1"/>
-          </a:fontRef>
-        </p:style>
-        <p:txBody>
-          <a:bodyPr rtlCol="0" anchor="ctr"/>
-          <a:lstStyle/>
-          <a:p>
-            <a:pPr algn="ctr"/>
-            <a:r>
-              <a:rPr lang="en-US" sz="1600" b="1" dirty="0" smtClean="0"/>
-              <a:t>*Bundle</a:t>
-            </a:r>
-            <a:endParaRPr lang="en-SG" sz="1600" b="1" dirty="0"/>
-          </a:p>
-        </p:txBody>
-      </p:sp>
-      <p:sp>
-        <p:nvSpPr>
-          <p:cNvPr id="75" name="Rectangle 74"/>
-          <p:cNvSpPr/>
-          <p:nvPr/>
-        </p:nvSpPr>
-        <p:spPr>
-          <a:xfrm>
-            <a:off x="2222774" y="3295033"/>
-            <a:ext cx="1219200" cy="361770"/>
-          </a:xfrm>
-          <a:prstGeom prst="rect">
-            <a:avLst/>
-          </a:prstGeom>
-        </p:spPr>
-        <p:style>
-          <a:lnRef idx="2">
-            <a:schemeClr val="accent5">
-              <a:shade val="50000"/>
-            </a:schemeClr>
-          </a:lnRef>
-          <a:fillRef idx="1">
-            <a:schemeClr val="accent5"/>
-          </a:fillRef>
-          <a:effectRef idx="0">
-            <a:schemeClr val="accent5"/>
-          </a:effectRef>
-          <a:fontRef idx="minor">
-            <a:schemeClr val="lt1"/>
-          </a:fontRef>
-        </p:style>
-        <p:txBody>
-          <a:bodyPr rtlCol="0" anchor="ctr"/>
-          <a:lstStyle/>
-          <a:p>
-            <a:pPr algn="ctr"/>
-            <a:r>
-              <a:rPr lang="en-US" sz="1600" b="1" dirty="0" smtClean="0"/>
-              <a:t>*Bundle</a:t>
-            </a:r>
-            <a:endParaRPr lang="en-SG" sz="1600" b="1" dirty="0"/>
-          </a:p>
-        </p:txBody>
-      </p:sp>
-      <p:sp>
-        <p:nvSpPr>
-          <p:cNvPr id="76" name="Rectangle 75"/>
-          <p:cNvSpPr/>
-          <p:nvPr/>
-        </p:nvSpPr>
-        <p:spPr>
-          <a:xfrm>
-            <a:off x="2276277" y="3343629"/>
-            <a:ext cx="1219200" cy="361770"/>
-          </a:xfrm>
-          <a:prstGeom prst="rect">
-            <a:avLst/>
-          </a:prstGeom>
-        </p:spPr>
-        <p:style>
-          <a:lnRef idx="2">
-            <a:schemeClr val="accent5">
-              <a:shade val="50000"/>
-            </a:schemeClr>
-          </a:lnRef>
-          <a:fillRef idx="1">
-            <a:schemeClr val="accent5"/>
-          </a:fillRef>
-          <a:effectRef idx="0">
-            <a:schemeClr val="accent5"/>
-          </a:effectRef>
-          <a:fontRef idx="minor">
-            <a:schemeClr val="lt1"/>
-          </a:fontRef>
-        </p:style>
-        <p:txBody>
-          <a:bodyPr rtlCol="0" anchor="ctr"/>
-          <a:lstStyle/>
-          <a:p>
-            <a:pPr algn="ctr"/>
-            <a:r>
-              <a:rPr lang="en-US" sz="1600" b="1" dirty="0" smtClean="0"/>
-              <a:t>*Stats</a:t>
-            </a:r>
-            <a:endParaRPr lang="en-SG" sz="1600" b="1" dirty="0"/>
-          </a:p>
-        </p:txBody>
-      </p:sp>
-      <p:sp>
-        <p:nvSpPr>
-          <p:cNvPr id="77" name="Rectangle 76"/>
-          <p:cNvSpPr/>
-          <p:nvPr/>
-        </p:nvSpPr>
-        <p:spPr>
-          <a:xfrm>
-            <a:off x="2174133" y="4007556"/>
-            <a:ext cx="1219200" cy="361770"/>
-          </a:xfrm>
-          <a:prstGeom prst="rect">
-            <a:avLst/>
-          </a:prstGeom>
-        </p:spPr>
-        <p:style>
-          <a:lnRef idx="2">
-            <a:schemeClr val="accent5">
-              <a:shade val="50000"/>
-            </a:schemeClr>
-          </a:lnRef>
-          <a:fillRef idx="1">
-            <a:schemeClr val="accent5"/>
-          </a:fillRef>
-          <a:effectRef idx="0">
-            <a:schemeClr val="accent5"/>
-          </a:effectRef>
-          <a:fontRef idx="minor">
-            <a:schemeClr val="lt1"/>
-          </a:fontRef>
-        </p:style>
-        <p:txBody>
-          <a:bodyPr rtlCol="0" anchor="ctr"/>
-          <a:lstStyle/>
-          <a:p>
-            <a:pPr algn="ctr"/>
-            <a:r>
-              <a:rPr lang="en-US" sz="1600" b="1" dirty="0" smtClean="0"/>
-              <a:t>*Bundle</a:t>
-            </a:r>
-            <a:endParaRPr lang="en-SG" sz="1600" b="1" dirty="0"/>
-          </a:p>
-        </p:txBody>
-      </p:sp>
-      <p:sp>
-        <p:nvSpPr>
-          <p:cNvPr id="78" name="Rectangle 77"/>
-          <p:cNvSpPr/>
-          <p:nvPr/>
-        </p:nvSpPr>
-        <p:spPr>
-          <a:xfrm>
-            <a:off x="2222774" y="4056152"/>
-            <a:ext cx="1219200" cy="361770"/>
-          </a:xfrm>
-          <a:prstGeom prst="rect">
-            <a:avLst/>
-          </a:prstGeom>
-        </p:spPr>
-        <p:style>
-          <a:lnRef idx="2">
-            <a:schemeClr val="accent5">
-              <a:shade val="50000"/>
-            </a:schemeClr>
-          </a:lnRef>
-          <a:fillRef idx="1">
-            <a:schemeClr val="accent5"/>
-          </a:fillRef>
-          <a:effectRef idx="0">
-            <a:schemeClr val="accent5"/>
-          </a:effectRef>
-          <a:fontRef idx="minor">
-            <a:schemeClr val="lt1"/>
-          </a:fontRef>
-        </p:style>
-        <p:txBody>
-          <a:bodyPr rtlCol="0" anchor="ctr"/>
-          <a:lstStyle/>
-          <a:p>
-            <a:pPr algn="ctr"/>
-            <a:r>
-              <a:rPr lang="en-US" sz="1600" b="1" dirty="0" smtClean="0"/>
-              <a:t>*Bundle</a:t>
-            </a:r>
-            <a:endParaRPr lang="en-SG" sz="1600" b="1" dirty="0"/>
-          </a:p>
-        </p:txBody>
-      </p:sp>
-      <p:sp>
-        <p:nvSpPr>
-          <p:cNvPr id="79" name="Rectangle 78"/>
-          <p:cNvSpPr/>
-          <p:nvPr/>
-        </p:nvSpPr>
-        <p:spPr>
-          <a:xfrm>
-            <a:off x="2276277" y="4104748"/>
-            <a:ext cx="1219200" cy="361770"/>
-          </a:xfrm>
-          <a:prstGeom prst="rect">
-            <a:avLst/>
-          </a:prstGeom>
-        </p:spPr>
-        <p:style>
-          <a:lnRef idx="2">
-            <a:schemeClr val="accent5">
-              <a:shade val="50000"/>
-            </a:schemeClr>
-          </a:lnRef>
-          <a:fillRef idx="1">
-            <a:schemeClr val="accent5"/>
-          </a:fillRef>
-          <a:effectRef idx="0">
-            <a:schemeClr val="accent5"/>
-          </a:effectRef>
-          <a:fontRef idx="minor">
-            <a:schemeClr val="lt1"/>
-          </a:fontRef>
-        </p:style>
-        <p:txBody>
-          <a:bodyPr rtlCol="0" anchor="ctr"/>
-          <a:lstStyle/>
-          <a:p>
-            <a:pPr algn="ctr"/>
-            <a:r>
-              <a:rPr lang="en-US" sz="1600" b="1" dirty="0" smtClean="0"/>
-              <a:t>*</a:t>
-            </a:r>
-            <a:r>
-              <a:rPr lang="en-US" sz="1600" b="1" dirty="0" smtClean="0"/>
-              <a:t>Summary</a:t>
-            </a:r>
-            <a:endParaRPr lang="en-SG" sz="1600" b="1" dirty="0"/>
-          </a:p>
-        </p:txBody>
-      </p:sp>
-      <p:sp>
-        <p:nvSpPr>
-          <p:cNvPr id="39" name="Rectangle 38"/>
-          <p:cNvSpPr/>
-          <p:nvPr/>
-        </p:nvSpPr>
-        <p:spPr>
-          <a:xfrm>
-            <a:off x="3303639" y="1593273"/>
-            <a:ext cx="1458859" cy="304800"/>
+            <a:off x="533400" y="1390938"/>
+            <a:ext cx="1253247" cy="304800"/>
           </a:xfrm>
           <a:prstGeom prst="rect">
             <a:avLst/>
@@ -5133,7 +5282,7 @@
             <a:pPr algn="ctr"/>
             <a:r>
               <a:rPr lang="en-US" sz="1600" b="1" dirty="0" smtClean="0"/>
-              <a:t>*Helper</a:t>
+              <a:t>Sanitizer</a:t>
             </a:r>
             <a:endParaRPr lang="en-SG" sz="1600" b="1" dirty="0"/>
           </a:p>
@@ -5141,14 +5290,14 @@
       </p:sp>
       <p:sp>
         <p:nvSpPr>
-          <p:cNvPr id="40" name="Rectangle 39"/>
+          <p:cNvPr id="43" name="Rectangle 42"/>
           <p:cNvSpPr/>
           <p:nvPr/>
         </p:nvSpPr>
         <p:spPr>
           <a:xfrm>
-            <a:off x="3227439" y="1667019"/>
-            <a:ext cx="1458859" cy="304800"/>
+            <a:off x="1948770" y="1016864"/>
+            <a:ext cx="1023030" cy="304800"/>
           </a:xfrm>
           <a:prstGeom prst="rect">
             <a:avLst/>
@@ -5176,8 +5325,8 @@
           <a:p>
             <a:pPr algn="ctr"/>
             <a:r>
-              <a:rPr lang="en-US" sz="1600" b="1" dirty="0" smtClean="0"/>
-              <a:t>*Helper</a:t>
+              <a:rPr lang="en-US" sz="1600" b="1" dirty="0" err="1" smtClean="0"/>
+              <a:t>Config</a:t>
             </a:r>
             <a:endParaRPr lang="en-SG" sz="1600" b="1" dirty="0"/>
           </a:p>
@@ -5185,14 +5334,14 @@
       </p:sp>
       <p:sp>
         <p:nvSpPr>
-          <p:cNvPr id="41" name="Rectangle 40"/>
+          <p:cNvPr id="44" name="Rectangle 43"/>
           <p:cNvSpPr/>
           <p:nvPr/>
         </p:nvSpPr>
         <p:spPr>
           <a:xfrm>
-            <a:off x="3162298" y="1722437"/>
-            <a:ext cx="1458859" cy="304800"/>
+            <a:off x="1940962" y="1373619"/>
+            <a:ext cx="1023030" cy="304800"/>
           </a:xfrm>
           <a:prstGeom prst="rect">
             <a:avLst/>
@@ -5220,8 +5369,8 @@
           <a:p>
             <a:pPr algn="ctr"/>
             <a:r>
-              <a:rPr lang="en-US" sz="1600" b="1" dirty="0" smtClean="0"/>
-              <a:t>*Helper</a:t>
+              <a:rPr lang="en-US" sz="1600" b="1" dirty="0" err="1" smtClean="0"/>
+              <a:t>Const</a:t>
             </a:r>
             <a:endParaRPr lang="en-SG" sz="1600" b="1" dirty="0"/>
           </a:p>
@@ -5229,14 +5378,14 @@
       </p:sp>
       <p:sp>
         <p:nvSpPr>
-          <p:cNvPr id="42" name="Rectangle 41"/>
+          <p:cNvPr id="45" name="Rectangle 44"/>
           <p:cNvSpPr/>
           <p:nvPr/>
         </p:nvSpPr>
         <p:spPr>
           <a:xfrm>
-            <a:off x="533400" y="1390938"/>
-            <a:ext cx="1253247" cy="304800"/>
+            <a:off x="1941843" y="1722437"/>
+            <a:ext cx="1023030" cy="304800"/>
           </a:xfrm>
           <a:prstGeom prst="rect">
             <a:avLst/>
@@ -5264,8 +5413,8 @@
           <a:p>
             <a:pPr algn="ctr"/>
             <a:r>
-              <a:rPr lang="en-US" sz="1600" b="1" dirty="0" smtClean="0"/>
-              <a:t>Sanitizer</a:t>
+              <a:rPr lang="en-US" sz="1600" b="1" dirty="0" err="1" smtClean="0"/>
+              <a:t>Url</a:t>
             </a:r>
             <a:endParaRPr lang="en-SG" sz="1600" b="1" dirty="0"/>
           </a:p>
@@ -5273,14 +5422,14 @@
       </p:sp>
       <p:sp>
         <p:nvSpPr>
-          <p:cNvPr id="43" name="Rectangle 42"/>
+          <p:cNvPr id="46" name="Rectangle 45"/>
           <p:cNvSpPr/>
           <p:nvPr/>
         </p:nvSpPr>
         <p:spPr>
           <a:xfrm>
-            <a:off x="1948770" y="1016864"/>
-            <a:ext cx="1023030" cy="304800"/>
+            <a:off x="533399" y="1747692"/>
+            <a:ext cx="1253247" cy="304800"/>
           </a:xfrm>
           <a:prstGeom prst="rect">
             <a:avLst/>
@@ -5308,233 +5457,152 @@
           <a:p>
             <a:pPr algn="ctr"/>
             <a:r>
-              <a:rPr lang="en-US" sz="1600" b="1" dirty="0" err="1" smtClean="0"/>
-              <a:t>Config</a:t>
+              <a:rPr lang="en-US" sz="1600" b="1" dirty="0" smtClean="0"/>
+              <a:t>Templates</a:t>
             </a:r>
             <a:endParaRPr lang="en-SG" sz="1600" b="1" dirty="0"/>
           </a:p>
         </p:txBody>
       </p:sp>
-      <p:sp>
-        <p:nvSpPr>
-          <p:cNvPr id="44" name="Rectangle 43"/>
-          <p:cNvSpPr/>
+      <p:grpSp>
+        <p:nvGrpSpPr>
+          <p:cNvPr id="3" name="Group 2"/>
+          <p:cNvGrpSpPr/>
           <p:nvPr/>
-        </p:nvSpPr>
-        <p:spPr>
-          <a:xfrm>
-            <a:off x="1940962" y="1373619"/>
-            <a:ext cx="1023030" cy="304800"/>
-          </a:xfrm>
-          <a:prstGeom prst="rect">
-            <a:avLst/>
-          </a:prstGeom>
-        </p:spPr>
-        <p:style>
-          <a:lnRef idx="2">
-            <a:schemeClr val="accent3">
-              <a:shade val="50000"/>
-            </a:schemeClr>
-          </a:lnRef>
-          <a:fillRef idx="1">
-            <a:schemeClr val="accent3"/>
-          </a:fillRef>
-          <a:effectRef idx="0">
-            <a:schemeClr val="accent3"/>
-          </a:effectRef>
-          <a:fontRef idx="minor">
-            <a:schemeClr val="lt1"/>
-          </a:fontRef>
-        </p:style>
-        <p:txBody>
-          <a:bodyPr rtlCol="0" anchor="ctr"/>
-          <a:lstStyle/>
-          <a:p>
-            <a:pPr algn="ctr"/>
-            <a:r>
-              <a:rPr lang="en-US" sz="1600" b="1" dirty="0" err="1" smtClean="0"/>
-              <a:t>Const</a:t>
-            </a:r>
-            <a:endParaRPr lang="en-SG" sz="1600" b="1" dirty="0"/>
-          </a:p>
-        </p:txBody>
-      </p:sp>
-      <p:sp>
-        <p:nvSpPr>
-          <p:cNvPr id="45" name="Rectangle 44"/>
-          <p:cNvSpPr/>
-          <p:nvPr/>
-        </p:nvSpPr>
-        <p:spPr>
-          <a:xfrm>
-            <a:off x="1941843" y="1722437"/>
-            <a:ext cx="1023030" cy="304800"/>
-          </a:xfrm>
-          <a:prstGeom prst="rect">
-            <a:avLst/>
-          </a:prstGeom>
-        </p:spPr>
-        <p:style>
-          <a:lnRef idx="2">
-            <a:schemeClr val="accent3">
-              <a:shade val="50000"/>
-            </a:schemeClr>
-          </a:lnRef>
-          <a:fillRef idx="1">
-            <a:schemeClr val="accent3"/>
-          </a:fillRef>
-          <a:effectRef idx="0">
-            <a:schemeClr val="accent3"/>
-          </a:effectRef>
-          <a:fontRef idx="minor">
-            <a:schemeClr val="lt1"/>
-          </a:fontRef>
-        </p:style>
-        <p:txBody>
-          <a:bodyPr rtlCol="0" anchor="ctr"/>
-          <a:lstStyle/>
-          <a:p>
-            <a:pPr algn="ctr"/>
-            <a:r>
-              <a:rPr lang="en-US" sz="1600" b="1" dirty="0" err="1" smtClean="0"/>
-              <a:t>Url</a:t>
-            </a:r>
-            <a:endParaRPr lang="en-SG" sz="1600" b="1" dirty="0"/>
-          </a:p>
-        </p:txBody>
-      </p:sp>
-      <p:sp>
-        <p:nvSpPr>
-          <p:cNvPr id="46" name="Rectangle 45"/>
-          <p:cNvSpPr/>
-          <p:nvPr/>
-        </p:nvSpPr>
-        <p:spPr>
-          <a:xfrm>
-            <a:off x="533399" y="1747692"/>
-            <a:ext cx="1253247" cy="304800"/>
-          </a:xfrm>
-          <a:prstGeom prst="rect">
-            <a:avLst/>
-          </a:prstGeom>
-        </p:spPr>
-        <p:style>
-          <a:lnRef idx="2">
-            <a:schemeClr val="accent3">
-              <a:shade val="50000"/>
-            </a:schemeClr>
-          </a:lnRef>
-          <a:fillRef idx="1">
-            <a:schemeClr val="accent3"/>
-          </a:fillRef>
-          <a:effectRef idx="0">
-            <a:schemeClr val="accent3"/>
-          </a:effectRef>
-          <a:fontRef idx="minor">
-            <a:schemeClr val="lt1"/>
-          </a:fontRef>
-        </p:style>
-        <p:txBody>
-          <a:bodyPr rtlCol="0" anchor="ctr"/>
-          <a:lstStyle/>
-          <a:p>
-            <a:pPr algn="ctr"/>
-            <a:r>
-              <a:rPr lang="en-US" sz="1600" b="1" dirty="0" err="1" smtClean="0"/>
-              <a:t>Utils</a:t>
-            </a:r>
-            <a:endParaRPr lang="en-SG" sz="1600" b="1" dirty="0"/>
-          </a:p>
-        </p:txBody>
-      </p:sp>
-      <p:sp>
-        <p:nvSpPr>
-          <p:cNvPr id="50" name="Rectangle 49"/>
-          <p:cNvSpPr/>
-          <p:nvPr/>
-        </p:nvSpPr>
-        <p:spPr>
-          <a:xfrm>
-            <a:off x="643647" y="3295033"/>
-            <a:ext cx="1219201" cy="361770"/>
-          </a:xfrm>
-          <a:prstGeom prst="rect">
-            <a:avLst/>
-          </a:prstGeom>
-        </p:spPr>
-        <p:style>
-          <a:lnRef idx="2">
-            <a:schemeClr val="accent4">
-              <a:shade val="50000"/>
-            </a:schemeClr>
-          </a:lnRef>
-          <a:fillRef idx="1">
-            <a:schemeClr val="accent4"/>
-          </a:fillRef>
-          <a:effectRef idx="0">
-            <a:schemeClr val="accent4"/>
-          </a:effectRef>
-          <a:fontRef idx="minor">
-            <a:schemeClr val="lt1"/>
-          </a:fontRef>
-        </p:style>
-        <p:txBody>
-          <a:bodyPr rtlCol="0" anchor="ctr"/>
-          <a:lstStyle/>
-          <a:p>
-            <a:pPr algn="ctr"/>
-            <a:r>
-              <a:rPr lang="en-US" sz="1600" b="1" dirty="0" smtClean="0"/>
-              <a:t>*Type</a:t>
-            </a:r>
-            <a:endParaRPr lang="en-SG" sz="1600" b="1" dirty="0"/>
-          </a:p>
-        </p:txBody>
-      </p:sp>
-      <p:sp>
-        <p:nvSpPr>
-          <p:cNvPr id="52" name="Rectangle 51"/>
-          <p:cNvSpPr/>
-          <p:nvPr/>
-        </p:nvSpPr>
-        <p:spPr>
-          <a:xfrm>
-            <a:off x="697150" y="3338241"/>
-            <a:ext cx="1219201" cy="361770"/>
-          </a:xfrm>
-          <a:prstGeom prst="rect">
-            <a:avLst/>
-          </a:prstGeom>
-        </p:spPr>
-        <p:style>
-          <a:lnRef idx="2">
-            <a:schemeClr val="accent4">
-              <a:shade val="50000"/>
-            </a:schemeClr>
-          </a:lnRef>
-          <a:fillRef idx="1">
-            <a:schemeClr val="accent4"/>
-          </a:fillRef>
-          <a:effectRef idx="0">
-            <a:schemeClr val="accent4"/>
-          </a:effectRef>
-          <a:fontRef idx="minor">
-            <a:schemeClr val="lt1"/>
-          </a:fontRef>
-        </p:style>
-        <p:txBody>
-          <a:bodyPr rtlCol="0" anchor="ctr"/>
-          <a:lstStyle/>
-          <a:p>
-            <a:pPr algn="ctr"/>
-            <a:r>
-              <a:rPr lang="en-US" sz="1600" b="1" dirty="0" smtClean="0"/>
-              <a:t>*Type</a:t>
-            </a:r>
-            <a:endParaRPr lang="en-SG" sz="1600" b="1" dirty="0"/>
-          </a:p>
-        </p:txBody>
-      </p:sp>
+        </p:nvGrpSpPr>
+        <p:grpSpPr>
+          <a:xfrm>
+            <a:off x="609599" y="3250641"/>
+            <a:ext cx="1306752" cy="449370"/>
+            <a:chOff x="609599" y="3250641"/>
+            <a:chExt cx="1306752" cy="449370"/>
+          </a:xfrm>
+        </p:grpSpPr>
+        <p:sp>
+          <p:nvSpPr>
+            <p:cNvPr id="171" name="Rectangle 170"/>
+            <p:cNvSpPr/>
+            <p:nvPr/>
+          </p:nvSpPr>
+          <p:spPr>
+            <a:xfrm>
+              <a:off x="609599" y="3250641"/>
+              <a:ext cx="1219201" cy="361770"/>
+            </a:xfrm>
+            <a:prstGeom prst="rect">
+              <a:avLst/>
+            </a:prstGeom>
+          </p:spPr>
+          <p:style>
+            <a:lnRef idx="2">
+              <a:schemeClr val="accent4">
+                <a:shade val="50000"/>
+              </a:schemeClr>
+            </a:lnRef>
+            <a:fillRef idx="1">
+              <a:schemeClr val="accent4"/>
+            </a:fillRef>
+            <a:effectRef idx="0">
+              <a:schemeClr val="accent4"/>
+            </a:effectRef>
+            <a:fontRef idx="minor">
+              <a:schemeClr val="lt1"/>
+            </a:fontRef>
+          </p:style>
+          <p:txBody>
+            <a:bodyPr rtlCol="0" anchor="ctr"/>
+            <a:lstStyle/>
+            <a:p>
+              <a:pPr algn="ctr"/>
+              <a:endParaRPr lang="en-SG" sz="1600" b="1" dirty="0"/>
+            </a:p>
+          </p:txBody>
+        </p:sp>
+        <p:sp>
+          <p:nvSpPr>
+            <p:cNvPr id="50" name="Rectangle 49"/>
+            <p:cNvSpPr/>
+            <p:nvPr/>
+          </p:nvSpPr>
+          <p:spPr>
+            <a:xfrm>
+              <a:off x="643647" y="3295033"/>
+              <a:ext cx="1219201" cy="361770"/>
+            </a:xfrm>
+            <a:prstGeom prst="rect">
+              <a:avLst/>
+            </a:prstGeom>
+          </p:spPr>
+          <p:style>
+            <a:lnRef idx="2">
+              <a:schemeClr val="accent4">
+                <a:shade val="50000"/>
+              </a:schemeClr>
+            </a:lnRef>
+            <a:fillRef idx="1">
+              <a:schemeClr val="accent4"/>
+            </a:fillRef>
+            <a:effectRef idx="0">
+              <a:schemeClr val="accent4"/>
+            </a:effectRef>
+            <a:fontRef idx="minor">
+              <a:schemeClr val="lt1"/>
+            </a:fontRef>
+          </p:style>
+          <p:txBody>
+            <a:bodyPr rtlCol="0" anchor="ctr"/>
+            <a:lstStyle/>
+            <a:p>
+              <a:pPr algn="ctr"/>
+              <a:endParaRPr lang="en-SG" sz="1600" b="1" dirty="0"/>
+            </a:p>
+          </p:txBody>
+        </p:sp>
+        <p:sp>
+          <p:nvSpPr>
+            <p:cNvPr id="52" name="Rectangle 51"/>
+            <p:cNvSpPr/>
+            <p:nvPr/>
+          </p:nvSpPr>
+          <p:spPr>
+            <a:xfrm>
+              <a:off x="697150" y="3338241"/>
+              <a:ext cx="1219201" cy="361770"/>
+            </a:xfrm>
+            <a:prstGeom prst="rect">
+              <a:avLst/>
+            </a:prstGeom>
+          </p:spPr>
+          <p:style>
+            <a:lnRef idx="2">
+              <a:schemeClr val="accent4">
+                <a:shade val="50000"/>
+              </a:schemeClr>
+            </a:lnRef>
+            <a:fillRef idx="1">
+              <a:schemeClr val="accent4"/>
+            </a:fillRef>
+            <a:effectRef idx="0">
+              <a:schemeClr val="accent4"/>
+            </a:effectRef>
+            <a:fontRef idx="minor">
+              <a:schemeClr val="lt1"/>
+            </a:fontRef>
+          </p:style>
+          <p:txBody>
+            <a:bodyPr rtlCol="0" anchor="ctr"/>
+            <a:lstStyle/>
+            <a:p>
+              <a:pPr algn="ctr"/>
+              <a:r>
+                <a:rPr lang="en-US" sz="1600" b="1" dirty="0" smtClean="0"/>
+                <a:t>*Type</a:t>
+              </a:r>
+              <a:endParaRPr lang="en-SG" sz="1600" b="1" dirty="0"/>
+            </a:p>
+          </p:txBody>
+        </p:sp>
+      </p:grpSp>
     </p:spTree>
     <p:extLst>
       <p:ext uri="{BB962C8B-B14F-4D97-AF65-F5344CB8AC3E}">

</xml_diff>

<commit_message>
[#7594] design.md: update content and diagrams and remove unnecessary DTOs (#10599)
* Update terms used in design.md

* Update design diagrams

* Remove unnecessary StudentResultSummary DTO

* Remove unnecessary FeedbackSessionStats DTO

* Remove unnecessary FeedbackSessionDetailsBundle DTO

* Remove unnecessary TeamDetailsBundle DTO
</commit_message>
<xml_diff>
--- a/docs/images/CommonComponent.pptx
+++ b/docs/images/CommonComponent.pptx
@@ -322,7 +322,7 @@
             <a:fld id="{1D8BD707-D9CF-40AE-B4C6-C98DA3205C09}" type="datetimeFigureOut">
               <a:rPr lang="en-US" smtClean="0"/>
               <a:pPr/>
-              <a:t>1/28/2017</a:t>
+              <a:t>8/14/2020</a:t>
             </a:fld>
             <a:endParaRPr lang="en-US"/>
           </a:p>
@@ -529,7 +529,7 @@
             <a:fld id="{1D8BD707-D9CF-40AE-B4C6-C98DA3205C09}" type="datetimeFigureOut">
               <a:rPr lang="en-US" smtClean="0"/>
               <a:pPr/>
-              <a:t>1/28/2017</a:t>
+              <a:t>8/14/2020</a:t>
             </a:fld>
             <a:endParaRPr lang="en-US"/>
           </a:p>
@@ -736,7 +736,7 @@
             <a:fld id="{1D8BD707-D9CF-40AE-B4C6-C98DA3205C09}" type="datetimeFigureOut">
               <a:rPr lang="en-US" smtClean="0"/>
               <a:pPr/>
-              <a:t>1/28/2017</a:t>
+              <a:t>8/14/2020</a:t>
             </a:fld>
             <a:endParaRPr lang="en-US"/>
           </a:p>
@@ -943,7 +943,7 @@
             <a:fld id="{1D8BD707-D9CF-40AE-B4C6-C98DA3205C09}" type="datetimeFigureOut">
               <a:rPr lang="en-US" smtClean="0"/>
               <a:pPr/>
-              <a:t>1/28/2017</a:t>
+              <a:t>8/14/2020</a:t>
             </a:fld>
             <a:endParaRPr lang="en-US"/>
           </a:p>
@@ -1216,7 +1216,7 @@
             <a:fld id="{1D8BD707-D9CF-40AE-B4C6-C98DA3205C09}" type="datetimeFigureOut">
               <a:rPr lang="en-US" smtClean="0"/>
               <a:pPr/>
-              <a:t>1/28/2017</a:t>
+              <a:t>8/14/2020</a:t>
             </a:fld>
             <a:endParaRPr lang="en-US"/>
           </a:p>
@@ -1539,7 +1539,7 @@
             <a:fld id="{1D8BD707-D9CF-40AE-B4C6-C98DA3205C09}" type="datetimeFigureOut">
               <a:rPr lang="en-US" smtClean="0"/>
               <a:pPr/>
-              <a:t>1/28/2017</a:t>
+              <a:t>8/14/2020</a:t>
             </a:fld>
             <a:endParaRPr lang="en-US"/>
           </a:p>
@@ -2002,7 +2002,7 @@
             <a:fld id="{1D8BD707-D9CF-40AE-B4C6-C98DA3205C09}" type="datetimeFigureOut">
               <a:rPr lang="en-US" smtClean="0"/>
               <a:pPr/>
-              <a:t>1/28/2017</a:t>
+              <a:t>8/14/2020</a:t>
             </a:fld>
             <a:endParaRPr lang="en-US"/>
           </a:p>
@@ -2149,7 +2149,7 @@
             <a:fld id="{1D8BD707-D9CF-40AE-B4C6-C98DA3205C09}" type="datetimeFigureOut">
               <a:rPr lang="en-US" smtClean="0"/>
               <a:pPr/>
-              <a:t>1/28/2017</a:t>
+              <a:t>8/14/2020</a:t>
             </a:fld>
             <a:endParaRPr lang="en-US"/>
           </a:p>
@@ -2265,7 +2265,7 @@
             <a:fld id="{1D8BD707-D9CF-40AE-B4C6-C98DA3205C09}" type="datetimeFigureOut">
               <a:rPr lang="en-US" smtClean="0"/>
               <a:pPr/>
-              <a:t>1/28/2017</a:t>
+              <a:t>8/14/2020</a:t>
             </a:fld>
             <a:endParaRPr lang="en-US"/>
           </a:p>
@@ -2572,7 +2572,7 @@
             <a:fld id="{1D8BD707-D9CF-40AE-B4C6-C98DA3205C09}" type="datetimeFigureOut">
               <a:rPr lang="en-US" smtClean="0"/>
               <a:pPr/>
-              <a:t>1/28/2017</a:t>
+              <a:t>8/14/2020</a:t>
             </a:fld>
             <a:endParaRPr lang="en-US"/>
           </a:p>
@@ -2855,7 +2855,7 @@
             <a:fld id="{1D8BD707-D9CF-40AE-B4C6-C98DA3205C09}" type="datetimeFigureOut">
               <a:rPr lang="en-US" smtClean="0"/>
               <a:pPr/>
-              <a:t>1/28/2017</a:t>
+              <a:t>8/14/2020</a:t>
             </a:fld>
             <a:endParaRPr lang="en-US"/>
           </a:p>
@@ -3016,8 +3016,8 @@
         </p:nvGrpSpPr>
         <p:grpSpPr>
           <a:xfrm>
-            <a:off x="381000" y="2260917"/>
-            <a:ext cx="8305800" cy="2433320"/>
+            <a:off x="381000" y="1874837"/>
+            <a:ext cx="8305800" cy="2819400"/>
             <a:chOff x="381000" y="2260917"/>
             <a:chExt cx="8305800" cy="2433320"/>
           </a:xfrm>
@@ -3162,7 +3162,7 @@
         <p:grpSpPr>
           <a:xfrm>
             <a:off x="5105400" y="458411"/>
-            <a:ext cx="3581400" cy="1721226"/>
+            <a:ext cx="3581400" cy="1264026"/>
             <a:chOff x="5105400" y="458411"/>
             <a:chExt cx="3581400" cy="1721226"/>
           </a:xfrm>
@@ -3297,7 +3297,7 @@
         <p:grpSpPr>
           <a:xfrm>
             <a:off x="380999" y="484707"/>
-            <a:ext cx="4495801" cy="1694930"/>
+            <a:ext cx="4495801" cy="1237730"/>
             <a:chOff x="380999" y="484707"/>
             <a:chExt cx="4495801" cy="1694930"/>
           </a:xfrm>
@@ -3433,6 +3433,136 @@
           </p:txBody>
         </p:sp>
       </p:grpSp>
+      <p:sp>
+        <p:nvSpPr>
+          <p:cNvPr id="13" name="Rectangle 12"/>
+          <p:cNvSpPr/>
+          <p:nvPr userDrawn="1"/>
+        </p:nvSpPr>
+        <p:spPr>
+          <a:xfrm>
+            <a:off x="5410200" y="2215589"/>
+            <a:ext cx="3124200" cy="2326248"/>
+          </a:xfrm>
+          <a:prstGeom prst="rect">
+            <a:avLst/>
+          </a:prstGeom>
+          <a:solidFill>
+            <a:schemeClr val="bg1"/>
+          </a:solidFill>
+          <a:ln>
+            <a:solidFill>
+              <a:schemeClr val="accent5">
+                <a:lumMod val="75000"/>
+              </a:schemeClr>
+            </a:solidFill>
+          </a:ln>
+        </p:spPr>
+        <p:style>
+          <a:lnRef idx="2">
+            <a:schemeClr val="accent1">
+              <a:shade val="50000"/>
+            </a:schemeClr>
+          </a:lnRef>
+          <a:fillRef idx="1">
+            <a:schemeClr val="accent1"/>
+          </a:fillRef>
+          <a:effectRef idx="0">
+            <a:schemeClr val="accent1"/>
+          </a:effectRef>
+          <a:fontRef idx="minor">
+            <a:schemeClr val="lt1"/>
+          </a:fontRef>
+        </p:style>
+        <p:txBody>
+          <a:bodyPr rtlCol="0" anchor="t" anchorCtr="0"/>
+          <a:lstStyle/>
+          <a:p>
+            <a:r>
+              <a:rPr lang="en-US" sz="1400" b="1" dirty="0" smtClean="0">
+                <a:solidFill>
+                  <a:schemeClr val="accent5">
+                    <a:lumMod val="75000"/>
+                  </a:schemeClr>
+                </a:solidFill>
+              </a:rPr>
+              <a:t>::questions</a:t>
+            </a:r>
+            <a:endParaRPr lang="en-SG" sz="1400" b="1" dirty="0">
+              <a:solidFill>
+                <a:schemeClr val="accent5">
+                  <a:lumMod val="75000"/>
+                </a:schemeClr>
+              </a:solidFill>
+            </a:endParaRPr>
+          </a:p>
+        </p:txBody>
+      </p:sp>
+      <p:sp>
+        <p:nvSpPr>
+          <p:cNvPr id="14" name="Rectangle 13"/>
+          <p:cNvSpPr/>
+          <p:nvPr userDrawn="1"/>
+        </p:nvSpPr>
+        <p:spPr>
+          <a:xfrm>
+            <a:off x="2438400" y="2215589"/>
+            <a:ext cx="2667000" cy="2326248"/>
+          </a:xfrm>
+          <a:prstGeom prst="rect">
+            <a:avLst/>
+          </a:prstGeom>
+          <a:solidFill>
+            <a:schemeClr val="bg1"/>
+          </a:solidFill>
+          <a:ln>
+            <a:solidFill>
+              <a:schemeClr val="accent5">
+                <a:lumMod val="75000"/>
+              </a:schemeClr>
+            </a:solidFill>
+          </a:ln>
+        </p:spPr>
+        <p:style>
+          <a:lnRef idx="2">
+            <a:schemeClr val="accent1">
+              <a:shade val="50000"/>
+            </a:schemeClr>
+          </a:lnRef>
+          <a:fillRef idx="1">
+            <a:schemeClr val="accent1"/>
+          </a:fillRef>
+          <a:effectRef idx="0">
+            <a:schemeClr val="accent1"/>
+          </a:effectRef>
+          <a:fontRef idx="minor">
+            <a:schemeClr val="lt1"/>
+          </a:fontRef>
+        </p:style>
+        <p:txBody>
+          <a:bodyPr rtlCol="0" anchor="t" anchorCtr="0"/>
+          <a:lstStyle/>
+          <a:p>
+            <a:r>
+              <a:rPr lang="en-US" sz="1400" b="1" dirty="0" smtClean="0">
+                <a:solidFill>
+                  <a:schemeClr val="accent5">
+                    <a:lumMod val="75000"/>
+                  </a:schemeClr>
+                </a:solidFill>
+              </a:rPr>
+              <a:t>::attributes</a:t>
+            </a:r>
+            <a:endParaRPr lang="en-SG" sz="1400" b="1" dirty="0">
+              <a:solidFill>
+                <a:schemeClr val="accent5">
+                  <a:lumMod val="75000"/>
+                </a:schemeClr>
+              </a:solidFill>
+            </a:endParaRPr>
+          </a:p>
+        </p:txBody>
+      </p:sp>
     </p:spTree>
   </p:cSld>
   <p:clrMap bg1="lt1" tx1="dk1" bg2="lt2" tx2="dk2" accent1="accent1" accent2="accent2" accent3="accent3" accent4="accent4" accent5="accent5" accent6="accent6" hlink="hlink" folHlink="folHlink"/>
@@ -3734,7 +3864,7 @@
         </p:nvSpPr>
         <p:spPr>
           <a:xfrm>
-            <a:off x="533400" y="1036637"/>
+            <a:off x="533400" y="884237"/>
             <a:ext cx="1253247" cy="304800"/>
           </a:xfrm>
           <a:prstGeom prst="rect">
@@ -3770,90 +3900,6 @@
           </a:p>
         </p:txBody>
       </p:sp>
-      <p:sp>
-        <p:nvSpPr>
-          <p:cNvPr id="165" name="Rectangle 164"/>
-          <p:cNvSpPr/>
-          <p:nvPr/>
-        </p:nvSpPr>
-        <p:spPr>
-          <a:xfrm>
-            <a:off x="5990616" y="960437"/>
-            <a:ext cx="2133600" cy="304800"/>
-          </a:xfrm>
-          <a:prstGeom prst="rect">
-            <a:avLst/>
-          </a:prstGeom>
-        </p:spPr>
-        <p:style>
-          <a:lnRef idx="2">
-            <a:schemeClr val="accent2">
-              <a:shade val="50000"/>
-            </a:schemeClr>
-          </a:lnRef>
-          <a:fillRef idx="1">
-            <a:schemeClr val="accent2"/>
-          </a:fillRef>
-          <a:effectRef idx="0">
-            <a:schemeClr val="accent2"/>
-          </a:effectRef>
-          <a:fontRef idx="minor">
-            <a:schemeClr val="lt1"/>
-          </a:fontRef>
-        </p:style>
-        <p:txBody>
-          <a:bodyPr rtlCol="0" anchor="ctr"/>
-          <a:lstStyle/>
-          <a:p>
-            <a:pPr algn="ctr"/>
-            <a:r>
-              <a:rPr lang="en-US" sz="1600" b="1" dirty="0" err="1" smtClean="0"/>
-              <a:t>TeammatesException</a:t>
-            </a:r>
-            <a:endParaRPr lang="en-SG" sz="1600" b="1" dirty="0"/>
-          </a:p>
-        </p:txBody>
-      </p:sp>
-      <p:sp>
-        <p:nvSpPr>
-          <p:cNvPr id="167" name="Isosceles Triangle 166"/>
-          <p:cNvSpPr/>
-          <p:nvPr/>
-        </p:nvSpPr>
-        <p:spPr>
-          <a:xfrm>
-            <a:off x="6719582" y="1265237"/>
-            <a:ext cx="252000" cy="216000"/>
-          </a:xfrm>
-          <a:prstGeom prst="triangle">
-            <a:avLst/>
-          </a:prstGeom>
-        </p:spPr>
-        <p:style>
-          <a:lnRef idx="2">
-            <a:schemeClr val="accent2">
-              <a:shade val="50000"/>
-            </a:schemeClr>
-          </a:lnRef>
-          <a:fillRef idx="1">
-            <a:schemeClr val="accent2"/>
-          </a:fillRef>
-          <a:effectRef idx="0">
-            <a:schemeClr val="accent2"/>
-          </a:effectRef>
-          <a:fontRef idx="minor">
-            <a:schemeClr val="lt1"/>
-          </a:fontRef>
-        </p:style>
-        <p:txBody>
-          <a:bodyPr rtlCol="0" anchor="ctr"/>
-          <a:lstStyle/>
-          <a:p>
-            <a:pPr algn="ctr"/>
-            <a:endParaRPr lang="en-SG"/>
-          </a:p>
-        </p:txBody>
-      </p:sp>
       <p:grpSp>
         <p:nvGrpSpPr>
           <p:cNvPr id="7" name="Group 6"/>
@@ -3862,10 +3908,10 @@
         </p:nvGrpSpPr>
         <p:grpSpPr>
           <a:xfrm>
-            <a:off x="5715000" y="1481237"/>
-            <a:ext cx="2286000" cy="546000"/>
-            <a:chOff x="5715000" y="1481237"/>
-            <a:chExt cx="2286000" cy="546000"/>
+            <a:off x="5715000" y="960437"/>
+            <a:ext cx="2286000" cy="457200"/>
+            <a:chOff x="5715000" y="1570037"/>
+            <a:chExt cx="2286000" cy="457200"/>
           </a:xfrm>
         </p:grpSpPr>
         <p:sp>
@@ -3908,47 +3954,6 @@
             </a:p>
           </p:txBody>
         </p:sp>
-        <p:cxnSp>
-          <p:nvCxnSpPr>
-            <p:cNvPr id="168" name="Elbow Connector 167"/>
-            <p:cNvCxnSpPr>
-              <a:stCxn id="167" idx="3"/>
-              <a:endCxn id="169" idx="0"/>
-            </p:cNvCxnSpPr>
-            <p:nvPr/>
-          </p:nvCxnSpPr>
-          <p:spPr>
-            <a:xfrm rot="16200000" flipH="1">
-              <a:off x="6763082" y="1563737"/>
-              <a:ext cx="165000" cy="0"/>
-            </a:xfrm>
-            <a:prstGeom prst="bentConnector3">
-              <a:avLst>
-                <a:gd name="adj1" fmla="val 50000"/>
-              </a:avLst>
-            </a:prstGeom>
-            <a:ln w="19050">
-              <a:headEnd type="none" w="med" len="med"/>
-              <a:tailEnd type="none" w="med" len="med"/>
-            </a:ln>
-          </p:spPr>
-          <p:style>
-            <a:lnRef idx="2">
-              <a:schemeClr val="accent2">
-                <a:shade val="50000"/>
-              </a:schemeClr>
-            </a:lnRef>
-            <a:fillRef idx="1">
-              <a:schemeClr val="accent2"/>
-            </a:fillRef>
-            <a:effectRef idx="0">
-              <a:schemeClr val="accent2"/>
-            </a:effectRef>
-            <a:fontRef idx="minor">
-              <a:schemeClr val="lt1"/>
-            </a:fontRef>
-          </p:style>
-        </p:cxnSp>
         <p:sp>
           <p:nvSpPr>
             <p:cNvPr id="169" name="Rectangle 168"/>
@@ -4040,13 +4045,13 @@
       </p:grpSp>
       <p:sp>
         <p:nvSpPr>
-          <p:cNvPr id="35" name="Rectangle 34"/>
+          <p:cNvPr id="36" name="Rectangle 35"/>
           <p:cNvSpPr/>
           <p:nvPr/>
         </p:nvSpPr>
         <p:spPr>
           <a:xfrm>
-            <a:off x="3162299" y="1189037"/>
+            <a:off x="3162299" y="731837"/>
             <a:ext cx="1600200" cy="304800"/>
           </a:xfrm>
           <a:prstGeom prst="rect">
@@ -4075,50 +4080,6 @@
           <a:p>
             <a:pPr algn="ctr"/>
             <a:r>
-              <a:rPr lang="en-SG" sz="1600" b="1" dirty="0" smtClean="0"/>
-              <a:t>Logger</a:t>
-            </a:r>
-            <a:endParaRPr lang="en-SG" sz="1600" b="1" dirty="0"/>
-          </a:p>
-        </p:txBody>
-      </p:sp>
-      <p:sp>
-        <p:nvSpPr>
-          <p:cNvPr id="36" name="Rectangle 35"/>
-          <p:cNvSpPr/>
-          <p:nvPr/>
-        </p:nvSpPr>
-        <p:spPr>
-          <a:xfrm>
-            <a:off x="3162299" y="808037"/>
-            <a:ext cx="1600200" cy="304800"/>
-          </a:xfrm>
-          <a:prstGeom prst="rect">
-            <a:avLst/>
-          </a:prstGeom>
-        </p:spPr>
-        <p:style>
-          <a:lnRef idx="2">
-            <a:schemeClr val="accent3">
-              <a:shade val="50000"/>
-            </a:schemeClr>
-          </a:lnRef>
-          <a:fillRef idx="1">
-            <a:schemeClr val="accent3"/>
-          </a:fillRef>
-          <a:effectRef idx="0">
-            <a:schemeClr val="accent3"/>
-          </a:effectRef>
-          <a:fontRef idx="minor">
-            <a:schemeClr val="lt1"/>
-          </a:fontRef>
-        </p:style>
-        <p:txBody>
-          <a:bodyPr rtlCol="0" anchor="ctr"/>
-          <a:lstStyle/>
-          <a:p>
-            <a:pPr algn="ctr"/>
-            <a:r>
               <a:rPr lang="en-US" sz="1600" b="1" dirty="0" err="1" smtClean="0"/>
               <a:t>FieldValidator</a:t>
             </a:r>
@@ -4134,7 +4095,7 @@
         </p:nvSpPr>
         <p:spPr>
           <a:xfrm>
-            <a:off x="5237742" y="2553649"/>
+            <a:off x="3009000" y="2581637"/>
             <a:ext cx="1944000" cy="360000"/>
           </a:xfrm>
           <a:prstGeom prst="rect">
@@ -4178,7 +4139,7 @@
         </p:nvSpPr>
         <p:spPr>
           <a:xfrm>
-            <a:off x="6088542" y="2941637"/>
+            <a:off x="4737000" y="2941637"/>
             <a:ext cx="216000" cy="216000"/>
           </a:xfrm>
           <a:prstGeom prst="triangle">
@@ -4220,7 +4181,7 @@
         </p:nvSpPr>
         <p:spPr>
           <a:xfrm>
-            <a:off x="3942342" y="4150546"/>
+            <a:off x="2590551" y="4074346"/>
             <a:ext cx="1944758" cy="360000"/>
           </a:xfrm>
           <a:prstGeom prst="rect">
@@ -4250,8 +4211,8 @@
           <a:p>
             <a:pPr algn="r"/>
             <a:r>
-              <a:rPr lang="en-US" sz="1600" b="1" dirty="0" err="1" smtClean="0"/>
-              <a:t>StudentAttributes</a:t>
+              <a:rPr lang="en-US" sz="1600" b="1" dirty="0" smtClean="0"/>
+              <a:t>*Attributes</a:t>
             </a:r>
             <a:endParaRPr lang="en-SG" sz="1600" b="1" dirty="0"/>
           </a:p>
@@ -4259,19 +4220,18 @@
       </p:sp>
       <p:sp>
         <p:nvSpPr>
-          <p:cNvPr id="179" name="Rectangle 178"/>
+          <p:cNvPr id="173" name="Rectangle 172"/>
           <p:cNvSpPr/>
           <p:nvPr/>
         </p:nvSpPr>
         <p:spPr>
           <a:xfrm>
-            <a:off x="6514200" y="3246437"/>
-            <a:ext cx="1944000" cy="360000"/>
-          </a:xfrm>
-          <a:prstGeom prst="rect">
-            <a:avLst/>
-          </a:prstGeom>
-          <a:effectLst/>
+            <a:off x="2590551" y="3623811"/>
+            <a:ext cx="1944758" cy="360000"/>
+          </a:xfrm>
+          <a:prstGeom prst="rect">
+            <a:avLst/>
+          </a:prstGeom>
         </p:spPr>
         <p:style>
           <a:lnRef idx="2">
@@ -4293,9 +4253,10 @@
           <a:bodyPr rtlCol="0" anchor="ctr"/>
           <a:lstStyle/>
           <a:p>
+            <a:pPr algn="r"/>
             <a:r>
               <a:rPr lang="en-US" sz="1600" b="1" dirty="0" err="1" smtClean="0"/>
-              <a:t>CourseAttributes</a:t>
+              <a:t>InstructorAttributes</a:t>
             </a:r>
             <a:endParaRPr lang="en-SG" sz="1600" b="1" dirty="0"/>
           </a:p>
@@ -4303,18 +4264,21 @@
       </p:sp>
       <p:sp>
         <p:nvSpPr>
-          <p:cNvPr id="173" name="Rectangle 172"/>
-          <p:cNvSpPr/>
+          <p:cNvPr id="48" name="Rectangle 47"/>
+          <p:cNvSpPr>
+            <a:spLocks/>
+          </p:cNvSpPr>
           <p:nvPr/>
         </p:nvSpPr>
         <p:spPr>
           <a:xfrm>
-            <a:off x="3942342" y="3700011"/>
+            <a:off x="2590551" y="3170237"/>
             <a:ext cx="1944758" cy="360000"/>
           </a:xfrm>
           <a:prstGeom prst="rect">
             <a:avLst/>
           </a:prstGeom>
+          <a:effectLst/>
         </p:spPr>
         <p:style>
           <a:lnRef idx="2">
@@ -4339,140 +4303,7 @@
             <a:pPr algn="r"/>
             <a:r>
               <a:rPr lang="en-US" sz="1600" b="1" dirty="0" err="1" smtClean="0"/>
-              <a:t>InstructorAttributes</a:t>
-            </a:r>
-            <a:endParaRPr lang="en-SG" sz="1600" b="1" dirty="0"/>
-          </a:p>
-        </p:txBody>
-      </p:sp>
-      <p:sp>
-        <p:nvSpPr>
-          <p:cNvPr id="174" name="Rectangle 173"/>
-          <p:cNvSpPr/>
-          <p:nvPr/>
-        </p:nvSpPr>
-        <p:spPr>
-          <a:xfrm>
-            <a:off x="6511122" y="3700663"/>
-            <a:ext cx="1944000" cy="360000"/>
-          </a:xfrm>
-          <a:prstGeom prst="rect">
-            <a:avLst/>
-          </a:prstGeom>
-        </p:spPr>
-        <p:style>
-          <a:lnRef idx="2">
-            <a:schemeClr val="accent6">
-              <a:shade val="50000"/>
-            </a:schemeClr>
-          </a:lnRef>
-          <a:fillRef idx="1">
-            <a:schemeClr val="accent6"/>
-          </a:fillRef>
-          <a:effectRef idx="0">
-            <a:schemeClr val="accent6"/>
-          </a:effectRef>
-          <a:fontRef idx="minor">
-            <a:schemeClr val="lt1"/>
-          </a:fontRef>
-        </p:style>
-        <p:txBody>
-          <a:bodyPr rtlCol="0" anchor="ctr"/>
-          <a:lstStyle/>
-          <a:p>
-            <a:r>
-              <a:rPr lang="en-US" sz="1600" b="1" dirty="0" err="1" smtClean="0"/>
-              <a:t>CommentAttributes</a:t>
-            </a:r>
-            <a:endParaRPr lang="en-SG" sz="1600" b="1" dirty="0"/>
-          </a:p>
-        </p:txBody>
-      </p:sp>
-      <p:sp>
-        <p:nvSpPr>
-          <p:cNvPr id="175" name="Rectangle 174"/>
-          <p:cNvSpPr/>
-          <p:nvPr/>
-        </p:nvSpPr>
-        <p:spPr>
-          <a:xfrm>
-            <a:off x="6511122" y="4150546"/>
-            <a:ext cx="1944000" cy="360000"/>
-          </a:xfrm>
-          <a:prstGeom prst="rect">
-            <a:avLst/>
-          </a:prstGeom>
-        </p:spPr>
-        <p:style>
-          <a:lnRef idx="2">
-            <a:schemeClr val="accent6">
-              <a:shade val="50000"/>
-            </a:schemeClr>
-          </a:lnRef>
-          <a:fillRef idx="1">
-            <a:schemeClr val="accent6"/>
-          </a:fillRef>
-          <a:effectRef idx="0">
-            <a:schemeClr val="accent6"/>
-          </a:effectRef>
-          <a:fontRef idx="minor">
-            <a:schemeClr val="lt1"/>
-          </a:fontRef>
-        </p:style>
-        <p:txBody>
-          <a:bodyPr rtlCol="0" anchor="ctr"/>
-          <a:lstStyle/>
-          <a:p>
-            <a:r>
-              <a:rPr lang="en-US" sz="1600" b="1" dirty="0" smtClean="0"/>
-              <a:t>*Attributes</a:t>
-            </a:r>
-            <a:endParaRPr lang="en-SG" sz="1600" b="1" dirty="0"/>
-          </a:p>
-        </p:txBody>
-      </p:sp>
-      <p:sp>
-        <p:nvSpPr>
-          <p:cNvPr id="48" name="Rectangle 47"/>
-          <p:cNvSpPr>
-            <a:spLocks/>
-          </p:cNvSpPr>
-          <p:nvPr/>
-        </p:nvSpPr>
-        <p:spPr>
-          <a:xfrm>
-            <a:off x="3942342" y="3246437"/>
-            <a:ext cx="1944758" cy="360000"/>
-          </a:xfrm>
-          <a:prstGeom prst="rect">
-            <a:avLst/>
-          </a:prstGeom>
-          <a:effectLst/>
-        </p:spPr>
-        <p:style>
-          <a:lnRef idx="2">
-            <a:schemeClr val="accent6">
-              <a:shade val="50000"/>
-            </a:schemeClr>
-          </a:lnRef>
-          <a:fillRef idx="1">
-            <a:schemeClr val="accent6"/>
-          </a:fillRef>
-          <a:effectRef idx="0">
-            <a:schemeClr val="accent6"/>
-          </a:effectRef>
-          <a:fontRef idx="minor">
-            <a:schemeClr val="lt1"/>
-          </a:fontRef>
-        </p:style>
-        <p:txBody>
-          <a:bodyPr rtlCol="0" anchor="ctr"/>
-          <a:lstStyle/>
-          <a:p>
-            <a:pPr algn="r"/>
-            <a:r>
-              <a:rPr lang="en-US" sz="1600" b="1" dirty="0" err="1" smtClean="0"/>
-              <a:t>AccountAttributes</a:t>
+              <a:t>StudentAttributes</a:t>
             </a:r>
             <a:endParaRPr lang="en-SG" sz="1600" b="1" dirty="0"/>
           </a:p>
@@ -4489,8 +4320,8 @@
         </p:nvCxnSpPr>
         <p:spPr>
           <a:xfrm rot="5400000">
-            <a:off x="5907421" y="3137316"/>
-            <a:ext cx="268800" cy="309442"/>
+            <a:off x="4593855" y="3099092"/>
+            <a:ext cx="192600" cy="309691"/>
           </a:xfrm>
           <a:prstGeom prst="bentConnector2">
             <a:avLst/>
@@ -4524,8 +4355,8 @@
         </p:nvCxnSpPr>
         <p:spPr>
           <a:xfrm rot="5400000">
-            <a:off x="5680634" y="3364103"/>
-            <a:ext cx="722374" cy="309442"/>
+            <a:off x="4367068" y="3325879"/>
+            <a:ext cx="646174" cy="309691"/>
           </a:xfrm>
           <a:prstGeom prst="bentConnector2">
             <a:avLst/>
@@ -4559,113 +4390,8 @@
         </p:nvCxnSpPr>
         <p:spPr>
           <a:xfrm rot="5400000">
-            <a:off x="5455367" y="3589370"/>
-            <a:ext cx="1172909" cy="309442"/>
-          </a:xfrm>
-          <a:prstGeom prst="bentConnector2">
-            <a:avLst/>
-          </a:prstGeom>
-        </p:spPr>
-        <p:style>
-          <a:lnRef idx="2">
-            <a:schemeClr val="accent6">
-              <a:shade val="50000"/>
-            </a:schemeClr>
-          </a:lnRef>
-          <a:fillRef idx="1">
-            <a:schemeClr val="accent6"/>
-          </a:fillRef>
-          <a:effectRef idx="0">
-            <a:schemeClr val="accent6"/>
-          </a:effectRef>
-          <a:fontRef idx="minor">
-            <a:schemeClr val="lt1"/>
-          </a:fontRef>
-        </p:style>
-      </p:cxnSp>
-      <p:cxnSp>
-        <p:nvCxnSpPr>
-          <p:cNvPr id="58" name="Elbow Connector 57"/>
-          <p:cNvCxnSpPr>
-            <a:stCxn id="37" idx="3"/>
-            <a:endCxn id="179" idx="1"/>
-          </p:cNvCxnSpPr>
-          <p:nvPr/>
-        </p:nvCxnSpPr>
-        <p:spPr>
-          <a:xfrm rot="16200000" flipH="1">
-            <a:off x="6220971" y="3133208"/>
-            <a:ext cx="268800" cy="317658"/>
-          </a:xfrm>
-          <a:prstGeom prst="bentConnector2">
-            <a:avLst/>
-          </a:prstGeom>
-        </p:spPr>
-        <p:style>
-          <a:lnRef idx="2">
-            <a:schemeClr val="accent6">
-              <a:shade val="50000"/>
-            </a:schemeClr>
-          </a:lnRef>
-          <a:fillRef idx="1">
-            <a:schemeClr val="accent6"/>
-          </a:fillRef>
-          <a:effectRef idx="0">
-            <a:schemeClr val="accent6"/>
-          </a:effectRef>
-          <a:fontRef idx="minor">
-            <a:schemeClr val="lt1"/>
-          </a:fontRef>
-        </p:style>
-      </p:cxnSp>
-      <p:cxnSp>
-        <p:nvCxnSpPr>
-          <p:cNvPr id="61" name="Elbow Connector 60"/>
-          <p:cNvCxnSpPr>
-            <a:stCxn id="37" idx="3"/>
-            <a:endCxn id="174" idx="1"/>
-          </p:cNvCxnSpPr>
-          <p:nvPr/>
-        </p:nvCxnSpPr>
-        <p:spPr>
-          <a:xfrm rot="16200000" flipH="1">
-            <a:off x="5992319" y="3361860"/>
-            <a:ext cx="723026" cy="314580"/>
-          </a:xfrm>
-          <a:prstGeom prst="bentConnector2">
-            <a:avLst/>
-          </a:prstGeom>
-        </p:spPr>
-        <p:style>
-          <a:lnRef idx="2">
-            <a:schemeClr val="accent6">
-              <a:shade val="50000"/>
-            </a:schemeClr>
-          </a:lnRef>
-          <a:fillRef idx="1">
-            <a:schemeClr val="accent6"/>
-          </a:fillRef>
-          <a:effectRef idx="0">
-            <a:schemeClr val="accent6"/>
-          </a:effectRef>
-          <a:fontRef idx="minor">
-            <a:schemeClr val="lt1"/>
-          </a:fontRef>
-        </p:style>
-      </p:cxnSp>
-      <p:cxnSp>
-        <p:nvCxnSpPr>
-          <p:cNvPr id="65" name="Elbow Connector 64"/>
-          <p:cNvCxnSpPr>
-            <a:stCxn id="37" idx="3"/>
-            <a:endCxn id="175" idx="1"/>
-          </p:cNvCxnSpPr>
-          <p:nvPr/>
-        </p:nvCxnSpPr>
-        <p:spPr>
-          <a:xfrm rot="16200000" flipH="1">
-            <a:off x="5767378" y="3586801"/>
-            <a:ext cx="1172909" cy="314580"/>
+            <a:off x="4141801" y="3551146"/>
+            <a:ext cx="1096709" cy="309691"/>
           </a:xfrm>
           <a:prstGeom prst="bentConnector2">
             <a:avLst/>
@@ -4696,7 +4422,7 @@
         </p:nvGrpSpPr>
         <p:grpSpPr>
           <a:xfrm>
-            <a:off x="595006" y="3958960"/>
+            <a:off x="736056" y="3549475"/>
             <a:ext cx="1321344" cy="458962"/>
             <a:chOff x="595006" y="3958960"/>
             <a:chExt cx="1321344" cy="458962"/>
@@ -4829,291 +4555,13 @@
       </p:grpSp>
       <p:grpSp>
         <p:nvGrpSpPr>
-          <p:cNvPr id="4" name="Group 3"/>
-          <p:cNvGrpSpPr/>
-          <p:nvPr/>
-        </p:nvGrpSpPr>
-        <p:grpSpPr>
-          <a:xfrm>
-            <a:off x="2174133" y="3246437"/>
-            <a:ext cx="1321344" cy="458962"/>
-            <a:chOff x="2174133" y="3246437"/>
-            <a:chExt cx="1321344" cy="458962"/>
-          </a:xfrm>
-        </p:grpSpPr>
-        <p:sp>
-          <p:nvSpPr>
-            <p:cNvPr id="74" name="Rectangle 73"/>
-            <p:cNvSpPr/>
-            <p:nvPr/>
-          </p:nvSpPr>
-          <p:spPr>
-            <a:xfrm>
-              <a:off x="2174133" y="3246437"/>
-              <a:ext cx="1219200" cy="361770"/>
-            </a:xfrm>
-            <a:prstGeom prst="rect">
-              <a:avLst/>
-            </a:prstGeom>
-          </p:spPr>
-          <p:style>
-            <a:lnRef idx="2">
-              <a:schemeClr val="accent5">
-                <a:shade val="50000"/>
-              </a:schemeClr>
-            </a:lnRef>
-            <a:fillRef idx="1">
-              <a:schemeClr val="accent5"/>
-            </a:fillRef>
-            <a:effectRef idx="0">
-              <a:schemeClr val="accent5"/>
-            </a:effectRef>
-            <a:fontRef idx="minor">
-              <a:schemeClr val="lt1"/>
-            </a:fontRef>
-          </p:style>
-          <p:txBody>
-            <a:bodyPr rtlCol="0" anchor="ctr"/>
-            <a:lstStyle/>
-            <a:p>
-              <a:pPr algn="ctr"/>
-              <a:endParaRPr lang="en-SG" sz="1600" b="1" dirty="0"/>
-            </a:p>
-          </p:txBody>
-        </p:sp>
-        <p:sp>
-          <p:nvSpPr>
-            <p:cNvPr id="75" name="Rectangle 74"/>
-            <p:cNvSpPr/>
-            <p:nvPr/>
-          </p:nvSpPr>
-          <p:spPr>
-            <a:xfrm>
-              <a:off x="2222774" y="3295033"/>
-              <a:ext cx="1219200" cy="361770"/>
-            </a:xfrm>
-            <a:prstGeom prst="rect">
-              <a:avLst/>
-            </a:prstGeom>
-          </p:spPr>
-          <p:style>
-            <a:lnRef idx="2">
-              <a:schemeClr val="accent5">
-                <a:shade val="50000"/>
-              </a:schemeClr>
-            </a:lnRef>
-            <a:fillRef idx="1">
-              <a:schemeClr val="accent5"/>
-            </a:fillRef>
-            <a:effectRef idx="0">
-              <a:schemeClr val="accent5"/>
-            </a:effectRef>
-            <a:fontRef idx="minor">
-              <a:schemeClr val="lt1"/>
-            </a:fontRef>
-          </p:style>
-          <p:txBody>
-            <a:bodyPr rtlCol="0" anchor="ctr"/>
-            <a:lstStyle/>
-            <a:p>
-              <a:pPr algn="ctr"/>
-              <a:endParaRPr lang="en-SG" sz="1600" b="1" dirty="0"/>
-            </a:p>
-          </p:txBody>
-        </p:sp>
-        <p:sp>
-          <p:nvSpPr>
-            <p:cNvPr id="76" name="Rectangle 75"/>
-            <p:cNvSpPr/>
-            <p:nvPr/>
-          </p:nvSpPr>
-          <p:spPr>
-            <a:xfrm>
-              <a:off x="2276277" y="3343629"/>
-              <a:ext cx="1219200" cy="361770"/>
-            </a:xfrm>
-            <a:prstGeom prst="rect">
-              <a:avLst/>
-            </a:prstGeom>
-          </p:spPr>
-          <p:style>
-            <a:lnRef idx="2">
-              <a:schemeClr val="accent5">
-                <a:shade val="50000"/>
-              </a:schemeClr>
-            </a:lnRef>
-            <a:fillRef idx="1">
-              <a:schemeClr val="accent5"/>
-            </a:fillRef>
-            <a:effectRef idx="0">
-              <a:schemeClr val="accent5"/>
-            </a:effectRef>
-            <a:fontRef idx="minor">
-              <a:schemeClr val="lt1"/>
-            </a:fontRef>
-          </p:style>
-          <p:txBody>
-            <a:bodyPr rtlCol="0" anchor="ctr"/>
-            <a:lstStyle/>
-            <a:p>
-              <a:pPr algn="ctr"/>
-              <a:r>
-                <a:rPr lang="en-US" sz="1600" b="1" dirty="0" smtClean="0"/>
-                <a:t>*Stats</a:t>
-              </a:r>
-              <a:endParaRPr lang="en-SG" sz="1600" b="1" dirty="0"/>
-            </a:p>
-          </p:txBody>
-        </p:sp>
-      </p:grpSp>
-      <p:grpSp>
-        <p:nvGrpSpPr>
-          <p:cNvPr id="5" name="Group 4"/>
-          <p:cNvGrpSpPr/>
-          <p:nvPr/>
-        </p:nvGrpSpPr>
-        <p:grpSpPr>
-          <a:xfrm>
-            <a:off x="2174133" y="4007556"/>
-            <a:ext cx="1321344" cy="458962"/>
-            <a:chOff x="2174133" y="4007556"/>
-            <a:chExt cx="1321344" cy="458962"/>
-          </a:xfrm>
-        </p:grpSpPr>
-        <p:sp>
-          <p:nvSpPr>
-            <p:cNvPr id="77" name="Rectangle 76"/>
-            <p:cNvSpPr/>
-            <p:nvPr/>
-          </p:nvSpPr>
-          <p:spPr>
-            <a:xfrm>
-              <a:off x="2174133" y="4007556"/>
-              <a:ext cx="1219200" cy="361770"/>
-            </a:xfrm>
-            <a:prstGeom prst="rect">
-              <a:avLst/>
-            </a:prstGeom>
-          </p:spPr>
-          <p:style>
-            <a:lnRef idx="2">
-              <a:schemeClr val="accent5">
-                <a:shade val="50000"/>
-              </a:schemeClr>
-            </a:lnRef>
-            <a:fillRef idx="1">
-              <a:schemeClr val="accent5"/>
-            </a:fillRef>
-            <a:effectRef idx="0">
-              <a:schemeClr val="accent5"/>
-            </a:effectRef>
-            <a:fontRef idx="minor">
-              <a:schemeClr val="lt1"/>
-            </a:fontRef>
-          </p:style>
-          <p:txBody>
-            <a:bodyPr rtlCol="0" anchor="ctr"/>
-            <a:lstStyle/>
-            <a:p>
-              <a:pPr algn="ctr"/>
-              <a:endParaRPr lang="en-SG" sz="1600" b="1" dirty="0"/>
-            </a:p>
-          </p:txBody>
-        </p:sp>
-        <p:sp>
-          <p:nvSpPr>
-            <p:cNvPr id="78" name="Rectangle 77"/>
-            <p:cNvSpPr/>
-            <p:nvPr/>
-          </p:nvSpPr>
-          <p:spPr>
-            <a:xfrm>
-              <a:off x="2222774" y="4056152"/>
-              <a:ext cx="1219200" cy="361770"/>
-            </a:xfrm>
-            <a:prstGeom prst="rect">
-              <a:avLst/>
-            </a:prstGeom>
-          </p:spPr>
-          <p:style>
-            <a:lnRef idx="2">
-              <a:schemeClr val="accent5">
-                <a:shade val="50000"/>
-              </a:schemeClr>
-            </a:lnRef>
-            <a:fillRef idx="1">
-              <a:schemeClr val="accent5"/>
-            </a:fillRef>
-            <a:effectRef idx="0">
-              <a:schemeClr val="accent5"/>
-            </a:effectRef>
-            <a:fontRef idx="minor">
-              <a:schemeClr val="lt1"/>
-            </a:fontRef>
-          </p:style>
-          <p:txBody>
-            <a:bodyPr rtlCol="0" anchor="ctr"/>
-            <a:lstStyle/>
-            <a:p>
-              <a:pPr algn="ctr"/>
-              <a:endParaRPr lang="en-SG" sz="1600" b="1" dirty="0"/>
-            </a:p>
-          </p:txBody>
-        </p:sp>
-        <p:sp>
-          <p:nvSpPr>
-            <p:cNvPr id="79" name="Rectangle 78"/>
-            <p:cNvSpPr/>
-            <p:nvPr/>
-          </p:nvSpPr>
-          <p:spPr>
-            <a:xfrm>
-              <a:off x="2276277" y="4104748"/>
-              <a:ext cx="1219200" cy="361770"/>
-            </a:xfrm>
-            <a:prstGeom prst="rect">
-              <a:avLst/>
-            </a:prstGeom>
-          </p:spPr>
-          <p:style>
-            <a:lnRef idx="2">
-              <a:schemeClr val="accent5">
-                <a:shade val="50000"/>
-              </a:schemeClr>
-            </a:lnRef>
-            <a:fillRef idx="1">
-              <a:schemeClr val="accent5"/>
-            </a:fillRef>
-            <a:effectRef idx="0">
-              <a:schemeClr val="accent5"/>
-            </a:effectRef>
-            <a:fontRef idx="minor">
-              <a:schemeClr val="lt1"/>
-            </a:fontRef>
-          </p:style>
-          <p:txBody>
-            <a:bodyPr rtlCol="0" anchor="ctr"/>
-            <a:lstStyle/>
-            <a:p>
-              <a:pPr algn="ctr"/>
-              <a:r>
-                <a:rPr lang="en-US" sz="1600" b="1" dirty="0" smtClean="0"/>
-                <a:t>*Summary</a:t>
-              </a:r>
-              <a:endParaRPr lang="en-SG" sz="1600" b="1" dirty="0"/>
-            </a:p>
-          </p:txBody>
-        </p:sp>
-      </p:grpSp>
-      <p:grpSp>
-        <p:nvGrpSpPr>
           <p:cNvPr id="11" name="Group 10"/>
           <p:cNvGrpSpPr/>
           <p:nvPr/>
         </p:nvGrpSpPr>
         <p:grpSpPr>
           <a:xfrm>
-            <a:off x="3162298" y="1593273"/>
+            <a:off x="3162298" y="1112837"/>
             <a:ext cx="1600200" cy="433964"/>
             <a:chOff x="3162298" y="1593273"/>
             <a:chExt cx="1600200" cy="433964"/>
@@ -5246,14 +4694,14 @@
       </p:grpSp>
       <p:sp>
         <p:nvSpPr>
-          <p:cNvPr id="42" name="Rectangle 41"/>
+          <p:cNvPr id="43" name="Rectangle 42"/>
           <p:cNvSpPr/>
           <p:nvPr/>
         </p:nvSpPr>
         <p:spPr>
           <a:xfrm>
-            <a:off x="533400" y="1390938"/>
-            <a:ext cx="1253247" cy="304800"/>
+            <a:off x="1948770" y="884237"/>
+            <a:ext cx="1023030" cy="304800"/>
           </a:xfrm>
           <a:prstGeom prst="rect">
             <a:avLst/>
@@ -5281,8 +4729,8 @@
           <a:p>
             <a:pPr algn="ctr"/>
             <a:r>
-              <a:rPr lang="en-US" sz="1600" b="1" dirty="0" smtClean="0"/>
-              <a:t>Sanitizer</a:t>
+              <a:rPr lang="en-US" sz="1600" b="1" dirty="0" err="1" smtClean="0"/>
+              <a:t>Config</a:t>
             </a:r>
             <a:endParaRPr lang="en-SG" sz="1600" b="1" dirty="0"/>
           </a:p>
@@ -5290,13 +4738,13 @@
       </p:sp>
       <p:sp>
         <p:nvSpPr>
-          <p:cNvPr id="43" name="Rectangle 42"/>
+          <p:cNvPr id="44" name="Rectangle 43"/>
           <p:cNvSpPr/>
           <p:nvPr/>
         </p:nvSpPr>
         <p:spPr>
           <a:xfrm>
-            <a:off x="1948770" y="1016864"/>
+            <a:off x="1940962" y="1265237"/>
             <a:ext cx="1023030" cy="304800"/>
           </a:xfrm>
           <a:prstGeom prst="rect">
@@ -5326,7 +4774,7 @@
             <a:pPr algn="ctr"/>
             <a:r>
               <a:rPr lang="en-US" sz="1600" b="1" dirty="0" err="1" smtClean="0"/>
-              <a:t>Config</a:t>
+              <a:t>Const</a:t>
             </a:r>
             <a:endParaRPr lang="en-SG" sz="1600" b="1" dirty="0"/>
           </a:p>
@@ -5334,14 +4782,14 @@
       </p:sp>
       <p:sp>
         <p:nvSpPr>
-          <p:cNvPr id="44" name="Rectangle 43"/>
+          <p:cNvPr id="46" name="Rectangle 45"/>
           <p:cNvSpPr/>
           <p:nvPr/>
         </p:nvSpPr>
         <p:spPr>
           <a:xfrm>
-            <a:off x="1940962" y="1373619"/>
-            <a:ext cx="1023030" cy="304800"/>
+            <a:off x="533399" y="1265237"/>
+            <a:ext cx="1253247" cy="304800"/>
           </a:xfrm>
           <a:prstGeom prst="rect">
             <a:avLst/>
@@ -5369,94 +4817,6 @@
           <a:p>
             <a:pPr algn="ctr"/>
             <a:r>
-              <a:rPr lang="en-US" sz="1600" b="1" dirty="0" err="1" smtClean="0"/>
-              <a:t>Const</a:t>
-            </a:r>
-            <a:endParaRPr lang="en-SG" sz="1600" b="1" dirty="0"/>
-          </a:p>
-        </p:txBody>
-      </p:sp>
-      <p:sp>
-        <p:nvSpPr>
-          <p:cNvPr id="45" name="Rectangle 44"/>
-          <p:cNvSpPr/>
-          <p:nvPr/>
-        </p:nvSpPr>
-        <p:spPr>
-          <a:xfrm>
-            <a:off x="1941843" y="1722437"/>
-            <a:ext cx="1023030" cy="304800"/>
-          </a:xfrm>
-          <a:prstGeom prst="rect">
-            <a:avLst/>
-          </a:prstGeom>
-        </p:spPr>
-        <p:style>
-          <a:lnRef idx="2">
-            <a:schemeClr val="accent3">
-              <a:shade val="50000"/>
-            </a:schemeClr>
-          </a:lnRef>
-          <a:fillRef idx="1">
-            <a:schemeClr val="accent3"/>
-          </a:fillRef>
-          <a:effectRef idx="0">
-            <a:schemeClr val="accent3"/>
-          </a:effectRef>
-          <a:fontRef idx="minor">
-            <a:schemeClr val="lt1"/>
-          </a:fontRef>
-        </p:style>
-        <p:txBody>
-          <a:bodyPr rtlCol="0" anchor="ctr"/>
-          <a:lstStyle/>
-          <a:p>
-            <a:pPr algn="ctr"/>
-            <a:r>
-              <a:rPr lang="en-US" sz="1600" b="1" dirty="0" err="1" smtClean="0"/>
-              <a:t>Url</a:t>
-            </a:r>
-            <a:endParaRPr lang="en-SG" sz="1600" b="1" dirty="0"/>
-          </a:p>
-        </p:txBody>
-      </p:sp>
-      <p:sp>
-        <p:nvSpPr>
-          <p:cNvPr id="46" name="Rectangle 45"/>
-          <p:cNvSpPr/>
-          <p:nvPr/>
-        </p:nvSpPr>
-        <p:spPr>
-          <a:xfrm>
-            <a:off x="533399" y="1747692"/>
-            <a:ext cx="1253247" cy="304800"/>
-          </a:xfrm>
-          <a:prstGeom prst="rect">
-            <a:avLst/>
-          </a:prstGeom>
-        </p:spPr>
-        <p:style>
-          <a:lnRef idx="2">
-            <a:schemeClr val="accent3">
-              <a:shade val="50000"/>
-            </a:schemeClr>
-          </a:lnRef>
-          <a:fillRef idx="1">
-            <a:schemeClr val="accent3"/>
-          </a:fillRef>
-          <a:effectRef idx="0">
-            <a:schemeClr val="accent3"/>
-          </a:effectRef>
-          <a:fontRef idx="minor">
-            <a:schemeClr val="lt1"/>
-          </a:fontRef>
-        </p:style>
-        <p:txBody>
-          <a:bodyPr rtlCol="0" anchor="ctr"/>
-          <a:lstStyle/>
-          <a:p>
-            <a:pPr algn="ctr"/>
-            <a:r>
               <a:rPr lang="en-US" sz="1600" b="1" dirty="0" smtClean="0"/>
               <a:t>Templates</a:t>
             </a:r>
@@ -5472,7 +4832,7 @@
         </p:nvGrpSpPr>
         <p:grpSpPr>
           <a:xfrm>
-            <a:off x="609599" y="3250641"/>
+            <a:off x="736056" y="2789237"/>
             <a:ext cx="1306752" cy="449370"/>
             <a:chOff x="609599" y="3250641"/>
             <a:chExt cx="1306752" cy="449370"/>
@@ -5603,6 +4963,146 @@
           </p:txBody>
         </p:sp>
       </p:grpSp>
+      <p:sp>
+        <p:nvSpPr>
+          <p:cNvPr id="67" name="Rectangle 66"/>
+          <p:cNvSpPr/>
+          <p:nvPr/>
+        </p:nvSpPr>
+        <p:spPr>
+          <a:xfrm>
+            <a:off x="5562600" y="2636837"/>
+            <a:ext cx="2743200" cy="361770"/>
+          </a:xfrm>
+          <a:prstGeom prst="rect">
+            <a:avLst/>
+          </a:prstGeom>
+        </p:spPr>
+        <p:style>
+          <a:lnRef idx="2">
+            <a:schemeClr val="accent5">
+              <a:shade val="50000"/>
+            </a:schemeClr>
+          </a:lnRef>
+          <a:fillRef idx="1">
+            <a:schemeClr val="accent5"/>
+          </a:fillRef>
+          <a:effectRef idx="0">
+            <a:schemeClr val="accent5"/>
+          </a:effectRef>
+          <a:fontRef idx="minor">
+            <a:schemeClr val="lt1"/>
+          </a:fontRef>
+        </p:style>
+        <p:txBody>
+          <a:bodyPr rtlCol="0" anchor="ctr"/>
+          <a:lstStyle/>
+          <a:p>
+            <a:pPr algn="ctr"/>
+            <a:r>
+              <a:rPr lang="en-US" sz="1600" b="1" dirty="0" smtClean="0"/>
+              <a:t>Feedback*</a:t>
+            </a:r>
+            <a:r>
+              <a:rPr lang="en-US" sz="1600" b="1" dirty="0" err="1" smtClean="0"/>
+              <a:t>QuestionDetails</a:t>
+            </a:r>
+            <a:endParaRPr lang="en-SG" sz="1600" b="1" dirty="0"/>
+          </a:p>
+        </p:txBody>
+      </p:sp>
+      <p:sp>
+        <p:nvSpPr>
+          <p:cNvPr id="68" name="Rectangle 67"/>
+          <p:cNvSpPr/>
+          <p:nvPr/>
+        </p:nvSpPr>
+        <p:spPr>
+          <a:xfrm>
+            <a:off x="5562598" y="3253411"/>
+            <a:ext cx="2743201" cy="361770"/>
+          </a:xfrm>
+          <a:prstGeom prst="rect">
+            <a:avLst/>
+          </a:prstGeom>
+        </p:spPr>
+        <p:style>
+          <a:lnRef idx="2">
+            <a:schemeClr val="accent4">
+              <a:shade val="50000"/>
+            </a:schemeClr>
+          </a:lnRef>
+          <a:fillRef idx="1">
+            <a:schemeClr val="accent4"/>
+          </a:fillRef>
+          <a:effectRef idx="0">
+            <a:schemeClr val="accent4"/>
+          </a:effectRef>
+          <a:fontRef idx="minor">
+            <a:schemeClr val="lt1"/>
+          </a:fontRef>
+        </p:style>
+        <p:txBody>
+          <a:bodyPr rtlCol="0" anchor="ctr"/>
+          <a:lstStyle/>
+          <a:p>
+            <a:pPr algn="ctr"/>
+            <a:r>
+              <a:rPr lang="en-US" sz="1600" b="1" dirty="0" smtClean="0"/>
+              <a:t>Feedback*</a:t>
+            </a:r>
+            <a:r>
+              <a:rPr lang="en-US" sz="1600" b="1" dirty="0" err="1" smtClean="0"/>
+              <a:t>ResponseDetails</a:t>
+            </a:r>
+            <a:endParaRPr lang="en-SG" sz="1600" b="1" dirty="0"/>
+          </a:p>
+        </p:txBody>
+      </p:sp>
+      <p:sp>
+        <p:nvSpPr>
+          <p:cNvPr id="80" name="Rectangle 79"/>
+          <p:cNvSpPr/>
+          <p:nvPr/>
+        </p:nvSpPr>
+        <p:spPr>
+          <a:xfrm>
+            <a:off x="5562598" y="3869986"/>
+            <a:ext cx="2743201" cy="360000"/>
+          </a:xfrm>
+          <a:prstGeom prst="rect">
+            <a:avLst/>
+          </a:prstGeom>
+        </p:spPr>
+        <p:style>
+          <a:lnRef idx="2">
+            <a:schemeClr val="accent6">
+              <a:shade val="50000"/>
+            </a:schemeClr>
+          </a:lnRef>
+          <a:fillRef idx="1">
+            <a:schemeClr val="accent6"/>
+          </a:fillRef>
+          <a:effectRef idx="0">
+            <a:schemeClr val="accent6"/>
+          </a:effectRef>
+          <a:fontRef idx="minor">
+            <a:schemeClr val="lt1"/>
+          </a:fontRef>
+        </p:style>
+        <p:txBody>
+          <a:bodyPr rtlCol="0" anchor="ctr"/>
+          <a:lstStyle/>
+          <a:p>
+            <a:pPr algn="ctr"/>
+            <a:r>
+              <a:rPr lang="en-US" sz="1600" b="1" dirty="0" err="1" smtClean="0"/>
+              <a:t>FeedbackQuestionType</a:t>
+            </a:r>
+            <a:endParaRPr lang="en-SG" sz="1600" b="1" dirty="0"/>
+          </a:p>
+        </p:txBody>
+      </p:sp>
     </p:spTree>
     <p:extLst>
       <p:ext uri="{BB962C8B-B14F-4D97-AF65-F5344CB8AC3E}">

</xml_diff>